<commit_message>
Update on slide 13: more questions
</commit_message>
<xml_diff>
--- a/Process_M3AAWG/2018-06-M3AAWG43-CalendarSpam.pptx
+++ b/Process_M3AAWG/2018-06-M3AAWG43-CalendarSpam.pptx
@@ -3097,7 +3097,7 @@
               <a:pPr>
                 <a:defRPr/>
               </a:pPr>
-              <a:t>5/28/18</a:t>
+              <a:t>5/29/18</a:t>
             </a:fld>
             <a:endParaRPr lang="en-US"/>
           </a:p>
@@ -3240,17 +3240,17 @@
           <a:effectLst/>
           <a:extLst>
             <a:ext uri="{FAA26D3D-D897-4be2-8F04-BA451C77F1D7}">
-              <ma14:placeholderFlag xmlns:ma14="http://schemas.microsoft.com/office/mac/drawingml/2011/main" xmlns="" val="1"/>
+              <ma14:placeholderFlag xmlns="" xmlns:ma14="http://schemas.microsoft.com/office/mac/drawingml/2011/main" val="1"/>
             </a:ext>
             <a:ext uri="{909E8E84-426E-40dd-AFC4-6F175D3DCCD1}">
-              <a14:hiddenFill xmlns:a14="http://schemas.microsoft.com/office/drawing/2010/main" xmlns="">
+              <a14:hiddenFill xmlns="" xmlns:a14="http://schemas.microsoft.com/office/drawing/2010/main">
                 <a:solidFill>
                   <a:schemeClr val="accent1"/>
                 </a:solidFill>
               </a14:hiddenFill>
             </a:ext>
             <a:ext uri="{91240B29-F687-4f45-9708-019B960494DF}">
-              <a14:hiddenLine xmlns:a14="http://schemas.microsoft.com/office/drawing/2010/main" xmlns="" w="9525">
+              <a14:hiddenLine xmlns="" xmlns:a14="http://schemas.microsoft.com/office/drawing/2010/main" w="9525">
                 <a:solidFill>
                   <a:schemeClr val="tx1"/>
                 </a:solidFill>
@@ -3260,7 +3260,7 @@
               </a14:hiddenLine>
             </a:ext>
             <a:ext uri="{AF507438-7753-43e0-B8FC-AC1667EBCBE1}">
-              <a14:hiddenEffects xmlns:a14="http://schemas.microsoft.com/office/drawing/2010/main" xmlns="">
+              <a14:hiddenEffects xmlns="" xmlns:a14="http://schemas.microsoft.com/office/drawing/2010/main">
                 <a:effectLst>
                   <a:outerShdw blurRad="63500" dist="38099" dir="2700000" algn="ctr" rotWithShape="0">
                     <a:schemeClr val="bg2">
@@ -3318,17 +3318,17 @@
           <a:effectLst/>
           <a:extLst>
             <a:ext uri="{FAA26D3D-D897-4be2-8F04-BA451C77F1D7}">
-              <ma14:placeholderFlag xmlns:ma14="http://schemas.microsoft.com/office/mac/drawingml/2011/main" xmlns="" val="1"/>
+              <ma14:placeholderFlag xmlns="" xmlns:ma14="http://schemas.microsoft.com/office/mac/drawingml/2011/main" val="1"/>
             </a:ext>
             <a:ext uri="{909E8E84-426E-40dd-AFC4-6F175D3DCCD1}">
-              <a14:hiddenFill xmlns:a14="http://schemas.microsoft.com/office/drawing/2010/main" xmlns="">
+              <a14:hiddenFill xmlns="" xmlns:a14="http://schemas.microsoft.com/office/drawing/2010/main">
                 <a:solidFill>
                   <a:schemeClr val="accent1"/>
                 </a:solidFill>
               </a14:hiddenFill>
             </a:ext>
             <a:ext uri="{91240B29-F687-4f45-9708-019B960494DF}">
-              <a14:hiddenLine xmlns:a14="http://schemas.microsoft.com/office/drawing/2010/main" xmlns="" w="9525">
+              <a14:hiddenLine xmlns="" xmlns:a14="http://schemas.microsoft.com/office/drawing/2010/main" w="9525">
                 <a:solidFill>
                   <a:schemeClr val="tx1"/>
                 </a:solidFill>
@@ -3338,7 +3338,7 @@
               </a14:hiddenLine>
             </a:ext>
             <a:ext uri="{AF507438-7753-43e0-B8FC-AC1667EBCBE1}">
-              <a14:hiddenEffects xmlns:a14="http://schemas.microsoft.com/office/drawing/2010/main" xmlns="">
+              <a14:hiddenEffects xmlns="" xmlns:a14="http://schemas.microsoft.com/office/drawing/2010/main">
                 <a:effectLst>
                   <a:outerShdw blurRad="63500" dist="38099" dir="2700000" algn="ctr" rotWithShape="0">
                     <a:schemeClr val="bg2">
@@ -3401,7 +3401,7 @@
           <a:effectLst/>
           <a:extLst>
             <a:ext uri="{AF507438-7753-43e0-B8FC-AC1667EBCBE1}">
-              <a14:hiddenEffects xmlns:a14="http://schemas.microsoft.com/office/drawing/2010/main" xmlns="">
+              <a14:hiddenEffects xmlns="" xmlns:a14="http://schemas.microsoft.com/office/drawing/2010/main">
                 <a:effectLst>
                   <a:outerShdw blurRad="63500" dist="38099" dir="2700000" algn="ctr" rotWithShape="0">
                     <a:srgbClr val="000000">
@@ -3412,7 +3412,7 @@
               </a14:hiddenEffects>
             </a:ext>
             <a:ext uri="{53640926-AAD7-44d8-BBD7-CCE9431645EC}">
-              <a14:shadowObscured xmlns:a14="http://schemas.microsoft.com/office/drawing/2010/main" xmlns="" val="1"/>
+              <a14:shadowObscured xmlns="" xmlns:a14="http://schemas.microsoft.com/office/drawing/2010/main" val="1"/>
             </a:ext>
           </a:extLst>
         </p:spPr>
@@ -3442,17 +3442,17 @@
           <a:effectLst/>
           <a:extLst>
             <a:ext uri="{FAA26D3D-D897-4be2-8F04-BA451C77F1D7}">
-              <ma14:placeholderFlag xmlns:ma14="http://schemas.microsoft.com/office/mac/drawingml/2011/main" xmlns="" val="1"/>
+              <ma14:placeholderFlag xmlns="" xmlns:ma14="http://schemas.microsoft.com/office/mac/drawingml/2011/main" val="1"/>
             </a:ext>
             <a:ext uri="{909E8E84-426E-40dd-AFC4-6F175D3DCCD1}">
-              <a14:hiddenFill xmlns:a14="http://schemas.microsoft.com/office/drawing/2010/main" xmlns="">
+              <a14:hiddenFill xmlns="" xmlns:a14="http://schemas.microsoft.com/office/drawing/2010/main">
                 <a:solidFill>
                   <a:schemeClr val="accent1"/>
                 </a:solidFill>
               </a14:hiddenFill>
             </a:ext>
             <a:ext uri="{91240B29-F687-4f45-9708-019B960494DF}">
-              <a14:hiddenLine xmlns:a14="http://schemas.microsoft.com/office/drawing/2010/main" xmlns="" w="9525">
+              <a14:hiddenLine xmlns="" xmlns:a14="http://schemas.microsoft.com/office/drawing/2010/main" w="9525">
                 <a:solidFill>
                   <a:schemeClr val="tx1"/>
                 </a:solidFill>
@@ -3462,7 +3462,7 @@
               </a14:hiddenLine>
             </a:ext>
             <a:ext uri="{AF507438-7753-43e0-B8FC-AC1667EBCBE1}">
-              <a14:hiddenEffects xmlns:a14="http://schemas.microsoft.com/office/drawing/2010/main" xmlns="">
+              <a14:hiddenEffects xmlns="" xmlns:a14="http://schemas.microsoft.com/office/drawing/2010/main">
                 <a:effectLst>
                   <a:outerShdw blurRad="63500" dist="38099" dir="2700000" algn="ctr" rotWithShape="0">
                     <a:schemeClr val="bg2">
@@ -3543,17 +3543,17 @@
           <a:effectLst/>
           <a:extLst>
             <a:ext uri="{FAA26D3D-D897-4be2-8F04-BA451C77F1D7}">
-              <ma14:placeholderFlag xmlns:ma14="http://schemas.microsoft.com/office/mac/drawingml/2011/main" xmlns="" val="1"/>
+              <ma14:placeholderFlag xmlns="" xmlns:ma14="http://schemas.microsoft.com/office/mac/drawingml/2011/main" val="1"/>
             </a:ext>
             <a:ext uri="{909E8E84-426E-40dd-AFC4-6F175D3DCCD1}">
-              <a14:hiddenFill xmlns:a14="http://schemas.microsoft.com/office/drawing/2010/main" xmlns="">
+              <a14:hiddenFill xmlns="" xmlns:a14="http://schemas.microsoft.com/office/drawing/2010/main">
                 <a:solidFill>
                   <a:schemeClr val="accent1"/>
                 </a:solidFill>
               </a14:hiddenFill>
             </a:ext>
             <a:ext uri="{91240B29-F687-4f45-9708-019B960494DF}">
-              <a14:hiddenLine xmlns:a14="http://schemas.microsoft.com/office/drawing/2010/main" xmlns="" w="9525">
+              <a14:hiddenLine xmlns="" xmlns:a14="http://schemas.microsoft.com/office/drawing/2010/main" w="9525">
                 <a:solidFill>
                   <a:schemeClr val="tx1"/>
                 </a:solidFill>
@@ -3563,7 +3563,7 @@
               </a14:hiddenLine>
             </a:ext>
             <a:ext uri="{AF507438-7753-43e0-B8FC-AC1667EBCBE1}">
-              <a14:hiddenEffects xmlns:a14="http://schemas.microsoft.com/office/drawing/2010/main" xmlns="">
+              <a14:hiddenEffects xmlns="" xmlns:a14="http://schemas.microsoft.com/office/drawing/2010/main">
                 <a:effectLst>
                   <a:outerShdw blurRad="63500" dist="38099" dir="2700000" algn="ctr" rotWithShape="0">
                     <a:schemeClr val="bg2">
@@ -3621,17 +3621,17 @@
           <a:effectLst/>
           <a:extLst>
             <a:ext uri="{FAA26D3D-D897-4be2-8F04-BA451C77F1D7}">
-              <ma14:placeholderFlag xmlns:ma14="http://schemas.microsoft.com/office/mac/drawingml/2011/main" xmlns="" val="1"/>
+              <ma14:placeholderFlag xmlns="" xmlns:ma14="http://schemas.microsoft.com/office/mac/drawingml/2011/main" val="1"/>
             </a:ext>
             <a:ext uri="{909E8E84-426E-40dd-AFC4-6F175D3DCCD1}">
-              <a14:hiddenFill xmlns:a14="http://schemas.microsoft.com/office/drawing/2010/main" xmlns="">
+              <a14:hiddenFill xmlns="" xmlns:a14="http://schemas.microsoft.com/office/drawing/2010/main">
                 <a:solidFill>
                   <a:schemeClr val="accent1"/>
                 </a:solidFill>
               </a14:hiddenFill>
             </a:ext>
             <a:ext uri="{91240B29-F687-4f45-9708-019B960494DF}">
-              <a14:hiddenLine xmlns:a14="http://schemas.microsoft.com/office/drawing/2010/main" xmlns="" w="9525">
+              <a14:hiddenLine xmlns="" xmlns:a14="http://schemas.microsoft.com/office/drawing/2010/main" w="9525">
                 <a:solidFill>
                   <a:schemeClr val="tx1"/>
                 </a:solidFill>
@@ -3641,7 +3641,7 @@
               </a14:hiddenLine>
             </a:ext>
             <a:ext uri="{AF507438-7753-43e0-B8FC-AC1667EBCBE1}">
-              <a14:hiddenEffects xmlns:a14="http://schemas.microsoft.com/office/drawing/2010/main" xmlns="">
+              <a14:hiddenEffects xmlns="" xmlns:a14="http://schemas.microsoft.com/office/drawing/2010/main">
                 <a:effectLst>
                   <a:outerShdw blurRad="63500" dist="38099" dir="2700000" algn="ctr" rotWithShape="0">
                     <a:schemeClr val="bg2">
@@ -4055,7 +4055,7 @@
           <a:ln/>
           <a:extLst>
             <a:ext uri="{FAA26D3D-D897-4be2-8F04-BA451C77F1D7}">
-              <ma14:placeholderFlag xmlns:ma14="http://schemas.microsoft.com/office/mac/drawingml/2011/main" xmlns="" val="1"/>
+              <ma14:placeholderFlag xmlns="" xmlns:ma14="http://schemas.microsoft.com/office/mac/drawingml/2011/main" val="1"/>
             </a:ext>
           </a:extLst>
         </p:spPr>
@@ -9627,14 +9627,14 @@
           </a:ln>
           <a:extLst>
             <a:ext uri="{909E8E84-426E-40dd-AFC4-6F175D3DCCD1}">
-              <a14:hiddenFill xmlns:a14="http://schemas.microsoft.com/office/drawing/2010/main" xmlns="">
+              <a14:hiddenFill xmlns="" xmlns:a14="http://schemas.microsoft.com/office/drawing/2010/main">
                 <a:solidFill>
                   <a:srgbClr val="FFFFFF"/>
                 </a:solidFill>
               </a14:hiddenFill>
             </a:ext>
             <a:ext uri="{91240B29-F687-4f45-9708-019B960494DF}">
-              <a14:hiddenLine xmlns:a14="http://schemas.microsoft.com/office/drawing/2010/main" xmlns="" w="9525">
+              <a14:hiddenLine xmlns="" xmlns:a14="http://schemas.microsoft.com/office/drawing/2010/main" w="9525">
                 <a:solidFill>
                   <a:srgbClr val="000000"/>
                 </a:solidFill>
@@ -9669,14 +9669,14 @@
           <a:effectLst/>
           <a:extLst>
             <a:ext uri="{909E8E84-426E-40dd-AFC4-6F175D3DCCD1}">
-              <a14:hiddenFill xmlns:a14="http://schemas.microsoft.com/office/drawing/2010/main" xmlns="">
+              <a14:hiddenFill xmlns="" xmlns:a14="http://schemas.microsoft.com/office/drawing/2010/main">
                 <a:solidFill>
                   <a:schemeClr val="accent1"/>
                 </a:solidFill>
               </a14:hiddenFill>
             </a:ext>
             <a:ext uri="{91240B29-F687-4f45-9708-019B960494DF}">
-              <a14:hiddenLine xmlns:a14="http://schemas.microsoft.com/office/drawing/2010/main" xmlns="" w="9525">
+              <a14:hiddenLine xmlns="" xmlns:a14="http://schemas.microsoft.com/office/drawing/2010/main" w="9525">
                 <a:solidFill>
                   <a:schemeClr val="tx1"/>
                 </a:solidFill>
@@ -9686,7 +9686,7 @@
               </a14:hiddenLine>
             </a:ext>
             <a:ext uri="{AF507438-7753-43e0-B8FC-AC1667EBCBE1}">
-              <a14:hiddenEffects xmlns:a14="http://schemas.microsoft.com/office/drawing/2010/main" xmlns="">
+              <a14:hiddenEffects xmlns="" xmlns:a14="http://schemas.microsoft.com/office/drawing/2010/main">
                 <a:effectLst>
                   <a:outerShdw blurRad="63500" dist="38099" dir="2700000" algn="ctr" rotWithShape="0">
                     <a:schemeClr val="bg2">
@@ -9736,17 +9736,17 @@
           <a:effectLst/>
           <a:extLst>
             <a:ext uri="{FAA26D3D-D897-4be2-8F04-BA451C77F1D7}">
-              <ma14:placeholderFlag xmlns:ma14="http://schemas.microsoft.com/office/mac/drawingml/2011/main" xmlns="" val="1"/>
+              <ma14:placeholderFlag xmlns="" xmlns:ma14="http://schemas.microsoft.com/office/mac/drawingml/2011/main" val="1"/>
             </a:ext>
             <a:ext uri="{909E8E84-426E-40dd-AFC4-6F175D3DCCD1}">
-              <a14:hiddenFill xmlns:a14="http://schemas.microsoft.com/office/drawing/2010/main" xmlns="">
+              <a14:hiddenFill xmlns="" xmlns:a14="http://schemas.microsoft.com/office/drawing/2010/main">
                 <a:solidFill>
                   <a:schemeClr val="accent1"/>
                 </a:solidFill>
               </a14:hiddenFill>
             </a:ext>
             <a:ext uri="{91240B29-F687-4f45-9708-019B960494DF}">
-              <a14:hiddenLine xmlns:a14="http://schemas.microsoft.com/office/drawing/2010/main" xmlns="" w="9525">
+              <a14:hiddenLine xmlns="" xmlns:a14="http://schemas.microsoft.com/office/drawing/2010/main" w="9525">
                 <a:solidFill>
                   <a:schemeClr val="tx1"/>
                 </a:solidFill>
@@ -9756,7 +9756,7 @@
               </a14:hiddenLine>
             </a:ext>
             <a:ext uri="{AF507438-7753-43e0-B8FC-AC1667EBCBE1}">
-              <a14:hiddenEffects xmlns:a14="http://schemas.microsoft.com/office/drawing/2010/main" xmlns="">
+              <a14:hiddenEffects xmlns="" xmlns:a14="http://schemas.microsoft.com/office/drawing/2010/main">
                 <a:effectLst>
                   <a:outerShdw blurRad="63500" dist="38099" dir="2700000" algn="ctr" rotWithShape="0">
                     <a:schemeClr val="bg2">
@@ -9809,17 +9809,17 @@
           <a:effectLst/>
           <a:extLst>
             <a:ext uri="{FAA26D3D-D897-4be2-8F04-BA451C77F1D7}">
-              <ma14:placeholderFlag xmlns:ma14="http://schemas.microsoft.com/office/mac/drawingml/2011/main" xmlns="" val="1"/>
+              <ma14:placeholderFlag xmlns="" xmlns:ma14="http://schemas.microsoft.com/office/mac/drawingml/2011/main" val="1"/>
             </a:ext>
             <a:ext uri="{909E8E84-426E-40dd-AFC4-6F175D3DCCD1}">
-              <a14:hiddenFill xmlns:a14="http://schemas.microsoft.com/office/drawing/2010/main" xmlns="">
+              <a14:hiddenFill xmlns="" xmlns:a14="http://schemas.microsoft.com/office/drawing/2010/main">
                 <a:solidFill>
                   <a:schemeClr val="accent1"/>
                 </a:solidFill>
               </a14:hiddenFill>
             </a:ext>
             <a:ext uri="{91240B29-F687-4f45-9708-019B960494DF}">
-              <a14:hiddenLine xmlns:a14="http://schemas.microsoft.com/office/drawing/2010/main" xmlns="" w="9525">
+              <a14:hiddenLine xmlns="" xmlns:a14="http://schemas.microsoft.com/office/drawing/2010/main" w="9525">
                 <a:solidFill>
                   <a:schemeClr val="tx1"/>
                 </a:solidFill>
@@ -9829,7 +9829,7 @@
               </a14:hiddenLine>
             </a:ext>
             <a:ext uri="{AF507438-7753-43e0-B8FC-AC1667EBCBE1}">
-              <a14:hiddenEffects xmlns:a14="http://schemas.microsoft.com/office/drawing/2010/main" xmlns="">
+              <a14:hiddenEffects xmlns="" xmlns:a14="http://schemas.microsoft.com/office/drawing/2010/main">
                 <a:effectLst>
                   <a:outerShdw blurRad="63500" dist="38099" dir="2700000" algn="ctr" rotWithShape="0">
                     <a:schemeClr val="bg2">
@@ -10378,14 +10378,14 @@
           </a:ln>
           <a:extLst>
             <a:ext uri="{909E8E84-426E-40dd-AFC4-6F175D3DCCD1}">
-              <a14:hiddenFill xmlns:a14="http://schemas.microsoft.com/office/drawing/2010/main" xmlns="">
+              <a14:hiddenFill xmlns="" xmlns:a14="http://schemas.microsoft.com/office/drawing/2010/main">
                 <a:solidFill>
                   <a:srgbClr val="FFFFFF"/>
                 </a:solidFill>
               </a14:hiddenFill>
             </a:ext>
             <a:ext uri="{91240B29-F687-4f45-9708-019B960494DF}">
-              <a14:hiddenLine xmlns:a14="http://schemas.microsoft.com/office/drawing/2010/main" xmlns="" w="9525">
+              <a14:hiddenLine xmlns="" xmlns:a14="http://schemas.microsoft.com/office/drawing/2010/main" w="9525">
                 <a:solidFill>
                   <a:srgbClr val="000000"/>
                 </a:solidFill>
@@ -10422,17 +10422,17 @@
           <a:effectLst/>
           <a:extLst>
             <a:ext uri="{FAA26D3D-D897-4be2-8F04-BA451C77F1D7}">
-              <ma14:placeholderFlag xmlns:ma14="http://schemas.microsoft.com/office/mac/drawingml/2011/main" xmlns="" val="1"/>
+              <ma14:placeholderFlag xmlns="" xmlns:ma14="http://schemas.microsoft.com/office/mac/drawingml/2011/main" val="1"/>
             </a:ext>
             <a:ext uri="{909E8E84-426E-40dd-AFC4-6F175D3DCCD1}">
-              <a14:hiddenFill xmlns:a14="http://schemas.microsoft.com/office/drawing/2010/main" xmlns="">
+              <a14:hiddenFill xmlns="" xmlns:a14="http://schemas.microsoft.com/office/drawing/2010/main">
                 <a:solidFill>
                   <a:schemeClr val="accent1"/>
                 </a:solidFill>
               </a14:hiddenFill>
             </a:ext>
             <a:ext uri="{91240B29-F687-4f45-9708-019B960494DF}">
-              <a14:hiddenLine xmlns:a14="http://schemas.microsoft.com/office/drawing/2010/main" xmlns="" w="9525">
+              <a14:hiddenLine xmlns="" xmlns:a14="http://schemas.microsoft.com/office/drawing/2010/main" w="9525">
                 <a:solidFill>
                   <a:schemeClr val="tx1"/>
                 </a:solidFill>
@@ -10442,7 +10442,7 @@
               </a14:hiddenLine>
             </a:ext>
             <a:ext uri="{AF507438-7753-43e0-B8FC-AC1667EBCBE1}">
-              <a14:hiddenEffects xmlns:a14="http://schemas.microsoft.com/office/drawing/2010/main" xmlns="">
+              <a14:hiddenEffects xmlns="" xmlns:a14="http://schemas.microsoft.com/office/drawing/2010/main">
                 <a:effectLst>
                   <a:outerShdw blurRad="63500" dist="38099" dir="2700000" algn="ctr" rotWithShape="0">
                     <a:schemeClr val="bg2">
@@ -10495,17 +10495,17 @@
           <a:effectLst/>
           <a:extLst>
             <a:ext uri="{FAA26D3D-D897-4be2-8F04-BA451C77F1D7}">
-              <ma14:placeholderFlag xmlns:ma14="http://schemas.microsoft.com/office/mac/drawingml/2011/main" xmlns="" val="1"/>
+              <ma14:placeholderFlag xmlns="" xmlns:ma14="http://schemas.microsoft.com/office/mac/drawingml/2011/main" val="1"/>
             </a:ext>
             <a:ext uri="{909E8E84-426E-40dd-AFC4-6F175D3DCCD1}">
-              <a14:hiddenFill xmlns:a14="http://schemas.microsoft.com/office/drawing/2010/main" xmlns="">
+              <a14:hiddenFill xmlns="" xmlns:a14="http://schemas.microsoft.com/office/drawing/2010/main">
                 <a:solidFill>
                   <a:schemeClr val="accent1"/>
                 </a:solidFill>
               </a14:hiddenFill>
             </a:ext>
             <a:ext uri="{91240B29-F687-4f45-9708-019B960494DF}">
-              <a14:hiddenLine xmlns:a14="http://schemas.microsoft.com/office/drawing/2010/main" xmlns="" w="9525">
+              <a14:hiddenLine xmlns="" xmlns:a14="http://schemas.microsoft.com/office/drawing/2010/main" w="9525">
                 <a:solidFill>
                   <a:schemeClr val="tx1"/>
                 </a:solidFill>
@@ -10515,7 +10515,7 @@
               </a14:hiddenLine>
             </a:ext>
             <a:ext uri="{AF507438-7753-43e0-B8FC-AC1667EBCBE1}">
-              <a14:hiddenEffects xmlns:a14="http://schemas.microsoft.com/office/drawing/2010/main" xmlns="">
+              <a14:hiddenEffects xmlns="" xmlns:a14="http://schemas.microsoft.com/office/drawing/2010/main">
                 <a:effectLst>
                   <a:outerShdw blurRad="63500" dist="38099" dir="2700000" algn="ctr" rotWithShape="0">
                     <a:schemeClr val="bg2">
@@ -10590,17 +10590,17 @@
           <a:effectLst/>
           <a:extLst>
             <a:ext uri="{FAA26D3D-D897-4be2-8F04-BA451C77F1D7}">
-              <ma14:placeholderFlag xmlns:ma14="http://schemas.microsoft.com/office/mac/drawingml/2011/main" xmlns="" val="1"/>
+              <ma14:placeholderFlag xmlns="" xmlns:ma14="http://schemas.microsoft.com/office/mac/drawingml/2011/main" val="1"/>
             </a:ext>
             <a:ext uri="{909E8E84-426E-40dd-AFC4-6F175D3DCCD1}">
-              <a14:hiddenFill xmlns:a14="http://schemas.microsoft.com/office/drawing/2010/main" xmlns="">
+              <a14:hiddenFill xmlns="" xmlns:a14="http://schemas.microsoft.com/office/drawing/2010/main">
                 <a:solidFill>
                   <a:schemeClr val="accent1"/>
                 </a:solidFill>
               </a14:hiddenFill>
             </a:ext>
             <a:ext uri="{91240B29-F687-4f45-9708-019B960494DF}">
-              <a14:hiddenLine xmlns:a14="http://schemas.microsoft.com/office/drawing/2010/main" xmlns="" w="9525">
+              <a14:hiddenLine xmlns="" xmlns:a14="http://schemas.microsoft.com/office/drawing/2010/main" w="9525">
                 <a:solidFill>
                   <a:schemeClr val="tx1"/>
                 </a:solidFill>
@@ -10610,7 +10610,7 @@
               </a14:hiddenLine>
             </a:ext>
             <a:ext uri="{AF507438-7753-43e0-B8FC-AC1667EBCBE1}">
-              <a14:hiddenEffects xmlns:a14="http://schemas.microsoft.com/office/drawing/2010/main" xmlns="">
+              <a14:hiddenEffects xmlns="" xmlns:a14="http://schemas.microsoft.com/office/drawing/2010/main">
                 <a:effectLst>
                   <a:outerShdw blurRad="63500" dist="38099" dir="2700000" algn="ctr" rotWithShape="0">
                     <a:schemeClr val="bg2">
@@ -10672,17 +10672,17 @@
           <a:effectLst/>
           <a:extLst>
             <a:ext uri="{FAA26D3D-D897-4be2-8F04-BA451C77F1D7}">
-              <ma14:placeholderFlag xmlns:ma14="http://schemas.microsoft.com/office/mac/drawingml/2011/main" xmlns="" val="1"/>
+              <ma14:placeholderFlag xmlns="" xmlns:ma14="http://schemas.microsoft.com/office/mac/drawingml/2011/main" val="1"/>
             </a:ext>
             <a:ext uri="{909E8E84-426E-40dd-AFC4-6F175D3DCCD1}">
-              <a14:hiddenFill xmlns:a14="http://schemas.microsoft.com/office/drawing/2010/main" xmlns="">
+              <a14:hiddenFill xmlns="" xmlns:a14="http://schemas.microsoft.com/office/drawing/2010/main">
                 <a:solidFill>
                   <a:schemeClr val="accent1"/>
                 </a:solidFill>
               </a14:hiddenFill>
             </a:ext>
             <a:ext uri="{91240B29-F687-4f45-9708-019B960494DF}">
-              <a14:hiddenLine xmlns:a14="http://schemas.microsoft.com/office/drawing/2010/main" xmlns="" w="9525">
+              <a14:hiddenLine xmlns="" xmlns:a14="http://schemas.microsoft.com/office/drawing/2010/main" w="9525">
                 <a:solidFill>
                   <a:schemeClr val="tx1"/>
                 </a:solidFill>
@@ -10692,7 +10692,7 @@
               </a14:hiddenLine>
             </a:ext>
             <a:ext uri="{AF507438-7753-43e0-B8FC-AC1667EBCBE1}">
-              <a14:hiddenEffects xmlns:a14="http://schemas.microsoft.com/office/drawing/2010/main" xmlns="">
+              <a14:hiddenEffects xmlns="" xmlns:a14="http://schemas.microsoft.com/office/drawing/2010/main">
                 <a:effectLst>
                   <a:outerShdw blurRad="63500" dist="38099" dir="2700000" algn="ctr" rotWithShape="0">
                     <a:schemeClr val="bg2">
@@ -11238,14 +11238,14 @@
           </a:ln>
           <a:extLst>
             <a:ext uri="{909E8E84-426E-40dd-AFC4-6F175D3DCCD1}">
-              <a14:hiddenFill xmlns:a14="http://schemas.microsoft.com/office/drawing/2010/main" xmlns="">
+              <a14:hiddenFill xmlns="" xmlns:a14="http://schemas.microsoft.com/office/drawing/2010/main">
                 <a:solidFill>
                   <a:srgbClr val="FFFFFF"/>
                 </a:solidFill>
               </a14:hiddenFill>
             </a:ext>
             <a:ext uri="{91240B29-F687-4f45-9708-019B960494DF}">
-              <a14:hiddenLine xmlns:a14="http://schemas.microsoft.com/office/drawing/2010/main" xmlns="" w="9525">
+              <a14:hiddenLine xmlns="" xmlns:a14="http://schemas.microsoft.com/office/drawing/2010/main" w="9525">
                 <a:solidFill>
                   <a:srgbClr val="000000"/>
                 </a:solidFill>
@@ -11282,17 +11282,17 @@
           <a:effectLst/>
           <a:extLst>
             <a:ext uri="{FAA26D3D-D897-4be2-8F04-BA451C77F1D7}">
-              <ma14:placeholderFlag xmlns:ma14="http://schemas.microsoft.com/office/mac/drawingml/2011/main" xmlns="" val="1"/>
+              <ma14:placeholderFlag xmlns="" xmlns:ma14="http://schemas.microsoft.com/office/mac/drawingml/2011/main" val="1"/>
             </a:ext>
             <a:ext uri="{909E8E84-426E-40dd-AFC4-6F175D3DCCD1}">
-              <a14:hiddenFill xmlns:a14="http://schemas.microsoft.com/office/drawing/2010/main" xmlns="">
+              <a14:hiddenFill xmlns="" xmlns:a14="http://schemas.microsoft.com/office/drawing/2010/main">
                 <a:solidFill>
                   <a:schemeClr val="accent1"/>
                 </a:solidFill>
               </a14:hiddenFill>
             </a:ext>
             <a:ext uri="{91240B29-F687-4f45-9708-019B960494DF}">
-              <a14:hiddenLine xmlns:a14="http://schemas.microsoft.com/office/drawing/2010/main" xmlns="" w="9525">
+              <a14:hiddenLine xmlns="" xmlns:a14="http://schemas.microsoft.com/office/drawing/2010/main" w="9525">
                 <a:solidFill>
                   <a:schemeClr val="tx1"/>
                 </a:solidFill>
@@ -11302,7 +11302,7 @@
               </a14:hiddenLine>
             </a:ext>
             <a:ext uri="{AF507438-7753-43e0-B8FC-AC1667EBCBE1}">
-              <a14:hiddenEffects xmlns:a14="http://schemas.microsoft.com/office/drawing/2010/main" xmlns="">
+              <a14:hiddenEffects xmlns="" xmlns:a14="http://schemas.microsoft.com/office/drawing/2010/main">
                 <a:effectLst>
                   <a:outerShdw blurRad="63500" dist="38099" dir="2700000" algn="ctr" rotWithShape="0">
                     <a:schemeClr val="bg2">
@@ -11355,17 +11355,17 @@
           <a:effectLst/>
           <a:extLst>
             <a:ext uri="{FAA26D3D-D897-4be2-8F04-BA451C77F1D7}">
-              <ma14:placeholderFlag xmlns:ma14="http://schemas.microsoft.com/office/mac/drawingml/2011/main" xmlns="" val="1"/>
+              <ma14:placeholderFlag xmlns="" xmlns:ma14="http://schemas.microsoft.com/office/mac/drawingml/2011/main" val="1"/>
             </a:ext>
             <a:ext uri="{909E8E84-426E-40dd-AFC4-6F175D3DCCD1}">
-              <a14:hiddenFill xmlns:a14="http://schemas.microsoft.com/office/drawing/2010/main" xmlns="">
+              <a14:hiddenFill xmlns="" xmlns:a14="http://schemas.microsoft.com/office/drawing/2010/main">
                 <a:solidFill>
                   <a:schemeClr val="accent1"/>
                 </a:solidFill>
               </a14:hiddenFill>
             </a:ext>
             <a:ext uri="{91240B29-F687-4f45-9708-019B960494DF}">
-              <a14:hiddenLine xmlns:a14="http://schemas.microsoft.com/office/drawing/2010/main" xmlns="" w="9525">
+              <a14:hiddenLine xmlns="" xmlns:a14="http://schemas.microsoft.com/office/drawing/2010/main" w="9525">
                 <a:solidFill>
                   <a:schemeClr val="tx1"/>
                 </a:solidFill>
@@ -11375,7 +11375,7 @@
               </a14:hiddenLine>
             </a:ext>
             <a:ext uri="{AF507438-7753-43e0-B8FC-AC1667EBCBE1}">
-              <a14:hiddenEffects xmlns:a14="http://schemas.microsoft.com/office/drawing/2010/main" xmlns="">
+              <a14:hiddenEffects xmlns="" xmlns:a14="http://schemas.microsoft.com/office/drawing/2010/main">
                 <a:effectLst>
                   <a:outerShdw blurRad="63500" dist="38099" dir="2700000" algn="ctr" rotWithShape="0">
                     <a:schemeClr val="bg2">
@@ -11450,17 +11450,17 @@
           <a:effectLst/>
           <a:extLst>
             <a:ext uri="{FAA26D3D-D897-4be2-8F04-BA451C77F1D7}">
-              <ma14:placeholderFlag xmlns:ma14="http://schemas.microsoft.com/office/mac/drawingml/2011/main" xmlns="" val="1"/>
+              <ma14:placeholderFlag xmlns="" xmlns:ma14="http://schemas.microsoft.com/office/mac/drawingml/2011/main" val="1"/>
             </a:ext>
             <a:ext uri="{909E8E84-426E-40dd-AFC4-6F175D3DCCD1}">
-              <a14:hiddenFill xmlns:a14="http://schemas.microsoft.com/office/drawing/2010/main" xmlns="">
+              <a14:hiddenFill xmlns="" xmlns:a14="http://schemas.microsoft.com/office/drawing/2010/main">
                 <a:solidFill>
                   <a:schemeClr val="accent1"/>
                 </a:solidFill>
               </a14:hiddenFill>
             </a:ext>
             <a:ext uri="{91240B29-F687-4f45-9708-019B960494DF}">
-              <a14:hiddenLine xmlns:a14="http://schemas.microsoft.com/office/drawing/2010/main" xmlns="" w="9525">
+              <a14:hiddenLine xmlns="" xmlns:a14="http://schemas.microsoft.com/office/drawing/2010/main" w="9525">
                 <a:solidFill>
                   <a:schemeClr val="tx1"/>
                 </a:solidFill>
@@ -11470,7 +11470,7 @@
               </a14:hiddenLine>
             </a:ext>
             <a:ext uri="{AF507438-7753-43e0-B8FC-AC1667EBCBE1}">
-              <a14:hiddenEffects xmlns:a14="http://schemas.microsoft.com/office/drawing/2010/main" xmlns="">
+              <a14:hiddenEffects xmlns="" xmlns:a14="http://schemas.microsoft.com/office/drawing/2010/main">
                 <a:effectLst>
                   <a:outerShdw blurRad="63500" dist="38099" dir="2700000" algn="ctr" rotWithShape="0">
                     <a:schemeClr val="bg2">
@@ -11540,17 +11540,17 @@
           <a:effectLst/>
           <a:extLst>
             <a:ext uri="{FAA26D3D-D897-4be2-8F04-BA451C77F1D7}">
-              <ma14:placeholderFlag xmlns:ma14="http://schemas.microsoft.com/office/mac/drawingml/2011/main" xmlns="" val="1"/>
+              <ma14:placeholderFlag xmlns="" xmlns:ma14="http://schemas.microsoft.com/office/mac/drawingml/2011/main" val="1"/>
             </a:ext>
             <a:ext uri="{909E8E84-426E-40dd-AFC4-6F175D3DCCD1}">
-              <a14:hiddenFill xmlns:a14="http://schemas.microsoft.com/office/drawing/2010/main" xmlns="">
+              <a14:hiddenFill xmlns="" xmlns:a14="http://schemas.microsoft.com/office/drawing/2010/main">
                 <a:solidFill>
                   <a:schemeClr val="accent1"/>
                 </a:solidFill>
               </a14:hiddenFill>
             </a:ext>
             <a:ext uri="{91240B29-F687-4f45-9708-019B960494DF}">
-              <a14:hiddenLine xmlns:a14="http://schemas.microsoft.com/office/drawing/2010/main" xmlns="" w="9525">
+              <a14:hiddenLine xmlns="" xmlns:a14="http://schemas.microsoft.com/office/drawing/2010/main" w="9525">
                 <a:solidFill>
                   <a:schemeClr val="tx1"/>
                 </a:solidFill>
@@ -11560,7 +11560,7 @@
               </a14:hiddenLine>
             </a:ext>
             <a:ext uri="{AF507438-7753-43e0-B8FC-AC1667EBCBE1}">
-              <a14:hiddenEffects xmlns:a14="http://schemas.microsoft.com/office/drawing/2010/main" xmlns="">
+              <a14:hiddenEffects xmlns="" xmlns:a14="http://schemas.microsoft.com/office/drawing/2010/main">
                 <a:effectLst>
                   <a:outerShdw blurRad="63500" dist="38099" dir="2700000" algn="ctr" rotWithShape="0">
                     <a:schemeClr val="bg2">
@@ -12268,17 +12268,17 @@
           <a:effectLst/>
           <a:extLst>
             <a:ext uri="{FAA26D3D-D897-4be2-8F04-BA451C77F1D7}">
-              <ma14:placeholderFlag xmlns:ma14="http://schemas.microsoft.com/office/mac/drawingml/2011/main" xmlns="" val="1"/>
+              <ma14:placeholderFlag xmlns="" xmlns:ma14="http://schemas.microsoft.com/office/mac/drawingml/2011/main" val="1"/>
             </a:ext>
             <a:ext uri="{909E8E84-426E-40dd-AFC4-6F175D3DCCD1}">
-              <a14:hiddenFill xmlns:a14="http://schemas.microsoft.com/office/drawing/2010/main" xmlns="">
+              <a14:hiddenFill xmlns="" xmlns:a14="http://schemas.microsoft.com/office/drawing/2010/main">
                 <a:solidFill>
                   <a:schemeClr val="accent1"/>
                 </a:solidFill>
               </a14:hiddenFill>
             </a:ext>
             <a:ext uri="{91240B29-F687-4f45-9708-019B960494DF}">
-              <a14:hiddenLine xmlns:a14="http://schemas.microsoft.com/office/drawing/2010/main" xmlns="" w="9525">
+              <a14:hiddenLine xmlns="" xmlns:a14="http://schemas.microsoft.com/office/drawing/2010/main" w="9525">
                 <a:solidFill>
                   <a:schemeClr val="tx1"/>
                 </a:solidFill>
@@ -12288,7 +12288,7 @@
               </a14:hiddenLine>
             </a:ext>
             <a:ext uri="{AF507438-7753-43e0-B8FC-AC1667EBCBE1}">
-              <a14:hiddenEffects xmlns:a14="http://schemas.microsoft.com/office/drawing/2010/main" xmlns="">
+              <a14:hiddenEffects xmlns="" xmlns:a14="http://schemas.microsoft.com/office/drawing/2010/main">
                 <a:effectLst>
                   <a:outerShdw blurRad="63500" dist="38099" dir="2700000" algn="ctr" rotWithShape="0">
                     <a:schemeClr val="bg2">
@@ -13513,20 +13513,54 @@
           <a:p>
             <a:r>
               <a:rPr lang="en-GB" dirty="0"/>
+              <a:t>Anything missing from mail system point of view?</a:t>
+            </a:r>
+          </a:p>
+          <a:p>
+            <a:endParaRPr lang="en-GB" sz="1600" dirty="0"/>
+          </a:p>
+          <a:p>
+            <a:r>
+              <a:rPr lang="en-GB" dirty="0"/>
               <a:t>What is the common practice invite in your system for the email containing an invite after inserting the event into the users calendar?</a:t>
             </a:r>
           </a:p>
           <a:p>
-            <a:endParaRPr lang="en-GB" dirty="0"/>
+            <a:endParaRPr lang="en-GB" sz="1600" dirty="0"/>
           </a:p>
           <a:p>
             <a:r>
               <a:rPr lang="en-GB" dirty="0"/>
-              <a:t>What would be necessary from calendaring system to be provided to allow receiving mail systems to inform sending system about abuse (maybe even days/weeks after the incident happened)?</a:t>
-            </a:r>
-          </a:p>
-          <a:p>
-            <a:endParaRPr lang="en-GB" dirty="0"/>
+              <a:t>What actions should be triggered in mail system, when user marks an event as spam in calendar?</a:t>
+            </a:r>
+          </a:p>
+          <a:p>
+            <a:endParaRPr lang="en-GB" sz="1600" dirty="0"/>
+          </a:p>
+          <a:p>
+            <a:r>
+              <a:rPr lang="en-GB" dirty="0"/>
+              <a:t>to support actions e.g. </a:t>
+            </a:r>
+            <a:r>
+              <a:rPr lang="en-GB" dirty="0" err="1"/>
+              <a:t>FeedbackLoop</a:t>
+            </a:r>
+            <a:r>
+              <a:rPr lang="en-GB" dirty="0"/>
+              <a:t> (FBL), what information needed from calendaring system (</a:t>
+            </a:r>
+            <a:r>
+              <a:rPr lang="en-GB" dirty="0" err="1"/>
+              <a:t>MailID</a:t>
+            </a:r>
+            <a:r>
+              <a:rPr lang="en-GB" dirty="0"/>
+              <a:t>?, ...) to allow receiving mail systems to inform sending system about abuse (maybe even days/weeks after the incident happened)?</a:t>
+            </a:r>
+          </a:p>
+          <a:p>
+            <a:endParaRPr lang="en-GB" sz="1600" dirty="0"/>
           </a:p>
           <a:p>
             <a:r>
@@ -14768,14 +14802,14 @@
           <a:effectLst/>
           <a:extLst>
             <a:ext uri="{909E8E84-426E-40dd-AFC4-6F175D3DCCD1}">
-              <a14:hiddenFill xmlns:a14="http://schemas.microsoft.com/office/drawing/2010/main" xmlns="">
+              <a14:hiddenFill xmlns="" xmlns:a14="http://schemas.microsoft.com/office/drawing/2010/main">
                 <a:solidFill>
                   <a:schemeClr val="accent1"/>
                 </a:solidFill>
               </a14:hiddenFill>
             </a:ext>
             <a:ext uri="{91240B29-F687-4f45-9708-019B960494DF}">
-              <a14:hiddenLine xmlns:a14="http://schemas.microsoft.com/office/drawing/2010/main" xmlns="" w="9525">
+              <a14:hiddenLine xmlns="" xmlns:a14="http://schemas.microsoft.com/office/drawing/2010/main" w="9525">
                 <a:solidFill>
                   <a:schemeClr val="tx1"/>
                 </a:solidFill>
@@ -14785,7 +14819,7 @@
               </a14:hiddenLine>
             </a:ext>
             <a:ext uri="{AF507438-7753-43e0-B8FC-AC1667EBCBE1}">
-              <a14:hiddenEffects xmlns:a14="http://schemas.microsoft.com/office/drawing/2010/main" xmlns="">
+              <a14:hiddenEffects xmlns="" xmlns:a14="http://schemas.microsoft.com/office/drawing/2010/main">
                 <a:effectLst>
                   <a:outerShdw blurRad="63500" dist="38099" dir="2700000" algn="ctr" rotWithShape="0">
                     <a:schemeClr val="bg2">
@@ -14862,14 +14896,14 @@
           <a:effectLst/>
           <a:extLst>
             <a:ext uri="{909E8E84-426E-40dd-AFC4-6F175D3DCCD1}">
-              <a14:hiddenFill xmlns:a14="http://schemas.microsoft.com/office/drawing/2010/main" xmlns="">
+              <a14:hiddenFill xmlns="" xmlns:a14="http://schemas.microsoft.com/office/drawing/2010/main">
                 <a:solidFill>
                   <a:schemeClr val="accent1"/>
                 </a:solidFill>
               </a14:hiddenFill>
             </a:ext>
             <a:ext uri="{91240B29-F687-4f45-9708-019B960494DF}">
-              <a14:hiddenLine xmlns:a14="http://schemas.microsoft.com/office/drawing/2010/main" xmlns="" w="9525">
+              <a14:hiddenLine xmlns="" xmlns:a14="http://schemas.microsoft.com/office/drawing/2010/main" w="9525">
                 <a:solidFill>
                   <a:schemeClr val="tx1"/>
                 </a:solidFill>
@@ -14879,7 +14913,7 @@
               </a14:hiddenLine>
             </a:ext>
             <a:ext uri="{AF507438-7753-43e0-B8FC-AC1667EBCBE1}">
-              <a14:hiddenEffects xmlns:a14="http://schemas.microsoft.com/office/drawing/2010/main" xmlns="">
+              <a14:hiddenEffects xmlns="" xmlns:a14="http://schemas.microsoft.com/office/drawing/2010/main">
                 <a:effectLst>
                   <a:outerShdw blurRad="63500" dist="38099" dir="2700000" algn="ctr" rotWithShape="0">
                     <a:schemeClr val="bg2">

</xml_diff>

<commit_message>
Updated version now also with numbers from cyren
</commit_message>
<xml_diff>
--- a/Process_M3AAWG/2018-06-M3AAWG43-CalendarSpam.pptx
+++ b/Process_M3AAWG/2018-06-M3AAWG43-CalendarSpam.pptx
@@ -21,7 +21,7 @@
     <p:sldId id="286" r:id="rId9"/>
     <p:sldId id="290" r:id="rId10"/>
     <p:sldId id="282" r:id="rId11"/>
-    <p:sldId id="285" r:id="rId12"/>
+    <p:sldId id="291" r:id="rId12"/>
     <p:sldId id="283" r:id="rId13"/>
     <p:sldId id="284" r:id="rId14"/>
     <p:sldId id="287" r:id="rId15"/>
@@ -189,6 +189,18 @@
     </p:ext>
   </p:extLst>
 </p:presentation>
+</file>
+
+<file path=ppt/commentAuthors.xml><?xml version="1.0" encoding="utf-8"?>
+<p:cmAuthorLst xmlns:a="http://schemas.openxmlformats.org/drawingml/2006/main" xmlns:r="http://schemas.openxmlformats.org/officeDocument/2006/relationships" xmlns:p="http://schemas.openxmlformats.org/presentationml/2006/main">
+  <p:cmAuthor id="1" name="Thomas Schäfer" initials="TS" lastIdx="1" clrIdx="0">
+    <p:extLst>
+      <p:ext uri="{19B8F6BF-5375-455C-9EA6-DF929625EA0E}">
+        <p15:presenceInfo xmlns:p15="http://schemas.microsoft.com/office/powerpoint/2012/main" userId="Thomas Schäfer" providerId="None"/>
+      </p:ext>
+    </p:extLst>
+  </p:cmAuthor>
+</p:cmAuthorLst>
 </file>
 
 <file path=ppt/diagrams/colors1.xml><?xml version="1.0" encoding="utf-8"?>
@@ -3097,7 +3109,7 @@
               <a:pPr>
                 <a:defRPr/>
               </a:pPr>
-              <a:t>5/29/18</a:t>
+              <a:t>5/30/18</a:t>
             </a:fld>
             <a:endParaRPr lang="en-US"/>
           </a:p>
@@ -3240,17 +3252,17 @@
           <a:effectLst/>
           <a:extLst>
             <a:ext uri="{FAA26D3D-D897-4be2-8F04-BA451C77F1D7}">
-              <ma14:placeholderFlag xmlns="" xmlns:ma14="http://schemas.microsoft.com/office/mac/drawingml/2011/main" val="1"/>
+              <ma14:placeholderFlag xmlns:ma14="http://schemas.microsoft.com/office/mac/drawingml/2011/main" xmlns="" val="1"/>
             </a:ext>
             <a:ext uri="{909E8E84-426E-40dd-AFC4-6F175D3DCCD1}">
-              <a14:hiddenFill xmlns="" xmlns:a14="http://schemas.microsoft.com/office/drawing/2010/main">
+              <a14:hiddenFill xmlns:a14="http://schemas.microsoft.com/office/drawing/2010/main" xmlns="">
                 <a:solidFill>
                   <a:schemeClr val="accent1"/>
                 </a:solidFill>
               </a14:hiddenFill>
             </a:ext>
             <a:ext uri="{91240B29-F687-4f45-9708-019B960494DF}">
-              <a14:hiddenLine xmlns="" xmlns:a14="http://schemas.microsoft.com/office/drawing/2010/main" w="9525">
+              <a14:hiddenLine xmlns:a14="http://schemas.microsoft.com/office/drawing/2010/main" xmlns="" w="9525">
                 <a:solidFill>
                   <a:schemeClr val="tx1"/>
                 </a:solidFill>
@@ -3260,7 +3272,7 @@
               </a14:hiddenLine>
             </a:ext>
             <a:ext uri="{AF507438-7753-43e0-B8FC-AC1667EBCBE1}">
-              <a14:hiddenEffects xmlns="" xmlns:a14="http://schemas.microsoft.com/office/drawing/2010/main">
+              <a14:hiddenEffects xmlns:a14="http://schemas.microsoft.com/office/drawing/2010/main" xmlns="">
                 <a:effectLst>
                   <a:outerShdw blurRad="63500" dist="38099" dir="2700000" algn="ctr" rotWithShape="0">
                     <a:schemeClr val="bg2">
@@ -3318,17 +3330,17 @@
           <a:effectLst/>
           <a:extLst>
             <a:ext uri="{FAA26D3D-D897-4be2-8F04-BA451C77F1D7}">
-              <ma14:placeholderFlag xmlns="" xmlns:ma14="http://schemas.microsoft.com/office/mac/drawingml/2011/main" val="1"/>
+              <ma14:placeholderFlag xmlns:ma14="http://schemas.microsoft.com/office/mac/drawingml/2011/main" xmlns="" val="1"/>
             </a:ext>
             <a:ext uri="{909E8E84-426E-40dd-AFC4-6F175D3DCCD1}">
-              <a14:hiddenFill xmlns="" xmlns:a14="http://schemas.microsoft.com/office/drawing/2010/main">
+              <a14:hiddenFill xmlns:a14="http://schemas.microsoft.com/office/drawing/2010/main" xmlns="">
                 <a:solidFill>
                   <a:schemeClr val="accent1"/>
                 </a:solidFill>
               </a14:hiddenFill>
             </a:ext>
             <a:ext uri="{91240B29-F687-4f45-9708-019B960494DF}">
-              <a14:hiddenLine xmlns="" xmlns:a14="http://schemas.microsoft.com/office/drawing/2010/main" w="9525">
+              <a14:hiddenLine xmlns:a14="http://schemas.microsoft.com/office/drawing/2010/main" xmlns="" w="9525">
                 <a:solidFill>
                   <a:schemeClr val="tx1"/>
                 </a:solidFill>
@@ -3338,7 +3350,7 @@
               </a14:hiddenLine>
             </a:ext>
             <a:ext uri="{AF507438-7753-43e0-B8FC-AC1667EBCBE1}">
-              <a14:hiddenEffects xmlns="" xmlns:a14="http://schemas.microsoft.com/office/drawing/2010/main">
+              <a14:hiddenEffects xmlns:a14="http://schemas.microsoft.com/office/drawing/2010/main" xmlns="">
                 <a:effectLst>
                   <a:outerShdw blurRad="63500" dist="38099" dir="2700000" algn="ctr" rotWithShape="0">
                     <a:schemeClr val="bg2">
@@ -3401,7 +3413,7 @@
           <a:effectLst/>
           <a:extLst>
             <a:ext uri="{AF507438-7753-43e0-B8FC-AC1667EBCBE1}">
-              <a14:hiddenEffects xmlns="" xmlns:a14="http://schemas.microsoft.com/office/drawing/2010/main">
+              <a14:hiddenEffects xmlns:a14="http://schemas.microsoft.com/office/drawing/2010/main" xmlns="">
                 <a:effectLst>
                   <a:outerShdw blurRad="63500" dist="38099" dir="2700000" algn="ctr" rotWithShape="0">
                     <a:srgbClr val="000000">
@@ -3412,7 +3424,7 @@
               </a14:hiddenEffects>
             </a:ext>
             <a:ext uri="{53640926-AAD7-44d8-BBD7-CCE9431645EC}">
-              <a14:shadowObscured xmlns="" xmlns:a14="http://schemas.microsoft.com/office/drawing/2010/main" val="1"/>
+              <a14:shadowObscured xmlns:a14="http://schemas.microsoft.com/office/drawing/2010/main" xmlns="" val="1"/>
             </a:ext>
           </a:extLst>
         </p:spPr>
@@ -3442,17 +3454,17 @@
           <a:effectLst/>
           <a:extLst>
             <a:ext uri="{FAA26D3D-D897-4be2-8F04-BA451C77F1D7}">
-              <ma14:placeholderFlag xmlns="" xmlns:ma14="http://schemas.microsoft.com/office/mac/drawingml/2011/main" val="1"/>
+              <ma14:placeholderFlag xmlns:ma14="http://schemas.microsoft.com/office/mac/drawingml/2011/main" xmlns="" val="1"/>
             </a:ext>
             <a:ext uri="{909E8E84-426E-40dd-AFC4-6F175D3DCCD1}">
-              <a14:hiddenFill xmlns="" xmlns:a14="http://schemas.microsoft.com/office/drawing/2010/main">
+              <a14:hiddenFill xmlns:a14="http://schemas.microsoft.com/office/drawing/2010/main" xmlns="">
                 <a:solidFill>
                   <a:schemeClr val="accent1"/>
                 </a:solidFill>
               </a14:hiddenFill>
             </a:ext>
             <a:ext uri="{91240B29-F687-4f45-9708-019B960494DF}">
-              <a14:hiddenLine xmlns="" xmlns:a14="http://schemas.microsoft.com/office/drawing/2010/main" w="9525">
+              <a14:hiddenLine xmlns:a14="http://schemas.microsoft.com/office/drawing/2010/main" xmlns="" w="9525">
                 <a:solidFill>
                   <a:schemeClr val="tx1"/>
                 </a:solidFill>
@@ -3462,7 +3474,7 @@
               </a14:hiddenLine>
             </a:ext>
             <a:ext uri="{AF507438-7753-43e0-B8FC-AC1667EBCBE1}">
-              <a14:hiddenEffects xmlns="" xmlns:a14="http://schemas.microsoft.com/office/drawing/2010/main">
+              <a14:hiddenEffects xmlns:a14="http://schemas.microsoft.com/office/drawing/2010/main" xmlns="">
                 <a:effectLst>
                   <a:outerShdw blurRad="63500" dist="38099" dir="2700000" algn="ctr" rotWithShape="0">
                     <a:schemeClr val="bg2">
@@ -3543,17 +3555,17 @@
           <a:effectLst/>
           <a:extLst>
             <a:ext uri="{FAA26D3D-D897-4be2-8F04-BA451C77F1D7}">
-              <ma14:placeholderFlag xmlns="" xmlns:ma14="http://schemas.microsoft.com/office/mac/drawingml/2011/main" val="1"/>
+              <ma14:placeholderFlag xmlns:ma14="http://schemas.microsoft.com/office/mac/drawingml/2011/main" xmlns="" val="1"/>
             </a:ext>
             <a:ext uri="{909E8E84-426E-40dd-AFC4-6F175D3DCCD1}">
-              <a14:hiddenFill xmlns="" xmlns:a14="http://schemas.microsoft.com/office/drawing/2010/main">
+              <a14:hiddenFill xmlns:a14="http://schemas.microsoft.com/office/drawing/2010/main" xmlns="">
                 <a:solidFill>
                   <a:schemeClr val="accent1"/>
                 </a:solidFill>
               </a14:hiddenFill>
             </a:ext>
             <a:ext uri="{91240B29-F687-4f45-9708-019B960494DF}">
-              <a14:hiddenLine xmlns="" xmlns:a14="http://schemas.microsoft.com/office/drawing/2010/main" w="9525">
+              <a14:hiddenLine xmlns:a14="http://schemas.microsoft.com/office/drawing/2010/main" xmlns="" w="9525">
                 <a:solidFill>
                   <a:schemeClr val="tx1"/>
                 </a:solidFill>
@@ -3563,7 +3575,7 @@
               </a14:hiddenLine>
             </a:ext>
             <a:ext uri="{AF507438-7753-43e0-B8FC-AC1667EBCBE1}">
-              <a14:hiddenEffects xmlns="" xmlns:a14="http://schemas.microsoft.com/office/drawing/2010/main">
+              <a14:hiddenEffects xmlns:a14="http://schemas.microsoft.com/office/drawing/2010/main" xmlns="">
                 <a:effectLst>
                   <a:outerShdw blurRad="63500" dist="38099" dir="2700000" algn="ctr" rotWithShape="0">
                     <a:schemeClr val="bg2">
@@ -3621,17 +3633,17 @@
           <a:effectLst/>
           <a:extLst>
             <a:ext uri="{FAA26D3D-D897-4be2-8F04-BA451C77F1D7}">
-              <ma14:placeholderFlag xmlns="" xmlns:ma14="http://schemas.microsoft.com/office/mac/drawingml/2011/main" val="1"/>
+              <ma14:placeholderFlag xmlns:ma14="http://schemas.microsoft.com/office/mac/drawingml/2011/main" xmlns="" val="1"/>
             </a:ext>
             <a:ext uri="{909E8E84-426E-40dd-AFC4-6F175D3DCCD1}">
-              <a14:hiddenFill xmlns="" xmlns:a14="http://schemas.microsoft.com/office/drawing/2010/main">
+              <a14:hiddenFill xmlns:a14="http://schemas.microsoft.com/office/drawing/2010/main" xmlns="">
                 <a:solidFill>
                   <a:schemeClr val="accent1"/>
                 </a:solidFill>
               </a14:hiddenFill>
             </a:ext>
             <a:ext uri="{91240B29-F687-4f45-9708-019B960494DF}">
-              <a14:hiddenLine xmlns="" xmlns:a14="http://schemas.microsoft.com/office/drawing/2010/main" w="9525">
+              <a14:hiddenLine xmlns:a14="http://schemas.microsoft.com/office/drawing/2010/main" xmlns="" w="9525">
                 <a:solidFill>
                   <a:schemeClr val="tx1"/>
                 </a:solidFill>
@@ -3641,7 +3653,7 @@
               </a14:hiddenLine>
             </a:ext>
             <a:ext uri="{AF507438-7753-43e0-B8FC-AC1667EBCBE1}">
-              <a14:hiddenEffects xmlns="" xmlns:a14="http://schemas.microsoft.com/office/drawing/2010/main">
+              <a14:hiddenEffects xmlns:a14="http://schemas.microsoft.com/office/drawing/2010/main" xmlns="">
                 <a:effectLst>
                   <a:outerShdw blurRad="63500" dist="38099" dir="2700000" algn="ctr" rotWithShape="0">
                     <a:schemeClr val="bg2">
@@ -4055,7 +4067,7 @@
           <a:ln/>
           <a:extLst>
             <a:ext uri="{FAA26D3D-D897-4be2-8F04-BA451C77F1D7}">
-              <ma14:placeholderFlag xmlns="" xmlns:ma14="http://schemas.microsoft.com/office/mac/drawingml/2011/main" val="1"/>
+              <ma14:placeholderFlag xmlns:ma14="http://schemas.microsoft.com/office/mac/drawingml/2011/main" xmlns="" val="1"/>
             </a:ext>
           </a:extLst>
         </p:spPr>
@@ -9627,14 +9639,14 @@
           </a:ln>
           <a:extLst>
             <a:ext uri="{909E8E84-426E-40dd-AFC4-6F175D3DCCD1}">
-              <a14:hiddenFill xmlns="" xmlns:a14="http://schemas.microsoft.com/office/drawing/2010/main">
+              <a14:hiddenFill xmlns:a14="http://schemas.microsoft.com/office/drawing/2010/main" xmlns="">
                 <a:solidFill>
                   <a:srgbClr val="FFFFFF"/>
                 </a:solidFill>
               </a14:hiddenFill>
             </a:ext>
             <a:ext uri="{91240B29-F687-4f45-9708-019B960494DF}">
-              <a14:hiddenLine xmlns="" xmlns:a14="http://schemas.microsoft.com/office/drawing/2010/main" w="9525">
+              <a14:hiddenLine xmlns:a14="http://schemas.microsoft.com/office/drawing/2010/main" xmlns="" w="9525">
                 <a:solidFill>
                   <a:srgbClr val="000000"/>
                 </a:solidFill>
@@ -9669,14 +9681,14 @@
           <a:effectLst/>
           <a:extLst>
             <a:ext uri="{909E8E84-426E-40dd-AFC4-6F175D3DCCD1}">
-              <a14:hiddenFill xmlns="" xmlns:a14="http://schemas.microsoft.com/office/drawing/2010/main">
+              <a14:hiddenFill xmlns:a14="http://schemas.microsoft.com/office/drawing/2010/main" xmlns="">
                 <a:solidFill>
                   <a:schemeClr val="accent1"/>
                 </a:solidFill>
               </a14:hiddenFill>
             </a:ext>
             <a:ext uri="{91240B29-F687-4f45-9708-019B960494DF}">
-              <a14:hiddenLine xmlns="" xmlns:a14="http://schemas.microsoft.com/office/drawing/2010/main" w="9525">
+              <a14:hiddenLine xmlns:a14="http://schemas.microsoft.com/office/drawing/2010/main" xmlns="" w="9525">
                 <a:solidFill>
                   <a:schemeClr val="tx1"/>
                 </a:solidFill>
@@ -9686,7 +9698,7 @@
               </a14:hiddenLine>
             </a:ext>
             <a:ext uri="{AF507438-7753-43e0-B8FC-AC1667EBCBE1}">
-              <a14:hiddenEffects xmlns="" xmlns:a14="http://schemas.microsoft.com/office/drawing/2010/main">
+              <a14:hiddenEffects xmlns:a14="http://schemas.microsoft.com/office/drawing/2010/main" xmlns="">
                 <a:effectLst>
                   <a:outerShdw blurRad="63500" dist="38099" dir="2700000" algn="ctr" rotWithShape="0">
                     <a:schemeClr val="bg2">
@@ -9736,17 +9748,17 @@
           <a:effectLst/>
           <a:extLst>
             <a:ext uri="{FAA26D3D-D897-4be2-8F04-BA451C77F1D7}">
-              <ma14:placeholderFlag xmlns="" xmlns:ma14="http://schemas.microsoft.com/office/mac/drawingml/2011/main" val="1"/>
+              <ma14:placeholderFlag xmlns:ma14="http://schemas.microsoft.com/office/mac/drawingml/2011/main" xmlns="" val="1"/>
             </a:ext>
             <a:ext uri="{909E8E84-426E-40dd-AFC4-6F175D3DCCD1}">
-              <a14:hiddenFill xmlns="" xmlns:a14="http://schemas.microsoft.com/office/drawing/2010/main">
+              <a14:hiddenFill xmlns:a14="http://schemas.microsoft.com/office/drawing/2010/main" xmlns="">
                 <a:solidFill>
                   <a:schemeClr val="accent1"/>
                 </a:solidFill>
               </a14:hiddenFill>
             </a:ext>
             <a:ext uri="{91240B29-F687-4f45-9708-019B960494DF}">
-              <a14:hiddenLine xmlns="" xmlns:a14="http://schemas.microsoft.com/office/drawing/2010/main" w="9525">
+              <a14:hiddenLine xmlns:a14="http://schemas.microsoft.com/office/drawing/2010/main" xmlns="" w="9525">
                 <a:solidFill>
                   <a:schemeClr val="tx1"/>
                 </a:solidFill>
@@ -9756,7 +9768,7 @@
               </a14:hiddenLine>
             </a:ext>
             <a:ext uri="{AF507438-7753-43e0-B8FC-AC1667EBCBE1}">
-              <a14:hiddenEffects xmlns="" xmlns:a14="http://schemas.microsoft.com/office/drawing/2010/main">
+              <a14:hiddenEffects xmlns:a14="http://schemas.microsoft.com/office/drawing/2010/main" xmlns="">
                 <a:effectLst>
                   <a:outerShdw blurRad="63500" dist="38099" dir="2700000" algn="ctr" rotWithShape="0">
                     <a:schemeClr val="bg2">
@@ -9809,17 +9821,17 @@
           <a:effectLst/>
           <a:extLst>
             <a:ext uri="{FAA26D3D-D897-4be2-8F04-BA451C77F1D7}">
-              <ma14:placeholderFlag xmlns="" xmlns:ma14="http://schemas.microsoft.com/office/mac/drawingml/2011/main" val="1"/>
+              <ma14:placeholderFlag xmlns:ma14="http://schemas.microsoft.com/office/mac/drawingml/2011/main" xmlns="" val="1"/>
             </a:ext>
             <a:ext uri="{909E8E84-426E-40dd-AFC4-6F175D3DCCD1}">
-              <a14:hiddenFill xmlns="" xmlns:a14="http://schemas.microsoft.com/office/drawing/2010/main">
+              <a14:hiddenFill xmlns:a14="http://schemas.microsoft.com/office/drawing/2010/main" xmlns="">
                 <a:solidFill>
                   <a:schemeClr val="accent1"/>
                 </a:solidFill>
               </a14:hiddenFill>
             </a:ext>
             <a:ext uri="{91240B29-F687-4f45-9708-019B960494DF}">
-              <a14:hiddenLine xmlns="" xmlns:a14="http://schemas.microsoft.com/office/drawing/2010/main" w="9525">
+              <a14:hiddenLine xmlns:a14="http://schemas.microsoft.com/office/drawing/2010/main" xmlns="" w="9525">
                 <a:solidFill>
                   <a:schemeClr val="tx1"/>
                 </a:solidFill>
@@ -9829,7 +9841,7 @@
               </a14:hiddenLine>
             </a:ext>
             <a:ext uri="{AF507438-7753-43e0-B8FC-AC1667EBCBE1}">
-              <a14:hiddenEffects xmlns="" xmlns:a14="http://schemas.microsoft.com/office/drawing/2010/main">
+              <a14:hiddenEffects xmlns:a14="http://schemas.microsoft.com/office/drawing/2010/main" xmlns="">
                 <a:effectLst>
                   <a:outerShdw blurRad="63500" dist="38099" dir="2700000" algn="ctr" rotWithShape="0">
                     <a:schemeClr val="bg2">
@@ -10378,14 +10390,14 @@
           </a:ln>
           <a:extLst>
             <a:ext uri="{909E8E84-426E-40dd-AFC4-6F175D3DCCD1}">
-              <a14:hiddenFill xmlns="" xmlns:a14="http://schemas.microsoft.com/office/drawing/2010/main">
+              <a14:hiddenFill xmlns:a14="http://schemas.microsoft.com/office/drawing/2010/main" xmlns="">
                 <a:solidFill>
                   <a:srgbClr val="FFFFFF"/>
                 </a:solidFill>
               </a14:hiddenFill>
             </a:ext>
             <a:ext uri="{91240B29-F687-4f45-9708-019B960494DF}">
-              <a14:hiddenLine xmlns="" xmlns:a14="http://schemas.microsoft.com/office/drawing/2010/main" w="9525">
+              <a14:hiddenLine xmlns:a14="http://schemas.microsoft.com/office/drawing/2010/main" xmlns="" w="9525">
                 <a:solidFill>
                   <a:srgbClr val="000000"/>
                 </a:solidFill>
@@ -10422,17 +10434,17 @@
           <a:effectLst/>
           <a:extLst>
             <a:ext uri="{FAA26D3D-D897-4be2-8F04-BA451C77F1D7}">
-              <ma14:placeholderFlag xmlns="" xmlns:ma14="http://schemas.microsoft.com/office/mac/drawingml/2011/main" val="1"/>
+              <ma14:placeholderFlag xmlns:ma14="http://schemas.microsoft.com/office/mac/drawingml/2011/main" xmlns="" val="1"/>
             </a:ext>
             <a:ext uri="{909E8E84-426E-40dd-AFC4-6F175D3DCCD1}">
-              <a14:hiddenFill xmlns="" xmlns:a14="http://schemas.microsoft.com/office/drawing/2010/main">
+              <a14:hiddenFill xmlns:a14="http://schemas.microsoft.com/office/drawing/2010/main" xmlns="">
                 <a:solidFill>
                   <a:schemeClr val="accent1"/>
                 </a:solidFill>
               </a14:hiddenFill>
             </a:ext>
             <a:ext uri="{91240B29-F687-4f45-9708-019B960494DF}">
-              <a14:hiddenLine xmlns="" xmlns:a14="http://schemas.microsoft.com/office/drawing/2010/main" w="9525">
+              <a14:hiddenLine xmlns:a14="http://schemas.microsoft.com/office/drawing/2010/main" xmlns="" w="9525">
                 <a:solidFill>
                   <a:schemeClr val="tx1"/>
                 </a:solidFill>
@@ -10442,7 +10454,7 @@
               </a14:hiddenLine>
             </a:ext>
             <a:ext uri="{AF507438-7753-43e0-B8FC-AC1667EBCBE1}">
-              <a14:hiddenEffects xmlns="" xmlns:a14="http://schemas.microsoft.com/office/drawing/2010/main">
+              <a14:hiddenEffects xmlns:a14="http://schemas.microsoft.com/office/drawing/2010/main" xmlns="">
                 <a:effectLst>
                   <a:outerShdw blurRad="63500" dist="38099" dir="2700000" algn="ctr" rotWithShape="0">
                     <a:schemeClr val="bg2">
@@ -10495,17 +10507,17 @@
           <a:effectLst/>
           <a:extLst>
             <a:ext uri="{FAA26D3D-D897-4be2-8F04-BA451C77F1D7}">
-              <ma14:placeholderFlag xmlns="" xmlns:ma14="http://schemas.microsoft.com/office/mac/drawingml/2011/main" val="1"/>
+              <ma14:placeholderFlag xmlns:ma14="http://schemas.microsoft.com/office/mac/drawingml/2011/main" xmlns="" val="1"/>
             </a:ext>
             <a:ext uri="{909E8E84-426E-40dd-AFC4-6F175D3DCCD1}">
-              <a14:hiddenFill xmlns="" xmlns:a14="http://schemas.microsoft.com/office/drawing/2010/main">
+              <a14:hiddenFill xmlns:a14="http://schemas.microsoft.com/office/drawing/2010/main" xmlns="">
                 <a:solidFill>
                   <a:schemeClr val="accent1"/>
                 </a:solidFill>
               </a14:hiddenFill>
             </a:ext>
             <a:ext uri="{91240B29-F687-4f45-9708-019B960494DF}">
-              <a14:hiddenLine xmlns="" xmlns:a14="http://schemas.microsoft.com/office/drawing/2010/main" w="9525">
+              <a14:hiddenLine xmlns:a14="http://schemas.microsoft.com/office/drawing/2010/main" xmlns="" w="9525">
                 <a:solidFill>
                   <a:schemeClr val="tx1"/>
                 </a:solidFill>
@@ -10515,7 +10527,7 @@
               </a14:hiddenLine>
             </a:ext>
             <a:ext uri="{AF507438-7753-43e0-B8FC-AC1667EBCBE1}">
-              <a14:hiddenEffects xmlns="" xmlns:a14="http://schemas.microsoft.com/office/drawing/2010/main">
+              <a14:hiddenEffects xmlns:a14="http://schemas.microsoft.com/office/drawing/2010/main" xmlns="">
                 <a:effectLst>
                   <a:outerShdw blurRad="63500" dist="38099" dir="2700000" algn="ctr" rotWithShape="0">
                     <a:schemeClr val="bg2">
@@ -10590,17 +10602,17 @@
           <a:effectLst/>
           <a:extLst>
             <a:ext uri="{FAA26D3D-D897-4be2-8F04-BA451C77F1D7}">
-              <ma14:placeholderFlag xmlns="" xmlns:ma14="http://schemas.microsoft.com/office/mac/drawingml/2011/main" val="1"/>
+              <ma14:placeholderFlag xmlns:ma14="http://schemas.microsoft.com/office/mac/drawingml/2011/main" xmlns="" val="1"/>
             </a:ext>
             <a:ext uri="{909E8E84-426E-40dd-AFC4-6F175D3DCCD1}">
-              <a14:hiddenFill xmlns="" xmlns:a14="http://schemas.microsoft.com/office/drawing/2010/main">
+              <a14:hiddenFill xmlns:a14="http://schemas.microsoft.com/office/drawing/2010/main" xmlns="">
                 <a:solidFill>
                   <a:schemeClr val="accent1"/>
                 </a:solidFill>
               </a14:hiddenFill>
             </a:ext>
             <a:ext uri="{91240B29-F687-4f45-9708-019B960494DF}">
-              <a14:hiddenLine xmlns="" xmlns:a14="http://schemas.microsoft.com/office/drawing/2010/main" w="9525">
+              <a14:hiddenLine xmlns:a14="http://schemas.microsoft.com/office/drawing/2010/main" xmlns="" w="9525">
                 <a:solidFill>
                   <a:schemeClr val="tx1"/>
                 </a:solidFill>
@@ -10610,7 +10622,7 @@
               </a14:hiddenLine>
             </a:ext>
             <a:ext uri="{AF507438-7753-43e0-B8FC-AC1667EBCBE1}">
-              <a14:hiddenEffects xmlns="" xmlns:a14="http://schemas.microsoft.com/office/drawing/2010/main">
+              <a14:hiddenEffects xmlns:a14="http://schemas.microsoft.com/office/drawing/2010/main" xmlns="">
                 <a:effectLst>
                   <a:outerShdw blurRad="63500" dist="38099" dir="2700000" algn="ctr" rotWithShape="0">
                     <a:schemeClr val="bg2">
@@ -10672,17 +10684,17 @@
           <a:effectLst/>
           <a:extLst>
             <a:ext uri="{FAA26D3D-D897-4be2-8F04-BA451C77F1D7}">
-              <ma14:placeholderFlag xmlns="" xmlns:ma14="http://schemas.microsoft.com/office/mac/drawingml/2011/main" val="1"/>
+              <ma14:placeholderFlag xmlns:ma14="http://schemas.microsoft.com/office/mac/drawingml/2011/main" xmlns="" val="1"/>
             </a:ext>
             <a:ext uri="{909E8E84-426E-40dd-AFC4-6F175D3DCCD1}">
-              <a14:hiddenFill xmlns="" xmlns:a14="http://schemas.microsoft.com/office/drawing/2010/main">
+              <a14:hiddenFill xmlns:a14="http://schemas.microsoft.com/office/drawing/2010/main" xmlns="">
                 <a:solidFill>
                   <a:schemeClr val="accent1"/>
                 </a:solidFill>
               </a14:hiddenFill>
             </a:ext>
             <a:ext uri="{91240B29-F687-4f45-9708-019B960494DF}">
-              <a14:hiddenLine xmlns="" xmlns:a14="http://schemas.microsoft.com/office/drawing/2010/main" w="9525">
+              <a14:hiddenLine xmlns:a14="http://schemas.microsoft.com/office/drawing/2010/main" xmlns="" w="9525">
                 <a:solidFill>
                   <a:schemeClr val="tx1"/>
                 </a:solidFill>
@@ -10692,7 +10704,7 @@
               </a14:hiddenLine>
             </a:ext>
             <a:ext uri="{AF507438-7753-43e0-B8FC-AC1667EBCBE1}">
-              <a14:hiddenEffects xmlns="" xmlns:a14="http://schemas.microsoft.com/office/drawing/2010/main">
+              <a14:hiddenEffects xmlns:a14="http://schemas.microsoft.com/office/drawing/2010/main" xmlns="">
                 <a:effectLst>
                   <a:outerShdw blurRad="63500" dist="38099" dir="2700000" algn="ctr" rotWithShape="0">
                     <a:schemeClr val="bg2">
@@ -11238,14 +11250,14 @@
           </a:ln>
           <a:extLst>
             <a:ext uri="{909E8E84-426E-40dd-AFC4-6F175D3DCCD1}">
-              <a14:hiddenFill xmlns="" xmlns:a14="http://schemas.microsoft.com/office/drawing/2010/main">
+              <a14:hiddenFill xmlns:a14="http://schemas.microsoft.com/office/drawing/2010/main" xmlns="">
                 <a:solidFill>
                   <a:srgbClr val="FFFFFF"/>
                 </a:solidFill>
               </a14:hiddenFill>
             </a:ext>
             <a:ext uri="{91240B29-F687-4f45-9708-019B960494DF}">
-              <a14:hiddenLine xmlns="" xmlns:a14="http://schemas.microsoft.com/office/drawing/2010/main" w="9525">
+              <a14:hiddenLine xmlns:a14="http://schemas.microsoft.com/office/drawing/2010/main" xmlns="" w="9525">
                 <a:solidFill>
                   <a:srgbClr val="000000"/>
                 </a:solidFill>
@@ -11282,17 +11294,17 @@
           <a:effectLst/>
           <a:extLst>
             <a:ext uri="{FAA26D3D-D897-4be2-8F04-BA451C77F1D7}">
-              <ma14:placeholderFlag xmlns="" xmlns:ma14="http://schemas.microsoft.com/office/mac/drawingml/2011/main" val="1"/>
+              <ma14:placeholderFlag xmlns:ma14="http://schemas.microsoft.com/office/mac/drawingml/2011/main" xmlns="" val="1"/>
             </a:ext>
             <a:ext uri="{909E8E84-426E-40dd-AFC4-6F175D3DCCD1}">
-              <a14:hiddenFill xmlns="" xmlns:a14="http://schemas.microsoft.com/office/drawing/2010/main">
+              <a14:hiddenFill xmlns:a14="http://schemas.microsoft.com/office/drawing/2010/main" xmlns="">
                 <a:solidFill>
                   <a:schemeClr val="accent1"/>
                 </a:solidFill>
               </a14:hiddenFill>
             </a:ext>
             <a:ext uri="{91240B29-F687-4f45-9708-019B960494DF}">
-              <a14:hiddenLine xmlns="" xmlns:a14="http://schemas.microsoft.com/office/drawing/2010/main" w="9525">
+              <a14:hiddenLine xmlns:a14="http://schemas.microsoft.com/office/drawing/2010/main" xmlns="" w="9525">
                 <a:solidFill>
                   <a:schemeClr val="tx1"/>
                 </a:solidFill>
@@ -11302,7 +11314,7 @@
               </a14:hiddenLine>
             </a:ext>
             <a:ext uri="{AF507438-7753-43e0-B8FC-AC1667EBCBE1}">
-              <a14:hiddenEffects xmlns="" xmlns:a14="http://schemas.microsoft.com/office/drawing/2010/main">
+              <a14:hiddenEffects xmlns:a14="http://schemas.microsoft.com/office/drawing/2010/main" xmlns="">
                 <a:effectLst>
                   <a:outerShdw blurRad="63500" dist="38099" dir="2700000" algn="ctr" rotWithShape="0">
                     <a:schemeClr val="bg2">
@@ -11355,17 +11367,17 @@
           <a:effectLst/>
           <a:extLst>
             <a:ext uri="{FAA26D3D-D897-4be2-8F04-BA451C77F1D7}">
-              <ma14:placeholderFlag xmlns="" xmlns:ma14="http://schemas.microsoft.com/office/mac/drawingml/2011/main" val="1"/>
+              <ma14:placeholderFlag xmlns:ma14="http://schemas.microsoft.com/office/mac/drawingml/2011/main" xmlns="" val="1"/>
             </a:ext>
             <a:ext uri="{909E8E84-426E-40dd-AFC4-6F175D3DCCD1}">
-              <a14:hiddenFill xmlns="" xmlns:a14="http://schemas.microsoft.com/office/drawing/2010/main">
+              <a14:hiddenFill xmlns:a14="http://schemas.microsoft.com/office/drawing/2010/main" xmlns="">
                 <a:solidFill>
                   <a:schemeClr val="accent1"/>
                 </a:solidFill>
               </a14:hiddenFill>
             </a:ext>
             <a:ext uri="{91240B29-F687-4f45-9708-019B960494DF}">
-              <a14:hiddenLine xmlns="" xmlns:a14="http://schemas.microsoft.com/office/drawing/2010/main" w="9525">
+              <a14:hiddenLine xmlns:a14="http://schemas.microsoft.com/office/drawing/2010/main" xmlns="" w="9525">
                 <a:solidFill>
                   <a:schemeClr val="tx1"/>
                 </a:solidFill>
@@ -11375,7 +11387,7 @@
               </a14:hiddenLine>
             </a:ext>
             <a:ext uri="{AF507438-7753-43e0-B8FC-AC1667EBCBE1}">
-              <a14:hiddenEffects xmlns="" xmlns:a14="http://schemas.microsoft.com/office/drawing/2010/main">
+              <a14:hiddenEffects xmlns:a14="http://schemas.microsoft.com/office/drawing/2010/main" xmlns="">
                 <a:effectLst>
                   <a:outerShdw blurRad="63500" dist="38099" dir="2700000" algn="ctr" rotWithShape="0">
                     <a:schemeClr val="bg2">
@@ -11450,17 +11462,17 @@
           <a:effectLst/>
           <a:extLst>
             <a:ext uri="{FAA26D3D-D897-4be2-8F04-BA451C77F1D7}">
-              <ma14:placeholderFlag xmlns="" xmlns:ma14="http://schemas.microsoft.com/office/mac/drawingml/2011/main" val="1"/>
+              <ma14:placeholderFlag xmlns:ma14="http://schemas.microsoft.com/office/mac/drawingml/2011/main" xmlns="" val="1"/>
             </a:ext>
             <a:ext uri="{909E8E84-426E-40dd-AFC4-6F175D3DCCD1}">
-              <a14:hiddenFill xmlns="" xmlns:a14="http://schemas.microsoft.com/office/drawing/2010/main">
+              <a14:hiddenFill xmlns:a14="http://schemas.microsoft.com/office/drawing/2010/main" xmlns="">
                 <a:solidFill>
                   <a:schemeClr val="accent1"/>
                 </a:solidFill>
               </a14:hiddenFill>
             </a:ext>
             <a:ext uri="{91240B29-F687-4f45-9708-019B960494DF}">
-              <a14:hiddenLine xmlns="" xmlns:a14="http://schemas.microsoft.com/office/drawing/2010/main" w="9525">
+              <a14:hiddenLine xmlns:a14="http://schemas.microsoft.com/office/drawing/2010/main" xmlns="" w="9525">
                 <a:solidFill>
                   <a:schemeClr val="tx1"/>
                 </a:solidFill>
@@ -11470,7 +11482,7 @@
               </a14:hiddenLine>
             </a:ext>
             <a:ext uri="{AF507438-7753-43e0-B8FC-AC1667EBCBE1}">
-              <a14:hiddenEffects xmlns="" xmlns:a14="http://schemas.microsoft.com/office/drawing/2010/main">
+              <a14:hiddenEffects xmlns:a14="http://schemas.microsoft.com/office/drawing/2010/main" xmlns="">
                 <a:effectLst>
                   <a:outerShdw blurRad="63500" dist="38099" dir="2700000" algn="ctr" rotWithShape="0">
                     <a:schemeClr val="bg2">
@@ -11540,17 +11552,17 @@
           <a:effectLst/>
           <a:extLst>
             <a:ext uri="{FAA26D3D-D897-4be2-8F04-BA451C77F1D7}">
-              <ma14:placeholderFlag xmlns="" xmlns:ma14="http://schemas.microsoft.com/office/mac/drawingml/2011/main" val="1"/>
+              <ma14:placeholderFlag xmlns:ma14="http://schemas.microsoft.com/office/mac/drawingml/2011/main" xmlns="" val="1"/>
             </a:ext>
             <a:ext uri="{909E8E84-426E-40dd-AFC4-6F175D3DCCD1}">
-              <a14:hiddenFill xmlns="" xmlns:a14="http://schemas.microsoft.com/office/drawing/2010/main">
+              <a14:hiddenFill xmlns:a14="http://schemas.microsoft.com/office/drawing/2010/main" xmlns="">
                 <a:solidFill>
                   <a:schemeClr val="accent1"/>
                 </a:solidFill>
               </a14:hiddenFill>
             </a:ext>
             <a:ext uri="{91240B29-F687-4f45-9708-019B960494DF}">
-              <a14:hiddenLine xmlns="" xmlns:a14="http://schemas.microsoft.com/office/drawing/2010/main" w="9525">
+              <a14:hiddenLine xmlns:a14="http://schemas.microsoft.com/office/drawing/2010/main" xmlns="" w="9525">
                 <a:solidFill>
                   <a:schemeClr val="tx1"/>
                 </a:solidFill>
@@ -11560,7 +11572,7 @@
               </a14:hiddenLine>
             </a:ext>
             <a:ext uri="{AF507438-7753-43e0-B8FC-AC1667EBCBE1}">
-              <a14:hiddenEffects xmlns="" xmlns:a14="http://schemas.microsoft.com/office/drawing/2010/main">
+              <a14:hiddenEffects xmlns:a14="http://schemas.microsoft.com/office/drawing/2010/main" xmlns="">
                 <a:effectLst>
                   <a:outerShdw blurRad="63500" dist="38099" dir="2700000" algn="ctr" rotWithShape="0">
                     <a:schemeClr val="bg2">
@@ -12268,17 +12280,17 @@
           <a:effectLst/>
           <a:extLst>
             <a:ext uri="{FAA26D3D-D897-4be2-8F04-BA451C77F1D7}">
-              <ma14:placeholderFlag xmlns="" xmlns:ma14="http://schemas.microsoft.com/office/mac/drawingml/2011/main" val="1"/>
+              <ma14:placeholderFlag xmlns:ma14="http://schemas.microsoft.com/office/mac/drawingml/2011/main" xmlns="" val="1"/>
             </a:ext>
             <a:ext uri="{909E8E84-426E-40dd-AFC4-6F175D3DCCD1}">
-              <a14:hiddenFill xmlns="" xmlns:a14="http://schemas.microsoft.com/office/drawing/2010/main">
+              <a14:hiddenFill xmlns:a14="http://schemas.microsoft.com/office/drawing/2010/main" xmlns="">
                 <a:solidFill>
                   <a:schemeClr val="accent1"/>
                 </a:solidFill>
               </a14:hiddenFill>
             </a:ext>
             <a:ext uri="{91240B29-F687-4f45-9708-019B960494DF}">
-              <a14:hiddenLine xmlns="" xmlns:a14="http://schemas.microsoft.com/office/drawing/2010/main" w="9525">
+              <a14:hiddenLine xmlns:a14="http://schemas.microsoft.com/office/drawing/2010/main" xmlns="" w="9525">
                 <a:solidFill>
                   <a:schemeClr val="tx1"/>
                 </a:solidFill>
@@ -12288,7 +12300,7 @@
               </a14:hiddenLine>
             </a:ext>
             <a:ext uri="{AF507438-7753-43e0-B8FC-AC1667EBCBE1}">
-              <a14:hiddenEffects xmlns="" xmlns:a14="http://schemas.microsoft.com/office/drawing/2010/main">
+              <a14:hiddenEffects xmlns:a14="http://schemas.microsoft.com/office/drawing/2010/main" xmlns="">
                 <a:effectLst>
                   <a:outerShdw blurRad="63500" dist="38099" dir="2700000" algn="ctr" rotWithShape="0">
                     <a:schemeClr val="bg2">
@@ -14802,14 +14814,14 @@
           <a:effectLst/>
           <a:extLst>
             <a:ext uri="{909E8E84-426E-40dd-AFC4-6F175D3DCCD1}">
-              <a14:hiddenFill xmlns="" xmlns:a14="http://schemas.microsoft.com/office/drawing/2010/main">
+              <a14:hiddenFill xmlns:a14="http://schemas.microsoft.com/office/drawing/2010/main" xmlns="">
                 <a:solidFill>
                   <a:schemeClr val="accent1"/>
                 </a:solidFill>
               </a14:hiddenFill>
             </a:ext>
             <a:ext uri="{91240B29-F687-4f45-9708-019B960494DF}">
-              <a14:hiddenLine xmlns="" xmlns:a14="http://schemas.microsoft.com/office/drawing/2010/main" w="9525">
+              <a14:hiddenLine xmlns:a14="http://schemas.microsoft.com/office/drawing/2010/main" xmlns="" w="9525">
                 <a:solidFill>
                   <a:schemeClr val="tx1"/>
                 </a:solidFill>
@@ -14819,7 +14831,7 @@
               </a14:hiddenLine>
             </a:ext>
             <a:ext uri="{AF507438-7753-43e0-B8FC-AC1667EBCBE1}">
-              <a14:hiddenEffects xmlns="" xmlns:a14="http://schemas.microsoft.com/office/drawing/2010/main">
+              <a14:hiddenEffects xmlns:a14="http://schemas.microsoft.com/office/drawing/2010/main" xmlns="">
                 <a:effectLst>
                   <a:outerShdw blurRad="63500" dist="38099" dir="2700000" algn="ctr" rotWithShape="0">
                     <a:schemeClr val="bg2">
@@ -14896,14 +14908,14 @@
           <a:effectLst/>
           <a:extLst>
             <a:ext uri="{909E8E84-426E-40dd-AFC4-6F175D3DCCD1}">
-              <a14:hiddenFill xmlns="" xmlns:a14="http://schemas.microsoft.com/office/drawing/2010/main">
+              <a14:hiddenFill xmlns:a14="http://schemas.microsoft.com/office/drawing/2010/main" xmlns="">
                 <a:solidFill>
                   <a:schemeClr val="accent1"/>
                 </a:solidFill>
               </a14:hiddenFill>
             </a:ext>
             <a:ext uri="{91240B29-F687-4f45-9708-019B960494DF}">
-              <a14:hiddenLine xmlns="" xmlns:a14="http://schemas.microsoft.com/office/drawing/2010/main" w="9525">
+              <a14:hiddenLine xmlns:a14="http://schemas.microsoft.com/office/drawing/2010/main" xmlns="" w="9525">
                 <a:solidFill>
                   <a:schemeClr val="tx1"/>
                 </a:solidFill>
@@ -14913,7 +14925,7 @@
               </a14:hiddenLine>
             </a:ext>
             <a:ext uri="{AF507438-7753-43e0-B8FC-AC1667EBCBE1}">
-              <a14:hiddenEffects xmlns="" xmlns:a14="http://schemas.microsoft.com/office/drawing/2010/main">
+              <a14:hiddenEffects xmlns:a14="http://schemas.microsoft.com/office/drawing/2010/main" xmlns="">
                 <a:effectLst>
                   <a:outerShdw blurRad="63500" dist="38099" dir="2700000" algn="ctr" rotWithShape="0">
                     <a:schemeClr val="bg2">
@@ -17116,135 +17128,390 @@
           </a:p>
         </p:txBody>
       </p:sp>
-      <p:sp>
-        <p:nvSpPr>
-          <p:cNvPr id="3" name="Inhaltsplatzhalter 2">
+      <p:graphicFrame>
+        <p:nvGraphicFramePr>
+          <p:cNvPr id="4" name="Inhaltsplatzhalter 3">
             <a:extLst>
               <a:ext uri="{FF2B5EF4-FFF2-40B4-BE49-F238E27FC236}">
-                <a16:creationId xmlns:a16="http://schemas.microsoft.com/office/drawing/2014/main" id="{15CBA72A-9328-9B4A-8C7C-9A03BBA49322}"/>
+                <a16:creationId xmlns:a16="http://schemas.microsoft.com/office/drawing/2014/main" id="{5398CF31-D347-594C-A2AF-0A76E0010F6D}"/>
               </a:ext>
             </a:extLst>
           </p:cNvPr>
-          <p:cNvSpPr>
-            <a:spLocks noGrp="1"/>
-          </p:cNvSpPr>
+          <p:cNvGraphicFramePr>
+            <a:graphicFrameLocks noGrp="1"/>
+          </p:cNvGraphicFramePr>
           <p:nvPr>
             <p:ph idx="1"/>
+            <p:extLst>
+              <p:ext uri="{D42A27DB-BD31-4B8C-83A1-F6EECF244321}">
+                <p14:modId xmlns:p14="http://schemas.microsoft.com/office/powerpoint/2010/main" val="1743480306"/>
+              </p:ext>
+            </p:extLst>
           </p:nvPr>
+        </p:nvGraphicFramePr>
+        <p:xfrm>
+          <a:off x="381000" y="1295400"/>
+          <a:ext cx="8229600" cy="2194560"/>
+        </p:xfrm>
+        <a:graphic>
+          <a:graphicData uri="http://schemas.openxmlformats.org/drawingml/2006/table">
+            <a:tbl>
+              <a:tblPr firstRow="1" bandRow="1">
+                <a:tableStyleId>{5C22544A-7EE6-4342-B048-85BDC9FD1C3A}</a:tableStyleId>
+              </a:tblPr>
+              <a:tblGrid>
+                <a:gridCol w="4058478">
+                  <a:extLst>
+                    <a:ext uri="{9D8B030D-6E8A-4147-A177-3AD203B41FA5}">
+                      <a16:colId xmlns:a16="http://schemas.microsoft.com/office/drawing/2014/main" val="1251000280"/>
+                    </a:ext>
+                  </a:extLst>
+                </a:gridCol>
+                <a:gridCol w="2213113">
+                  <a:extLst>
+                    <a:ext uri="{9D8B030D-6E8A-4147-A177-3AD203B41FA5}">
+                      <a16:colId xmlns:a16="http://schemas.microsoft.com/office/drawing/2014/main" val="14367257"/>
+                    </a:ext>
+                  </a:extLst>
+                </a:gridCol>
+                <a:gridCol w="1958009">
+                  <a:extLst>
+                    <a:ext uri="{9D8B030D-6E8A-4147-A177-3AD203B41FA5}">
+                      <a16:colId xmlns:a16="http://schemas.microsoft.com/office/drawing/2014/main" val="4055017000"/>
+                    </a:ext>
+                  </a:extLst>
+                </a:gridCol>
+              </a:tblGrid>
+              <a:tr h="370840">
+                <a:tc>
+                  <a:txBody>
+                    <a:bodyPr/>
+                    <a:lstStyle/>
+                    <a:p>
+                      <a:r>
+                        <a:rPr lang="en-GB" sz="2400" dirty="0"/>
+                        <a:t>Definition</a:t>
+                      </a:r>
+                    </a:p>
+                  </a:txBody>
+                  <a:tcPr/>
+                </a:tc>
+                <a:tc>
+                  <a:txBody>
+                    <a:bodyPr/>
+                    <a:lstStyle/>
+                    <a:p>
+                      <a:pPr algn="ctr"/>
+                      <a:r>
+                        <a:rPr lang="en-GB" sz="2400" dirty="0"/>
+                        <a:t>UW Madison</a:t>
+                      </a:r>
+                      <a:br>
+                        <a:rPr lang="en-GB" sz="2400" dirty="0"/>
+                      </a:br>
+                      <a:r>
+                        <a:rPr lang="en-GB" sz="2400" dirty="0"/>
+                        <a:t>(MS 360)</a:t>
+                      </a:r>
+                    </a:p>
+                  </a:txBody>
+                  <a:tcPr/>
+                </a:tc>
+                <a:tc>
+                  <a:txBody>
+                    <a:bodyPr/>
+                    <a:lstStyle/>
+                    <a:p>
+                      <a:pPr algn="ctr"/>
+                      <a:r>
+                        <a:rPr lang="en-GB" sz="2400" dirty="0" err="1"/>
+                        <a:t>Cyren</a:t>
+                      </a:r>
+                      <a:endParaRPr lang="en-GB" sz="2400" dirty="0"/>
+                    </a:p>
+                  </a:txBody>
+                  <a:tcPr/>
+                </a:tc>
+                <a:extLst>
+                  <a:ext uri="{0D108BD9-81ED-4DB2-BD59-A6C34878D82A}">
+                    <a16:rowId xmlns:a16="http://schemas.microsoft.com/office/drawing/2014/main" val="1208416434"/>
+                  </a:ext>
+                </a:extLst>
+              </a:tr>
+              <a:tr h="370840">
+                <a:tc>
+                  <a:txBody>
+                    <a:bodyPr/>
+                    <a:lstStyle/>
+                    <a:p>
+                      <a:r>
+                        <a:rPr lang="en-GB" sz="2400" dirty="0"/>
+                        <a:t>Ratio calendar spam/spam</a:t>
+                      </a:r>
+                    </a:p>
+                  </a:txBody>
+                  <a:tcPr/>
+                </a:tc>
+                <a:tc>
+                  <a:txBody>
+                    <a:bodyPr/>
+                    <a:lstStyle/>
+                    <a:p>
+                      <a:pPr algn="r"/>
+                      <a:r>
+                        <a:rPr lang="en-GB" sz="2400" dirty="0"/>
+                        <a:t>0,004 %</a:t>
+                      </a:r>
+                    </a:p>
+                  </a:txBody>
+                  <a:tcPr/>
+                </a:tc>
+                <a:tc>
+                  <a:txBody>
+                    <a:bodyPr/>
+                    <a:lstStyle/>
+                    <a:p>
+                      <a:pPr algn="r"/>
+                      <a:r>
+                        <a:rPr lang="en-GB" sz="2400" dirty="0"/>
+                        <a:t>0,036 %</a:t>
+                      </a:r>
+                    </a:p>
+                  </a:txBody>
+                  <a:tcPr/>
+                </a:tc>
+                <a:extLst>
+                  <a:ext uri="{0D108BD9-81ED-4DB2-BD59-A6C34878D82A}">
+                    <a16:rowId xmlns:a16="http://schemas.microsoft.com/office/drawing/2014/main" val="196140531"/>
+                  </a:ext>
+                </a:extLst>
+              </a:tr>
+              <a:tr h="370840">
+                <a:tc>
+                  <a:txBody>
+                    <a:bodyPr/>
+                    <a:lstStyle/>
+                    <a:p>
+                      <a:r>
+                        <a:rPr lang="en-GB" sz="2400" dirty="0"/>
+                        <a:t>Ratio clean calendar/mail</a:t>
+                      </a:r>
+                    </a:p>
+                  </a:txBody>
+                  <a:tcPr/>
+                </a:tc>
+                <a:tc>
+                  <a:txBody>
+                    <a:bodyPr/>
+                    <a:lstStyle/>
+                    <a:p>
+                      <a:pPr algn="r"/>
+                      <a:r>
+                        <a:rPr lang="en-GB" sz="2400" dirty="0"/>
+                        <a:t>0,2 %</a:t>
+                      </a:r>
+                    </a:p>
+                  </a:txBody>
+                  <a:tcPr/>
+                </a:tc>
+                <a:tc>
+                  <a:txBody>
+                    <a:bodyPr/>
+                    <a:lstStyle/>
+                    <a:p>
+                      <a:pPr algn="r"/>
+                      <a:r>
+                        <a:rPr lang="en-GB" sz="2400" dirty="0"/>
+                        <a:t>0,12 %</a:t>
+                      </a:r>
+                    </a:p>
+                  </a:txBody>
+                  <a:tcPr/>
+                </a:tc>
+                <a:extLst>
+                  <a:ext uri="{0D108BD9-81ED-4DB2-BD59-A6C34878D82A}">
+                    <a16:rowId xmlns:a16="http://schemas.microsoft.com/office/drawing/2014/main" val="2228336021"/>
+                  </a:ext>
+                </a:extLst>
+              </a:tr>
+              <a:tr h="370840">
+                <a:tc>
+                  <a:txBody>
+                    <a:bodyPr/>
+                    <a:lstStyle/>
+                    <a:p>
+                      <a:r>
+                        <a:rPr lang="en-GB" sz="2400" dirty="0"/>
+                        <a:t>Ratio calendar spam/spam</a:t>
+                      </a:r>
+                    </a:p>
+                  </a:txBody>
+                  <a:tcPr/>
+                </a:tc>
+                <a:tc>
+                  <a:txBody>
+                    <a:bodyPr/>
+                    <a:lstStyle/>
+                    <a:p>
+                      <a:pPr marL="0" indent="0" algn="r">
+                        <a:tabLst/>
+                      </a:pPr>
+                      <a:r>
+                        <a:rPr lang="en-GB" sz="2400" dirty="0"/>
+                        <a:t>0,7 %</a:t>
+                      </a:r>
+                    </a:p>
+                  </a:txBody>
+                  <a:tcPr/>
+                </a:tc>
+                <a:tc>
+                  <a:txBody>
+                    <a:bodyPr/>
+                    <a:lstStyle/>
+                    <a:p>
+                      <a:pPr algn="r"/>
+                      <a:r>
+                        <a:rPr lang="en-GB" sz="2400" dirty="0"/>
+                        <a:t>11 %</a:t>
+                      </a:r>
+                    </a:p>
+                  </a:txBody>
+                  <a:tcPr/>
+                </a:tc>
+                <a:extLst>
+                  <a:ext uri="{0D108BD9-81ED-4DB2-BD59-A6C34878D82A}">
+                    <a16:rowId xmlns:a16="http://schemas.microsoft.com/office/drawing/2014/main" val="3407797050"/>
+                  </a:ext>
+                </a:extLst>
+              </a:tr>
+            </a:tbl>
+          </a:graphicData>
+        </a:graphic>
+      </p:graphicFrame>
+      <p:sp>
+        <p:nvSpPr>
+          <p:cNvPr id="5" name="Textfeld 4">
+            <a:extLst>
+              <a:ext uri="{FF2B5EF4-FFF2-40B4-BE49-F238E27FC236}">
+                <a16:creationId xmlns:a16="http://schemas.microsoft.com/office/drawing/2014/main" id="{B960415E-59AE-1E49-958F-43B0BA0B69A9}"/>
+              </a:ext>
+            </a:extLst>
+          </p:cNvPr>
+          <p:cNvSpPr txBox="1"/>
+          <p:nvPr/>
         </p:nvSpPr>
-        <p:spPr/>
+        <p:spPr>
+          <a:xfrm>
+            <a:off x="3508236" y="5977194"/>
+            <a:ext cx="5322932" cy="369332"/>
+          </a:xfrm>
+          <a:prstGeom prst="rect">
+            <a:avLst/>
+          </a:prstGeom>
+          <a:noFill/>
+        </p:spPr>
         <p:txBody>
-          <a:bodyPr/>
+          <a:bodyPr wrap="none" rtlCol="0">
+            <a:spAutoFit/>
+          </a:bodyPr>
           <a:lstStyle/>
           <a:p>
-            <a:pPr>
-              <a:tabLst>
-                <a:tab pos="6086475" algn="r"/>
-                <a:tab pos="6440488" algn="l"/>
-              </a:tabLst>
+            <a:r>
+              <a:rPr lang="en-GB" sz="1800" dirty="0">
+                <a:solidFill>
+                  <a:schemeClr val="bg1">
+                    <a:lumMod val="50000"/>
+                  </a:schemeClr>
+                </a:solidFill>
+              </a:rPr>
+              <a:t>Based on 1 week traffic analysis at UW and </a:t>
+            </a:r>
+            <a:r>
+              <a:rPr lang="en-GB" sz="1800" dirty="0" err="1">
+                <a:solidFill>
+                  <a:schemeClr val="bg1">
+                    <a:lumMod val="50000"/>
+                  </a:schemeClr>
+                </a:solidFill>
+              </a:rPr>
+              <a:t>cyren</a:t>
+            </a:r>
+            <a:r>
+              <a:rPr lang="en-GB" sz="1800" dirty="0">
+                <a:solidFill>
+                  <a:schemeClr val="bg1">
+                    <a:lumMod val="50000"/>
+                  </a:schemeClr>
+                </a:solidFill>
+              </a:rPr>
+              <a:t>.</a:t>
+            </a:r>
+          </a:p>
+        </p:txBody>
+      </p:sp>
+      <p:sp>
+        <p:nvSpPr>
+          <p:cNvPr id="6" name="Textfeld 5">
+            <a:extLst>
+              <a:ext uri="{FF2B5EF4-FFF2-40B4-BE49-F238E27FC236}">
+                <a16:creationId xmlns:a16="http://schemas.microsoft.com/office/drawing/2014/main" id="{A37820F8-22BC-6042-AACA-9EB9B1150953}"/>
+              </a:ext>
+            </a:extLst>
+          </p:cNvPr>
+          <p:cNvSpPr txBox="1"/>
+          <p:nvPr/>
+        </p:nvSpPr>
+        <p:spPr>
+          <a:xfrm>
+            <a:off x="538369" y="3764081"/>
+            <a:ext cx="8067261" cy="1938992"/>
+          </a:xfrm>
+          <a:prstGeom prst="rect">
+            <a:avLst/>
+          </a:prstGeom>
+          <a:noFill/>
+        </p:spPr>
+        <p:txBody>
+          <a:bodyPr wrap="square" rtlCol="0">
+            <a:spAutoFit/>
+          </a:bodyPr>
+          <a:lstStyle/>
+          <a:p>
+            <a:r>
+              <a:rPr lang="en-GB" dirty="0"/>
+              <a:t>Explanation:</a:t>
+            </a:r>
+          </a:p>
+          <a:p>
+            <a:pPr marL="342900" indent="-342900">
+              <a:buFont typeface="Arial" panose="020B0604020202020204" pitchFamily="34" charset="0"/>
+              <a:buChar char="•"/>
             </a:pPr>
-            <a:endParaRPr lang="en-GB" sz="2400" dirty="0"/>
-          </a:p>
-          <a:p>
-            <a:pPr>
-              <a:tabLst>
-                <a:tab pos="6086475" algn="r"/>
-                <a:tab pos="6440488" algn="l"/>
-              </a:tabLst>
+            <a:r>
+              <a:rPr lang="en-GB" dirty="0"/>
+              <a:t>UW: end-user / forwarding traffic</a:t>
+            </a:r>
+          </a:p>
+          <a:p>
+            <a:pPr marL="342900" indent="-342900">
+              <a:buFont typeface="Arial" panose="020B0604020202020204" pitchFamily="34" charset="0"/>
+              <a:buChar char="•"/>
             </a:pPr>
             <a:r>
-              <a:rPr lang="en-GB" sz="2400" dirty="0"/>
-              <a:t>Mail spam/clean ratio: 	~21 %</a:t>
-            </a:r>
-          </a:p>
-          <a:p>
-            <a:pPr>
-              <a:buNone/>
-              <a:tabLst>
-                <a:tab pos="6086475" algn="r"/>
-                <a:tab pos="6440488" algn="l"/>
-              </a:tabLst>
-            </a:pPr>
-            <a:endParaRPr lang="en-GB" sz="2400" dirty="0"/>
-          </a:p>
-          <a:p>
-            <a:pPr>
-              <a:tabLst>
-                <a:tab pos="6086475" algn="r"/>
-                <a:tab pos="6440488" algn="l"/>
-              </a:tabLst>
-            </a:pPr>
-            <a:r>
-              <a:rPr lang="en-GB" sz="2400" dirty="0"/>
-              <a:t>Calendar spam/clean ratio:	~1 %	</a:t>
-            </a:r>
-          </a:p>
-          <a:p>
-            <a:endParaRPr lang="en-GB" dirty="0"/>
-          </a:p>
-          <a:p>
-            <a:pPr marL="0" indent="0">
-              <a:buNone/>
-            </a:pPr>
-            <a:endParaRPr lang="en-GB" sz="1800" dirty="0"/>
-          </a:p>
-          <a:p>
-            <a:pPr marL="0" indent="0">
-              <a:buNone/>
-            </a:pPr>
-            <a:endParaRPr lang="en-GB" sz="1800" dirty="0"/>
-          </a:p>
-          <a:p>
-            <a:pPr marL="0" indent="0">
-              <a:buNone/>
-            </a:pPr>
-            <a:endParaRPr lang="en-GB" sz="1800" dirty="0"/>
-          </a:p>
-          <a:p>
-            <a:pPr marL="0" indent="0">
-              <a:buNone/>
-            </a:pPr>
-            <a:endParaRPr lang="en-GB" sz="1800" dirty="0"/>
-          </a:p>
-          <a:p>
-            <a:pPr marL="0" indent="0">
-              <a:buNone/>
-            </a:pPr>
-            <a:endParaRPr lang="en-GB" sz="1800" dirty="0"/>
-          </a:p>
-          <a:p>
-            <a:pPr marL="0" indent="0">
-              <a:buNone/>
-            </a:pPr>
-            <a:endParaRPr lang="en-GB" sz="1800" dirty="0"/>
-          </a:p>
-          <a:p>
-            <a:pPr marL="0" indent="0">
-              <a:buNone/>
-            </a:pPr>
-            <a:endParaRPr lang="en-GB" sz="1800" dirty="0"/>
-          </a:p>
-          <a:p>
-            <a:pPr marL="0" indent="0">
-              <a:buNone/>
-            </a:pPr>
-            <a:r>
-              <a:rPr lang="en-GB" sz="1800" dirty="0"/>
-              <a:t>extracted from 7 day mail logfile @ UW-Madison beginning of May 2018</a:t>
-            </a:r>
-          </a:p>
-          <a:p>
-            <a:pPr marL="0" indent="0">
-              <a:buNone/>
-            </a:pPr>
-            <a:endParaRPr lang="en-GB" dirty="0"/>
+              <a:rPr lang="en-GB" dirty="0" err="1"/>
+              <a:t>Cyren</a:t>
+            </a:r>
+            <a:r>
+              <a:rPr lang="en-GB" dirty="0"/>
+              <a:t>: traffic mainly within big provider as suspected (calendaring systems used for sending calendar spam to the same system for reputation reasons)</a:t>
+            </a:r>
           </a:p>
         </p:txBody>
       </p:sp>
     </p:spTree>
     <p:extLst>
       <p:ext uri="{BB962C8B-B14F-4D97-AF65-F5344CB8AC3E}">
-        <p14:creationId xmlns:p14="http://schemas.microsoft.com/office/powerpoint/2010/main" val="505505455"/>
+        <p14:creationId xmlns:p14="http://schemas.microsoft.com/office/powerpoint/2010/main" val="3247262308"/>
       </p:ext>
     </p:extLst>
   </p:cSld>

</xml_diff>

<commit_message>
final version of the presentation - footer adjustments - hidden slides dismissed
</commit_message>
<xml_diff>
--- a/Process_M3AAWG/2018-06-M3AAWG43-CalendarSpam.pptx
+++ b/Process_M3AAWG/2018-06-M3AAWG43-CalendarSpam.pptx
@@ -7,29 +7,25 @@
     <p:sldMasterId id="2147483884" r:id="rId3"/>
   </p:sldMasterIdLst>
   <p:notesMasterIdLst>
-    <p:notesMasterId r:id="rId21"/>
+    <p:notesMasterId r:id="rId17"/>
   </p:notesMasterIdLst>
   <p:handoutMasterIdLst>
-    <p:handoutMasterId r:id="rId22"/>
+    <p:handoutMasterId r:id="rId18"/>
   </p:handoutMasterIdLst>
   <p:sldIdLst>
     <p:sldId id="270" r:id="rId4"/>
-    <p:sldId id="272" r:id="rId5"/>
-    <p:sldId id="274" r:id="rId6"/>
-    <p:sldId id="280" r:id="rId7"/>
-    <p:sldId id="281" r:id="rId8"/>
-    <p:sldId id="286" r:id="rId9"/>
-    <p:sldId id="290" r:id="rId10"/>
-    <p:sldId id="282" r:id="rId11"/>
-    <p:sldId id="291" r:id="rId12"/>
-    <p:sldId id="283" r:id="rId13"/>
-    <p:sldId id="284" r:id="rId14"/>
-    <p:sldId id="287" r:id="rId15"/>
-    <p:sldId id="288" r:id="rId16"/>
-    <p:sldId id="289" r:id="rId17"/>
-    <p:sldId id="279" r:id="rId18"/>
-    <p:sldId id="273" r:id="rId19"/>
-    <p:sldId id="276" r:id="rId20"/>
+    <p:sldId id="280" r:id="rId5"/>
+    <p:sldId id="281" r:id="rId6"/>
+    <p:sldId id="286" r:id="rId7"/>
+    <p:sldId id="290" r:id="rId8"/>
+    <p:sldId id="282" r:id="rId9"/>
+    <p:sldId id="291" r:id="rId10"/>
+    <p:sldId id="283" r:id="rId11"/>
+    <p:sldId id="284" r:id="rId12"/>
+    <p:sldId id="287" r:id="rId13"/>
+    <p:sldId id="288" r:id="rId14"/>
+    <p:sldId id="289" r:id="rId15"/>
+    <p:sldId id="279" r:id="rId16"/>
   </p:sldIdLst>
   <p:sldSz cx="9144000" cy="6858000" type="screen4x3"/>
   <p:notesSz cx="6858000" cy="9144000"/>
@@ -3252,17 +3248,17 @@
           <a:effectLst/>
           <a:extLst>
             <a:ext uri="{FAA26D3D-D897-4be2-8F04-BA451C77F1D7}">
-              <ma14:placeholderFlag xmlns:ma14="http://schemas.microsoft.com/office/mac/drawingml/2011/main" xmlns="" val="1"/>
+              <ma14:placeholderFlag xmlns="" xmlns:ma14="http://schemas.microsoft.com/office/mac/drawingml/2011/main" val="1"/>
             </a:ext>
             <a:ext uri="{909E8E84-426E-40dd-AFC4-6F175D3DCCD1}">
-              <a14:hiddenFill xmlns:a14="http://schemas.microsoft.com/office/drawing/2010/main" xmlns="">
+              <a14:hiddenFill xmlns="" xmlns:a14="http://schemas.microsoft.com/office/drawing/2010/main">
                 <a:solidFill>
                   <a:schemeClr val="accent1"/>
                 </a:solidFill>
               </a14:hiddenFill>
             </a:ext>
             <a:ext uri="{91240B29-F687-4f45-9708-019B960494DF}">
-              <a14:hiddenLine xmlns:a14="http://schemas.microsoft.com/office/drawing/2010/main" xmlns="" w="9525">
+              <a14:hiddenLine xmlns="" xmlns:a14="http://schemas.microsoft.com/office/drawing/2010/main" w="9525">
                 <a:solidFill>
                   <a:schemeClr val="tx1"/>
                 </a:solidFill>
@@ -3272,7 +3268,7 @@
               </a14:hiddenLine>
             </a:ext>
             <a:ext uri="{AF507438-7753-43e0-B8FC-AC1667EBCBE1}">
-              <a14:hiddenEffects xmlns:a14="http://schemas.microsoft.com/office/drawing/2010/main" xmlns="">
+              <a14:hiddenEffects xmlns="" xmlns:a14="http://schemas.microsoft.com/office/drawing/2010/main">
                 <a:effectLst>
                   <a:outerShdw blurRad="63500" dist="38099" dir="2700000" algn="ctr" rotWithShape="0">
                     <a:schemeClr val="bg2">
@@ -3330,17 +3326,17 @@
           <a:effectLst/>
           <a:extLst>
             <a:ext uri="{FAA26D3D-D897-4be2-8F04-BA451C77F1D7}">
-              <ma14:placeholderFlag xmlns:ma14="http://schemas.microsoft.com/office/mac/drawingml/2011/main" xmlns="" val="1"/>
+              <ma14:placeholderFlag xmlns="" xmlns:ma14="http://schemas.microsoft.com/office/mac/drawingml/2011/main" val="1"/>
             </a:ext>
             <a:ext uri="{909E8E84-426E-40dd-AFC4-6F175D3DCCD1}">
-              <a14:hiddenFill xmlns:a14="http://schemas.microsoft.com/office/drawing/2010/main" xmlns="">
+              <a14:hiddenFill xmlns="" xmlns:a14="http://schemas.microsoft.com/office/drawing/2010/main">
                 <a:solidFill>
                   <a:schemeClr val="accent1"/>
                 </a:solidFill>
               </a14:hiddenFill>
             </a:ext>
             <a:ext uri="{91240B29-F687-4f45-9708-019B960494DF}">
-              <a14:hiddenLine xmlns:a14="http://schemas.microsoft.com/office/drawing/2010/main" xmlns="" w="9525">
+              <a14:hiddenLine xmlns="" xmlns:a14="http://schemas.microsoft.com/office/drawing/2010/main" w="9525">
                 <a:solidFill>
                   <a:schemeClr val="tx1"/>
                 </a:solidFill>
@@ -3350,7 +3346,7 @@
               </a14:hiddenLine>
             </a:ext>
             <a:ext uri="{AF507438-7753-43e0-B8FC-AC1667EBCBE1}">
-              <a14:hiddenEffects xmlns:a14="http://schemas.microsoft.com/office/drawing/2010/main" xmlns="">
+              <a14:hiddenEffects xmlns="" xmlns:a14="http://schemas.microsoft.com/office/drawing/2010/main">
                 <a:effectLst>
                   <a:outerShdw blurRad="63500" dist="38099" dir="2700000" algn="ctr" rotWithShape="0">
                     <a:schemeClr val="bg2">
@@ -3413,7 +3409,7 @@
           <a:effectLst/>
           <a:extLst>
             <a:ext uri="{AF507438-7753-43e0-B8FC-AC1667EBCBE1}">
-              <a14:hiddenEffects xmlns:a14="http://schemas.microsoft.com/office/drawing/2010/main" xmlns="">
+              <a14:hiddenEffects xmlns="" xmlns:a14="http://schemas.microsoft.com/office/drawing/2010/main">
                 <a:effectLst>
                   <a:outerShdw blurRad="63500" dist="38099" dir="2700000" algn="ctr" rotWithShape="0">
                     <a:srgbClr val="000000">
@@ -3424,7 +3420,7 @@
               </a14:hiddenEffects>
             </a:ext>
             <a:ext uri="{53640926-AAD7-44d8-BBD7-CCE9431645EC}">
-              <a14:shadowObscured xmlns:a14="http://schemas.microsoft.com/office/drawing/2010/main" xmlns="" val="1"/>
+              <a14:shadowObscured xmlns="" xmlns:a14="http://schemas.microsoft.com/office/drawing/2010/main" val="1"/>
             </a:ext>
           </a:extLst>
         </p:spPr>
@@ -3454,17 +3450,17 @@
           <a:effectLst/>
           <a:extLst>
             <a:ext uri="{FAA26D3D-D897-4be2-8F04-BA451C77F1D7}">
-              <ma14:placeholderFlag xmlns:ma14="http://schemas.microsoft.com/office/mac/drawingml/2011/main" xmlns="" val="1"/>
+              <ma14:placeholderFlag xmlns="" xmlns:ma14="http://schemas.microsoft.com/office/mac/drawingml/2011/main" val="1"/>
             </a:ext>
             <a:ext uri="{909E8E84-426E-40dd-AFC4-6F175D3DCCD1}">
-              <a14:hiddenFill xmlns:a14="http://schemas.microsoft.com/office/drawing/2010/main" xmlns="">
+              <a14:hiddenFill xmlns="" xmlns:a14="http://schemas.microsoft.com/office/drawing/2010/main">
                 <a:solidFill>
                   <a:schemeClr val="accent1"/>
                 </a:solidFill>
               </a14:hiddenFill>
             </a:ext>
             <a:ext uri="{91240B29-F687-4f45-9708-019B960494DF}">
-              <a14:hiddenLine xmlns:a14="http://schemas.microsoft.com/office/drawing/2010/main" xmlns="" w="9525">
+              <a14:hiddenLine xmlns="" xmlns:a14="http://schemas.microsoft.com/office/drawing/2010/main" w="9525">
                 <a:solidFill>
                   <a:schemeClr val="tx1"/>
                 </a:solidFill>
@@ -3474,7 +3470,7 @@
               </a14:hiddenLine>
             </a:ext>
             <a:ext uri="{AF507438-7753-43e0-B8FC-AC1667EBCBE1}">
-              <a14:hiddenEffects xmlns:a14="http://schemas.microsoft.com/office/drawing/2010/main" xmlns="">
+              <a14:hiddenEffects xmlns="" xmlns:a14="http://schemas.microsoft.com/office/drawing/2010/main">
                 <a:effectLst>
                   <a:outerShdw blurRad="63500" dist="38099" dir="2700000" algn="ctr" rotWithShape="0">
                     <a:schemeClr val="bg2">
@@ -3555,17 +3551,17 @@
           <a:effectLst/>
           <a:extLst>
             <a:ext uri="{FAA26D3D-D897-4be2-8F04-BA451C77F1D7}">
-              <ma14:placeholderFlag xmlns:ma14="http://schemas.microsoft.com/office/mac/drawingml/2011/main" xmlns="" val="1"/>
+              <ma14:placeholderFlag xmlns="" xmlns:ma14="http://schemas.microsoft.com/office/mac/drawingml/2011/main" val="1"/>
             </a:ext>
             <a:ext uri="{909E8E84-426E-40dd-AFC4-6F175D3DCCD1}">
-              <a14:hiddenFill xmlns:a14="http://schemas.microsoft.com/office/drawing/2010/main" xmlns="">
+              <a14:hiddenFill xmlns="" xmlns:a14="http://schemas.microsoft.com/office/drawing/2010/main">
                 <a:solidFill>
                   <a:schemeClr val="accent1"/>
                 </a:solidFill>
               </a14:hiddenFill>
             </a:ext>
             <a:ext uri="{91240B29-F687-4f45-9708-019B960494DF}">
-              <a14:hiddenLine xmlns:a14="http://schemas.microsoft.com/office/drawing/2010/main" xmlns="" w="9525">
+              <a14:hiddenLine xmlns="" xmlns:a14="http://schemas.microsoft.com/office/drawing/2010/main" w="9525">
                 <a:solidFill>
                   <a:schemeClr val="tx1"/>
                 </a:solidFill>
@@ -3575,7 +3571,7 @@
               </a14:hiddenLine>
             </a:ext>
             <a:ext uri="{AF507438-7753-43e0-B8FC-AC1667EBCBE1}">
-              <a14:hiddenEffects xmlns:a14="http://schemas.microsoft.com/office/drawing/2010/main" xmlns="">
+              <a14:hiddenEffects xmlns="" xmlns:a14="http://schemas.microsoft.com/office/drawing/2010/main">
                 <a:effectLst>
                   <a:outerShdw blurRad="63500" dist="38099" dir="2700000" algn="ctr" rotWithShape="0">
                     <a:schemeClr val="bg2">
@@ -3633,17 +3629,17 @@
           <a:effectLst/>
           <a:extLst>
             <a:ext uri="{FAA26D3D-D897-4be2-8F04-BA451C77F1D7}">
-              <ma14:placeholderFlag xmlns:ma14="http://schemas.microsoft.com/office/mac/drawingml/2011/main" xmlns="" val="1"/>
+              <ma14:placeholderFlag xmlns="" xmlns:ma14="http://schemas.microsoft.com/office/mac/drawingml/2011/main" val="1"/>
             </a:ext>
             <a:ext uri="{909E8E84-426E-40dd-AFC4-6F175D3DCCD1}">
-              <a14:hiddenFill xmlns:a14="http://schemas.microsoft.com/office/drawing/2010/main" xmlns="">
+              <a14:hiddenFill xmlns="" xmlns:a14="http://schemas.microsoft.com/office/drawing/2010/main">
                 <a:solidFill>
                   <a:schemeClr val="accent1"/>
                 </a:solidFill>
               </a14:hiddenFill>
             </a:ext>
             <a:ext uri="{91240B29-F687-4f45-9708-019B960494DF}">
-              <a14:hiddenLine xmlns:a14="http://schemas.microsoft.com/office/drawing/2010/main" xmlns="" w="9525">
+              <a14:hiddenLine xmlns="" xmlns:a14="http://schemas.microsoft.com/office/drawing/2010/main" w="9525">
                 <a:solidFill>
                   <a:schemeClr val="tx1"/>
                 </a:solidFill>
@@ -3653,7 +3649,7 @@
               </a14:hiddenLine>
             </a:ext>
             <a:ext uri="{AF507438-7753-43e0-B8FC-AC1667EBCBE1}">
-              <a14:hiddenEffects xmlns:a14="http://schemas.microsoft.com/office/drawing/2010/main" xmlns="">
+              <a14:hiddenEffects xmlns="" xmlns:a14="http://schemas.microsoft.com/office/drawing/2010/main">
                 <a:effectLst>
                   <a:outerShdw blurRad="63500" dist="38099" dir="2700000" algn="ctr" rotWithShape="0">
                     <a:schemeClr val="bg2">
@@ -3917,193 +3913,6 @@
 </p:notes>
 </file>
 
-<file path=ppt/notesSlides/notesSlide2.xml><?xml version="1.0" encoding="utf-8"?>
-<p:notes xmlns:a="http://schemas.openxmlformats.org/drawingml/2006/main" xmlns:r="http://schemas.openxmlformats.org/officeDocument/2006/relationships" xmlns:p="http://schemas.openxmlformats.org/presentationml/2006/main">
-  <p:cSld>
-    <p:spTree>
-      <p:nvGrpSpPr>
-        <p:cNvPr id="1" name=""/>
-        <p:cNvGrpSpPr/>
-        <p:nvPr/>
-      </p:nvGrpSpPr>
-      <p:grpSpPr>
-        <a:xfrm>
-          <a:off x="0" y="0"/>
-          <a:ext cx="0" cy="0"/>
-          <a:chOff x="0" y="0"/>
-          <a:chExt cx="0" cy="0"/>
-        </a:xfrm>
-      </p:grpSpPr>
-      <p:sp>
-        <p:nvSpPr>
-          <p:cNvPr id="2" name="Slide Image Placeholder 1"/>
-          <p:cNvSpPr>
-            <a:spLocks noGrp="1" noRot="1" noChangeAspect="1"/>
-          </p:cNvSpPr>
-          <p:nvPr>
-            <p:ph type="sldImg"/>
-          </p:nvPr>
-        </p:nvSpPr>
-        <p:spPr/>
-      </p:sp>
-      <p:sp>
-        <p:nvSpPr>
-          <p:cNvPr id="3" name="Notes Placeholder 2"/>
-          <p:cNvSpPr>
-            <a:spLocks noGrp="1"/>
-          </p:cNvSpPr>
-          <p:nvPr>
-            <p:ph type="body" idx="1"/>
-          </p:nvPr>
-        </p:nvSpPr>
-        <p:spPr/>
-        <p:txBody>
-          <a:bodyPr/>
-          <a:lstStyle/>
-          <a:p>
-            <a:endParaRPr lang="en-US"/>
-          </a:p>
-        </p:txBody>
-      </p:sp>
-      <p:sp>
-        <p:nvSpPr>
-          <p:cNvPr id="4" name="Slide Number Placeholder 3"/>
-          <p:cNvSpPr>
-            <a:spLocks noGrp="1"/>
-          </p:cNvSpPr>
-          <p:nvPr>
-            <p:ph type="sldNum" sz="quarter" idx="10"/>
-          </p:nvPr>
-        </p:nvSpPr>
-        <p:spPr/>
-        <p:txBody>
-          <a:bodyPr/>
-          <a:lstStyle/>
-          <a:p>
-            <a:pPr>
-              <a:defRPr/>
-            </a:pPr>
-            <a:fld id="{A1C79070-5394-A64D-8C33-621CF4CC3E24}" type="slidenum">
-              <a:rPr lang="en-US" smtClean="0"/>
-              <a:pPr>
-                <a:defRPr/>
-              </a:pPr>
-              <a:t>3</a:t>
-            </a:fld>
-            <a:endParaRPr lang="en-US"/>
-          </a:p>
-        </p:txBody>
-      </p:sp>
-    </p:spTree>
-    <p:extLst>
-      <p:ext uri="{BB962C8B-B14F-4D97-AF65-F5344CB8AC3E}">
-        <p14:creationId xmlns:p14="http://schemas.microsoft.com/office/powerpoint/2010/main" val="1879989046"/>
-      </p:ext>
-    </p:extLst>
-  </p:cSld>
-  <p:clrMapOvr>
-    <a:masterClrMapping/>
-  </p:clrMapOvr>
-</p:notes>
-</file>
-
-<file path=ppt/notesSlides/notesSlide3.xml><?xml version="1.0" encoding="utf-8"?>
-<p:notes xmlns:a="http://schemas.openxmlformats.org/drawingml/2006/main" xmlns:r="http://schemas.openxmlformats.org/officeDocument/2006/relationships" xmlns:p="http://schemas.openxmlformats.org/presentationml/2006/main">
-  <p:cSld>
-    <p:spTree>
-      <p:nvGrpSpPr>
-        <p:cNvPr id="1" name=""/>
-        <p:cNvGrpSpPr/>
-        <p:nvPr/>
-      </p:nvGrpSpPr>
-      <p:grpSpPr>
-        <a:xfrm>
-          <a:off x="0" y="0"/>
-          <a:ext cx="0" cy="0"/>
-          <a:chOff x="0" y="0"/>
-          <a:chExt cx="0" cy="0"/>
-        </a:xfrm>
-      </p:grpSpPr>
-      <p:sp>
-        <p:nvSpPr>
-          <p:cNvPr id="7" name="Rectangle 7"/>
-          <p:cNvSpPr>
-            <a:spLocks noGrp="1" noChangeArrowheads="1"/>
-          </p:cNvSpPr>
-          <p:nvPr>
-            <p:ph type="sldNum" sz="quarter" idx="5"/>
-          </p:nvPr>
-        </p:nvSpPr>
-        <p:spPr/>
-        <p:txBody>
-          <a:bodyPr/>
-          <a:lstStyle/>
-          <a:p>
-            <a:pPr>
-              <a:defRPr/>
-            </a:pPr>
-            <a:fld id="{9587F554-7162-6645-B8E3-7E808B2BE972}" type="slidenum">
-              <a:rPr lang="en-US"/>
-              <a:pPr>
-                <a:defRPr/>
-              </a:pPr>
-              <a:t>16</a:t>
-            </a:fld>
-            <a:endParaRPr lang="en-US"/>
-          </a:p>
-        </p:txBody>
-      </p:sp>
-      <p:sp>
-        <p:nvSpPr>
-          <p:cNvPr id="272386" name="Rectangle 2"/>
-          <p:cNvSpPr>
-            <a:spLocks noGrp="1" noRot="1" noChangeAspect="1" noChangeArrowheads="1" noTextEdit="1"/>
-          </p:cNvSpPr>
-          <p:nvPr>
-            <p:ph type="sldImg"/>
-          </p:nvPr>
-        </p:nvSpPr>
-        <p:spPr>
-          <a:ln/>
-          <a:extLst>
-            <a:ext uri="{FAA26D3D-D897-4be2-8F04-BA451C77F1D7}">
-              <ma14:placeholderFlag xmlns:ma14="http://schemas.microsoft.com/office/mac/drawingml/2011/main" xmlns="" val="1"/>
-            </a:ext>
-          </a:extLst>
-        </p:spPr>
-      </p:sp>
-      <p:sp>
-        <p:nvSpPr>
-          <p:cNvPr id="272387" name="Rectangle 3"/>
-          <p:cNvSpPr>
-            <a:spLocks noGrp="1" noChangeArrowheads="1"/>
-          </p:cNvSpPr>
-          <p:nvPr>
-            <p:ph type="body" idx="1"/>
-          </p:nvPr>
-        </p:nvSpPr>
-        <p:spPr/>
-        <p:txBody>
-          <a:bodyPr/>
-          <a:lstStyle/>
-          <a:p>
-            <a:pPr eaLnBrk="1" hangingPunct="1">
-              <a:defRPr/>
-            </a:pPr>
-            <a:endParaRPr lang="en-US">
-              <a:cs typeface="+mn-cs"/>
-            </a:endParaRPr>
-          </a:p>
-        </p:txBody>
-      </p:sp>
-    </p:spTree>
-  </p:cSld>
-  <p:clrMapOvr>
-    <a:masterClrMapping/>
-  </p:clrMapOvr>
-</p:notes>
-</file>
-
 <file path=ppt/slideLayouts/slideLayout1.xml><?xml version="1.0" encoding="utf-8"?>
 <p:sldLayout xmlns:a="http://schemas.openxmlformats.org/drawingml/2006/main" xmlns:r="http://schemas.openxmlformats.org/officeDocument/2006/relationships" xmlns:p="http://schemas.openxmlformats.org/presentationml/2006/main" type="titleOnly" preserve="1">
   <p:cSld name="Title Only">
@@ -9639,14 +9448,14 @@
           </a:ln>
           <a:extLst>
             <a:ext uri="{909E8E84-426E-40dd-AFC4-6F175D3DCCD1}">
-              <a14:hiddenFill xmlns:a14="http://schemas.microsoft.com/office/drawing/2010/main" xmlns="">
+              <a14:hiddenFill xmlns="" xmlns:a14="http://schemas.microsoft.com/office/drawing/2010/main">
                 <a:solidFill>
                   <a:srgbClr val="FFFFFF"/>
                 </a:solidFill>
               </a14:hiddenFill>
             </a:ext>
             <a:ext uri="{91240B29-F687-4f45-9708-019B960494DF}">
-              <a14:hiddenLine xmlns:a14="http://schemas.microsoft.com/office/drawing/2010/main" xmlns="" w="9525">
+              <a14:hiddenLine xmlns="" xmlns:a14="http://schemas.microsoft.com/office/drawing/2010/main" w="9525">
                 <a:solidFill>
                   <a:srgbClr val="000000"/>
                 </a:solidFill>
@@ -9681,14 +9490,14 @@
           <a:effectLst/>
           <a:extLst>
             <a:ext uri="{909E8E84-426E-40dd-AFC4-6F175D3DCCD1}">
-              <a14:hiddenFill xmlns:a14="http://schemas.microsoft.com/office/drawing/2010/main" xmlns="">
+              <a14:hiddenFill xmlns="" xmlns:a14="http://schemas.microsoft.com/office/drawing/2010/main">
                 <a:solidFill>
                   <a:schemeClr val="accent1"/>
                 </a:solidFill>
               </a14:hiddenFill>
             </a:ext>
             <a:ext uri="{91240B29-F687-4f45-9708-019B960494DF}">
-              <a14:hiddenLine xmlns:a14="http://schemas.microsoft.com/office/drawing/2010/main" xmlns="" w="9525">
+              <a14:hiddenLine xmlns="" xmlns:a14="http://schemas.microsoft.com/office/drawing/2010/main" w="9525">
                 <a:solidFill>
                   <a:schemeClr val="tx1"/>
                 </a:solidFill>
@@ -9698,7 +9507,7 @@
               </a14:hiddenLine>
             </a:ext>
             <a:ext uri="{AF507438-7753-43e0-B8FC-AC1667EBCBE1}">
-              <a14:hiddenEffects xmlns:a14="http://schemas.microsoft.com/office/drawing/2010/main" xmlns="">
+              <a14:hiddenEffects xmlns="" xmlns:a14="http://schemas.microsoft.com/office/drawing/2010/main">
                 <a:effectLst>
                   <a:outerShdw blurRad="63500" dist="38099" dir="2700000" algn="ctr" rotWithShape="0">
                     <a:schemeClr val="bg2">
@@ -9748,17 +9557,17 @@
           <a:effectLst/>
           <a:extLst>
             <a:ext uri="{FAA26D3D-D897-4be2-8F04-BA451C77F1D7}">
-              <ma14:placeholderFlag xmlns:ma14="http://schemas.microsoft.com/office/mac/drawingml/2011/main" xmlns="" val="1"/>
+              <ma14:placeholderFlag xmlns="" xmlns:ma14="http://schemas.microsoft.com/office/mac/drawingml/2011/main" val="1"/>
             </a:ext>
             <a:ext uri="{909E8E84-426E-40dd-AFC4-6F175D3DCCD1}">
-              <a14:hiddenFill xmlns:a14="http://schemas.microsoft.com/office/drawing/2010/main" xmlns="">
+              <a14:hiddenFill xmlns="" xmlns:a14="http://schemas.microsoft.com/office/drawing/2010/main">
                 <a:solidFill>
                   <a:schemeClr val="accent1"/>
                 </a:solidFill>
               </a14:hiddenFill>
             </a:ext>
             <a:ext uri="{91240B29-F687-4f45-9708-019B960494DF}">
-              <a14:hiddenLine xmlns:a14="http://schemas.microsoft.com/office/drawing/2010/main" xmlns="" w="9525">
+              <a14:hiddenLine xmlns="" xmlns:a14="http://schemas.microsoft.com/office/drawing/2010/main" w="9525">
                 <a:solidFill>
                   <a:schemeClr val="tx1"/>
                 </a:solidFill>
@@ -9768,7 +9577,7 @@
               </a14:hiddenLine>
             </a:ext>
             <a:ext uri="{AF507438-7753-43e0-B8FC-AC1667EBCBE1}">
-              <a14:hiddenEffects xmlns:a14="http://schemas.microsoft.com/office/drawing/2010/main" xmlns="">
+              <a14:hiddenEffects xmlns="" xmlns:a14="http://schemas.microsoft.com/office/drawing/2010/main">
                 <a:effectLst>
                   <a:outerShdw blurRad="63500" dist="38099" dir="2700000" algn="ctr" rotWithShape="0">
                     <a:schemeClr val="bg2">
@@ -9821,17 +9630,17 @@
           <a:effectLst/>
           <a:extLst>
             <a:ext uri="{FAA26D3D-D897-4be2-8F04-BA451C77F1D7}">
-              <ma14:placeholderFlag xmlns:ma14="http://schemas.microsoft.com/office/mac/drawingml/2011/main" xmlns="" val="1"/>
+              <ma14:placeholderFlag xmlns="" xmlns:ma14="http://schemas.microsoft.com/office/mac/drawingml/2011/main" val="1"/>
             </a:ext>
             <a:ext uri="{909E8E84-426E-40dd-AFC4-6F175D3DCCD1}">
-              <a14:hiddenFill xmlns:a14="http://schemas.microsoft.com/office/drawing/2010/main" xmlns="">
+              <a14:hiddenFill xmlns="" xmlns:a14="http://schemas.microsoft.com/office/drawing/2010/main">
                 <a:solidFill>
                   <a:schemeClr val="accent1"/>
                 </a:solidFill>
               </a14:hiddenFill>
             </a:ext>
             <a:ext uri="{91240B29-F687-4f45-9708-019B960494DF}">
-              <a14:hiddenLine xmlns:a14="http://schemas.microsoft.com/office/drawing/2010/main" xmlns="" w="9525">
+              <a14:hiddenLine xmlns="" xmlns:a14="http://schemas.microsoft.com/office/drawing/2010/main" w="9525">
                 <a:solidFill>
                   <a:schemeClr val="tx1"/>
                 </a:solidFill>
@@ -9841,7 +9650,7 @@
               </a14:hiddenLine>
             </a:ext>
             <a:ext uri="{AF507438-7753-43e0-B8FC-AC1667EBCBE1}">
-              <a14:hiddenEffects xmlns:a14="http://schemas.microsoft.com/office/drawing/2010/main" xmlns="">
+              <a14:hiddenEffects xmlns="" xmlns:a14="http://schemas.microsoft.com/office/drawing/2010/main">
                 <a:effectLst>
                   <a:outerShdw blurRad="63500" dist="38099" dir="2700000" algn="ctr" rotWithShape="0">
                     <a:schemeClr val="bg2">
@@ -10390,14 +10199,14 @@
           </a:ln>
           <a:extLst>
             <a:ext uri="{909E8E84-426E-40dd-AFC4-6F175D3DCCD1}">
-              <a14:hiddenFill xmlns:a14="http://schemas.microsoft.com/office/drawing/2010/main" xmlns="">
+              <a14:hiddenFill xmlns="" xmlns:a14="http://schemas.microsoft.com/office/drawing/2010/main">
                 <a:solidFill>
                   <a:srgbClr val="FFFFFF"/>
                 </a:solidFill>
               </a14:hiddenFill>
             </a:ext>
             <a:ext uri="{91240B29-F687-4f45-9708-019B960494DF}">
-              <a14:hiddenLine xmlns:a14="http://schemas.microsoft.com/office/drawing/2010/main" xmlns="" w="9525">
+              <a14:hiddenLine xmlns="" xmlns:a14="http://schemas.microsoft.com/office/drawing/2010/main" w="9525">
                 <a:solidFill>
                   <a:srgbClr val="000000"/>
                 </a:solidFill>
@@ -10434,17 +10243,17 @@
           <a:effectLst/>
           <a:extLst>
             <a:ext uri="{FAA26D3D-D897-4be2-8F04-BA451C77F1D7}">
-              <ma14:placeholderFlag xmlns:ma14="http://schemas.microsoft.com/office/mac/drawingml/2011/main" xmlns="" val="1"/>
+              <ma14:placeholderFlag xmlns="" xmlns:ma14="http://schemas.microsoft.com/office/mac/drawingml/2011/main" val="1"/>
             </a:ext>
             <a:ext uri="{909E8E84-426E-40dd-AFC4-6F175D3DCCD1}">
-              <a14:hiddenFill xmlns:a14="http://schemas.microsoft.com/office/drawing/2010/main" xmlns="">
+              <a14:hiddenFill xmlns="" xmlns:a14="http://schemas.microsoft.com/office/drawing/2010/main">
                 <a:solidFill>
                   <a:schemeClr val="accent1"/>
                 </a:solidFill>
               </a14:hiddenFill>
             </a:ext>
             <a:ext uri="{91240B29-F687-4f45-9708-019B960494DF}">
-              <a14:hiddenLine xmlns:a14="http://schemas.microsoft.com/office/drawing/2010/main" xmlns="" w="9525">
+              <a14:hiddenLine xmlns="" xmlns:a14="http://schemas.microsoft.com/office/drawing/2010/main" w="9525">
                 <a:solidFill>
                   <a:schemeClr val="tx1"/>
                 </a:solidFill>
@@ -10454,7 +10263,7 @@
               </a14:hiddenLine>
             </a:ext>
             <a:ext uri="{AF507438-7753-43e0-B8FC-AC1667EBCBE1}">
-              <a14:hiddenEffects xmlns:a14="http://schemas.microsoft.com/office/drawing/2010/main" xmlns="">
+              <a14:hiddenEffects xmlns="" xmlns:a14="http://schemas.microsoft.com/office/drawing/2010/main">
                 <a:effectLst>
                   <a:outerShdw blurRad="63500" dist="38099" dir="2700000" algn="ctr" rotWithShape="0">
                     <a:schemeClr val="bg2">
@@ -10507,17 +10316,17 @@
           <a:effectLst/>
           <a:extLst>
             <a:ext uri="{FAA26D3D-D897-4be2-8F04-BA451C77F1D7}">
-              <ma14:placeholderFlag xmlns:ma14="http://schemas.microsoft.com/office/mac/drawingml/2011/main" xmlns="" val="1"/>
+              <ma14:placeholderFlag xmlns="" xmlns:ma14="http://schemas.microsoft.com/office/mac/drawingml/2011/main" val="1"/>
             </a:ext>
             <a:ext uri="{909E8E84-426E-40dd-AFC4-6F175D3DCCD1}">
-              <a14:hiddenFill xmlns:a14="http://schemas.microsoft.com/office/drawing/2010/main" xmlns="">
+              <a14:hiddenFill xmlns="" xmlns:a14="http://schemas.microsoft.com/office/drawing/2010/main">
                 <a:solidFill>
                   <a:schemeClr val="accent1"/>
                 </a:solidFill>
               </a14:hiddenFill>
             </a:ext>
             <a:ext uri="{91240B29-F687-4f45-9708-019B960494DF}">
-              <a14:hiddenLine xmlns:a14="http://schemas.microsoft.com/office/drawing/2010/main" xmlns="" w="9525">
+              <a14:hiddenLine xmlns="" xmlns:a14="http://schemas.microsoft.com/office/drawing/2010/main" w="9525">
                 <a:solidFill>
                   <a:schemeClr val="tx1"/>
                 </a:solidFill>
@@ -10527,7 +10336,7 @@
               </a14:hiddenLine>
             </a:ext>
             <a:ext uri="{AF507438-7753-43e0-B8FC-AC1667EBCBE1}">
-              <a14:hiddenEffects xmlns:a14="http://schemas.microsoft.com/office/drawing/2010/main" xmlns="">
+              <a14:hiddenEffects xmlns="" xmlns:a14="http://schemas.microsoft.com/office/drawing/2010/main">
                 <a:effectLst>
                   <a:outerShdw blurRad="63500" dist="38099" dir="2700000" algn="ctr" rotWithShape="0">
                     <a:schemeClr val="bg2">
@@ -10602,17 +10411,17 @@
           <a:effectLst/>
           <a:extLst>
             <a:ext uri="{FAA26D3D-D897-4be2-8F04-BA451C77F1D7}">
-              <ma14:placeholderFlag xmlns:ma14="http://schemas.microsoft.com/office/mac/drawingml/2011/main" xmlns="" val="1"/>
+              <ma14:placeholderFlag xmlns="" xmlns:ma14="http://schemas.microsoft.com/office/mac/drawingml/2011/main" val="1"/>
             </a:ext>
             <a:ext uri="{909E8E84-426E-40dd-AFC4-6F175D3DCCD1}">
-              <a14:hiddenFill xmlns:a14="http://schemas.microsoft.com/office/drawing/2010/main" xmlns="">
+              <a14:hiddenFill xmlns="" xmlns:a14="http://schemas.microsoft.com/office/drawing/2010/main">
                 <a:solidFill>
                   <a:schemeClr val="accent1"/>
                 </a:solidFill>
               </a14:hiddenFill>
             </a:ext>
             <a:ext uri="{91240B29-F687-4f45-9708-019B960494DF}">
-              <a14:hiddenLine xmlns:a14="http://schemas.microsoft.com/office/drawing/2010/main" xmlns="" w="9525">
+              <a14:hiddenLine xmlns="" xmlns:a14="http://schemas.microsoft.com/office/drawing/2010/main" w="9525">
                 <a:solidFill>
                   <a:schemeClr val="tx1"/>
                 </a:solidFill>
@@ -10622,7 +10431,7 @@
               </a14:hiddenLine>
             </a:ext>
             <a:ext uri="{AF507438-7753-43e0-B8FC-AC1667EBCBE1}">
-              <a14:hiddenEffects xmlns:a14="http://schemas.microsoft.com/office/drawing/2010/main" xmlns="">
+              <a14:hiddenEffects xmlns="" xmlns:a14="http://schemas.microsoft.com/office/drawing/2010/main">
                 <a:effectLst>
                   <a:outerShdw blurRad="63500" dist="38099" dir="2700000" algn="ctr" rotWithShape="0">
                     <a:schemeClr val="bg2">
@@ -10684,17 +10493,17 @@
           <a:effectLst/>
           <a:extLst>
             <a:ext uri="{FAA26D3D-D897-4be2-8F04-BA451C77F1D7}">
-              <ma14:placeholderFlag xmlns:ma14="http://schemas.microsoft.com/office/mac/drawingml/2011/main" xmlns="" val="1"/>
+              <ma14:placeholderFlag xmlns="" xmlns:ma14="http://schemas.microsoft.com/office/mac/drawingml/2011/main" val="1"/>
             </a:ext>
             <a:ext uri="{909E8E84-426E-40dd-AFC4-6F175D3DCCD1}">
-              <a14:hiddenFill xmlns:a14="http://schemas.microsoft.com/office/drawing/2010/main" xmlns="">
+              <a14:hiddenFill xmlns="" xmlns:a14="http://schemas.microsoft.com/office/drawing/2010/main">
                 <a:solidFill>
                   <a:schemeClr val="accent1"/>
                 </a:solidFill>
               </a14:hiddenFill>
             </a:ext>
             <a:ext uri="{91240B29-F687-4f45-9708-019B960494DF}">
-              <a14:hiddenLine xmlns:a14="http://schemas.microsoft.com/office/drawing/2010/main" xmlns="" w="9525">
+              <a14:hiddenLine xmlns="" xmlns:a14="http://schemas.microsoft.com/office/drawing/2010/main" w="9525">
                 <a:solidFill>
                   <a:schemeClr val="tx1"/>
                 </a:solidFill>
@@ -10704,7 +10513,7 @@
               </a14:hiddenLine>
             </a:ext>
             <a:ext uri="{AF507438-7753-43e0-B8FC-AC1667EBCBE1}">
-              <a14:hiddenEffects xmlns:a14="http://schemas.microsoft.com/office/drawing/2010/main" xmlns="">
+              <a14:hiddenEffects xmlns="" xmlns:a14="http://schemas.microsoft.com/office/drawing/2010/main">
                 <a:effectLst>
                   <a:outerShdw blurRad="63500" dist="38099" dir="2700000" algn="ctr" rotWithShape="0">
                     <a:schemeClr val="bg2">
@@ -11250,14 +11059,14 @@
           </a:ln>
           <a:extLst>
             <a:ext uri="{909E8E84-426E-40dd-AFC4-6F175D3DCCD1}">
-              <a14:hiddenFill xmlns:a14="http://schemas.microsoft.com/office/drawing/2010/main" xmlns="">
+              <a14:hiddenFill xmlns="" xmlns:a14="http://schemas.microsoft.com/office/drawing/2010/main">
                 <a:solidFill>
                   <a:srgbClr val="FFFFFF"/>
                 </a:solidFill>
               </a14:hiddenFill>
             </a:ext>
             <a:ext uri="{91240B29-F687-4f45-9708-019B960494DF}">
-              <a14:hiddenLine xmlns:a14="http://schemas.microsoft.com/office/drawing/2010/main" xmlns="" w="9525">
+              <a14:hiddenLine xmlns="" xmlns:a14="http://schemas.microsoft.com/office/drawing/2010/main" w="9525">
                 <a:solidFill>
                   <a:srgbClr val="000000"/>
                 </a:solidFill>
@@ -11294,17 +11103,17 @@
           <a:effectLst/>
           <a:extLst>
             <a:ext uri="{FAA26D3D-D897-4be2-8F04-BA451C77F1D7}">
-              <ma14:placeholderFlag xmlns:ma14="http://schemas.microsoft.com/office/mac/drawingml/2011/main" xmlns="" val="1"/>
+              <ma14:placeholderFlag xmlns="" xmlns:ma14="http://schemas.microsoft.com/office/mac/drawingml/2011/main" val="1"/>
             </a:ext>
             <a:ext uri="{909E8E84-426E-40dd-AFC4-6F175D3DCCD1}">
-              <a14:hiddenFill xmlns:a14="http://schemas.microsoft.com/office/drawing/2010/main" xmlns="">
+              <a14:hiddenFill xmlns="" xmlns:a14="http://schemas.microsoft.com/office/drawing/2010/main">
                 <a:solidFill>
                   <a:schemeClr val="accent1"/>
                 </a:solidFill>
               </a14:hiddenFill>
             </a:ext>
             <a:ext uri="{91240B29-F687-4f45-9708-019B960494DF}">
-              <a14:hiddenLine xmlns:a14="http://schemas.microsoft.com/office/drawing/2010/main" xmlns="" w="9525">
+              <a14:hiddenLine xmlns="" xmlns:a14="http://schemas.microsoft.com/office/drawing/2010/main" w="9525">
                 <a:solidFill>
                   <a:schemeClr val="tx1"/>
                 </a:solidFill>
@@ -11314,7 +11123,7 @@
               </a14:hiddenLine>
             </a:ext>
             <a:ext uri="{AF507438-7753-43e0-B8FC-AC1667EBCBE1}">
-              <a14:hiddenEffects xmlns:a14="http://schemas.microsoft.com/office/drawing/2010/main" xmlns="">
+              <a14:hiddenEffects xmlns="" xmlns:a14="http://schemas.microsoft.com/office/drawing/2010/main">
                 <a:effectLst>
                   <a:outerShdw blurRad="63500" dist="38099" dir="2700000" algn="ctr" rotWithShape="0">
                     <a:schemeClr val="bg2">
@@ -11367,17 +11176,17 @@
           <a:effectLst/>
           <a:extLst>
             <a:ext uri="{FAA26D3D-D897-4be2-8F04-BA451C77F1D7}">
-              <ma14:placeholderFlag xmlns:ma14="http://schemas.microsoft.com/office/mac/drawingml/2011/main" xmlns="" val="1"/>
+              <ma14:placeholderFlag xmlns="" xmlns:ma14="http://schemas.microsoft.com/office/mac/drawingml/2011/main" val="1"/>
             </a:ext>
             <a:ext uri="{909E8E84-426E-40dd-AFC4-6F175D3DCCD1}">
-              <a14:hiddenFill xmlns:a14="http://schemas.microsoft.com/office/drawing/2010/main" xmlns="">
+              <a14:hiddenFill xmlns="" xmlns:a14="http://schemas.microsoft.com/office/drawing/2010/main">
                 <a:solidFill>
                   <a:schemeClr val="accent1"/>
                 </a:solidFill>
               </a14:hiddenFill>
             </a:ext>
             <a:ext uri="{91240B29-F687-4f45-9708-019B960494DF}">
-              <a14:hiddenLine xmlns:a14="http://schemas.microsoft.com/office/drawing/2010/main" xmlns="" w="9525">
+              <a14:hiddenLine xmlns="" xmlns:a14="http://schemas.microsoft.com/office/drawing/2010/main" w="9525">
                 <a:solidFill>
                   <a:schemeClr val="tx1"/>
                 </a:solidFill>
@@ -11387,7 +11196,7 @@
               </a14:hiddenLine>
             </a:ext>
             <a:ext uri="{AF507438-7753-43e0-B8FC-AC1667EBCBE1}">
-              <a14:hiddenEffects xmlns:a14="http://schemas.microsoft.com/office/drawing/2010/main" xmlns="">
+              <a14:hiddenEffects xmlns="" xmlns:a14="http://schemas.microsoft.com/office/drawing/2010/main">
                 <a:effectLst>
                   <a:outerShdw blurRad="63500" dist="38099" dir="2700000" algn="ctr" rotWithShape="0">
                     <a:schemeClr val="bg2">
@@ -11462,17 +11271,17 @@
           <a:effectLst/>
           <a:extLst>
             <a:ext uri="{FAA26D3D-D897-4be2-8F04-BA451C77F1D7}">
-              <ma14:placeholderFlag xmlns:ma14="http://schemas.microsoft.com/office/mac/drawingml/2011/main" xmlns="" val="1"/>
+              <ma14:placeholderFlag xmlns="" xmlns:ma14="http://schemas.microsoft.com/office/mac/drawingml/2011/main" val="1"/>
             </a:ext>
             <a:ext uri="{909E8E84-426E-40dd-AFC4-6F175D3DCCD1}">
-              <a14:hiddenFill xmlns:a14="http://schemas.microsoft.com/office/drawing/2010/main" xmlns="">
+              <a14:hiddenFill xmlns="" xmlns:a14="http://schemas.microsoft.com/office/drawing/2010/main">
                 <a:solidFill>
                   <a:schemeClr val="accent1"/>
                 </a:solidFill>
               </a14:hiddenFill>
             </a:ext>
             <a:ext uri="{91240B29-F687-4f45-9708-019B960494DF}">
-              <a14:hiddenLine xmlns:a14="http://schemas.microsoft.com/office/drawing/2010/main" xmlns="" w="9525">
+              <a14:hiddenLine xmlns="" xmlns:a14="http://schemas.microsoft.com/office/drawing/2010/main" w="9525">
                 <a:solidFill>
                   <a:schemeClr val="tx1"/>
                 </a:solidFill>
@@ -11482,7 +11291,7 @@
               </a14:hiddenLine>
             </a:ext>
             <a:ext uri="{AF507438-7753-43e0-B8FC-AC1667EBCBE1}">
-              <a14:hiddenEffects xmlns:a14="http://schemas.microsoft.com/office/drawing/2010/main" xmlns="">
+              <a14:hiddenEffects xmlns="" xmlns:a14="http://schemas.microsoft.com/office/drawing/2010/main">
                 <a:effectLst>
                   <a:outerShdw blurRad="63500" dist="38099" dir="2700000" algn="ctr" rotWithShape="0">
                     <a:schemeClr val="bg2">
@@ -11552,17 +11361,17 @@
           <a:effectLst/>
           <a:extLst>
             <a:ext uri="{FAA26D3D-D897-4be2-8F04-BA451C77F1D7}">
-              <ma14:placeholderFlag xmlns:ma14="http://schemas.microsoft.com/office/mac/drawingml/2011/main" xmlns="" val="1"/>
+              <ma14:placeholderFlag xmlns="" xmlns:ma14="http://schemas.microsoft.com/office/mac/drawingml/2011/main" val="1"/>
             </a:ext>
             <a:ext uri="{909E8E84-426E-40dd-AFC4-6F175D3DCCD1}">
-              <a14:hiddenFill xmlns:a14="http://schemas.microsoft.com/office/drawing/2010/main" xmlns="">
+              <a14:hiddenFill xmlns="" xmlns:a14="http://schemas.microsoft.com/office/drawing/2010/main">
                 <a:solidFill>
                   <a:schemeClr val="accent1"/>
                 </a:solidFill>
               </a14:hiddenFill>
             </a:ext>
             <a:ext uri="{91240B29-F687-4f45-9708-019B960494DF}">
-              <a14:hiddenLine xmlns:a14="http://schemas.microsoft.com/office/drawing/2010/main" xmlns="" w="9525">
+              <a14:hiddenLine xmlns="" xmlns:a14="http://schemas.microsoft.com/office/drawing/2010/main" w="9525">
                 <a:solidFill>
                   <a:schemeClr val="tx1"/>
                 </a:solidFill>
@@ -11572,7 +11381,7 @@
               </a14:hiddenLine>
             </a:ext>
             <a:ext uri="{AF507438-7753-43e0-B8FC-AC1667EBCBE1}">
-              <a14:hiddenEffects xmlns:a14="http://schemas.microsoft.com/office/drawing/2010/main" xmlns="">
+              <a14:hiddenEffects xmlns="" xmlns:a14="http://schemas.microsoft.com/office/drawing/2010/main">
                 <a:effectLst>
                   <a:outerShdw blurRad="63500" dist="38099" dir="2700000" algn="ctr" rotWithShape="0">
                     <a:schemeClr val="bg2">
@@ -12280,17 +12089,17 @@
           <a:effectLst/>
           <a:extLst>
             <a:ext uri="{FAA26D3D-D897-4be2-8F04-BA451C77F1D7}">
-              <ma14:placeholderFlag xmlns:ma14="http://schemas.microsoft.com/office/mac/drawingml/2011/main" xmlns="" val="1"/>
+              <ma14:placeholderFlag xmlns="" xmlns:ma14="http://schemas.microsoft.com/office/mac/drawingml/2011/main" val="1"/>
             </a:ext>
             <a:ext uri="{909E8E84-426E-40dd-AFC4-6F175D3DCCD1}">
-              <a14:hiddenFill xmlns:a14="http://schemas.microsoft.com/office/drawing/2010/main" xmlns="">
+              <a14:hiddenFill xmlns="" xmlns:a14="http://schemas.microsoft.com/office/drawing/2010/main">
                 <a:solidFill>
                   <a:schemeClr val="accent1"/>
                 </a:solidFill>
               </a14:hiddenFill>
             </a:ext>
             <a:ext uri="{91240B29-F687-4f45-9708-019B960494DF}">
-              <a14:hiddenLine xmlns:a14="http://schemas.microsoft.com/office/drawing/2010/main" xmlns="" w="9525">
+              <a14:hiddenLine xmlns="" xmlns:a14="http://schemas.microsoft.com/office/drawing/2010/main" w="9525">
                 <a:solidFill>
                   <a:schemeClr val="tx1"/>
                 </a:solidFill>
@@ -12300,7 +12109,7 @@
               </a14:hiddenLine>
             </a:ext>
             <a:ext uri="{AF507438-7753-43e0-B8FC-AC1667EBCBE1}">
-              <a14:hiddenEffects xmlns:a14="http://schemas.microsoft.com/office/drawing/2010/main" xmlns="">
+              <a14:hiddenEffects xmlns="" xmlns:a14="http://schemas.microsoft.com/office/drawing/2010/main">
                 <a:effectLst>
                   <a:outerShdw blurRad="63500" dist="38099" dir="2700000" algn="ctr" rotWithShape="0">
                     <a:schemeClr val="bg2">
@@ -12570,683 +12379,6 @@
       </p:grpSpPr>
       <p:sp>
         <p:nvSpPr>
-          <p:cNvPr id="12" name="Titel 11">
-            <a:extLst>
-              <a:ext uri="{FF2B5EF4-FFF2-40B4-BE49-F238E27FC236}">
-                <a16:creationId xmlns:a16="http://schemas.microsoft.com/office/drawing/2014/main" id="{A6C54B4B-AE3E-2E4C-B9C0-DC0AF6A1C1A4}"/>
-              </a:ext>
-            </a:extLst>
-          </p:cNvPr>
-          <p:cNvSpPr>
-            <a:spLocks noGrp="1"/>
-          </p:cNvSpPr>
-          <p:nvPr>
-            <p:ph type="title"/>
-          </p:nvPr>
-        </p:nvSpPr>
-        <p:spPr/>
-        <p:txBody>
-          <a:bodyPr/>
-          <a:lstStyle/>
-          <a:p>
-            <a:r>
-              <a:rPr lang="en-GB" dirty="0"/>
-              <a:t>No chance to be a hero</a:t>
-            </a:r>
-          </a:p>
-        </p:txBody>
-      </p:sp>
-      <p:pic>
-        <p:nvPicPr>
-          <p:cNvPr id="8" name="Inhaltsplatzhalter 7">
-            <a:extLst>
-              <a:ext uri="{FF2B5EF4-FFF2-40B4-BE49-F238E27FC236}">
-                <a16:creationId xmlns:a16="http://schemas.microsoft.com/office/drawing/2014/main" id="{1E2EE3AD-4704-EB44-820B-16616D4041CE}"/>
-              </a:ext>
-            </a:extLst>
-          </p:cNvPr>
-          <p:cNvPicPr>
-            <a:picLocks noGrp="1" noChangeAspect="1"/>
-          </p:cNvPicPr>
-          <p:nvPr>
-            <p:ph idx="1"/>
-          </p:nvPr>
-        </p:nvPicPr>
-        <p:blipFill>
-          <a:blip r:embed="rId2"/>
-          <a:stretch>
-            <a:fillRect/>
-          </a:stretch>
-        </p:blipFill>
-        <p:spPr>
-          <a:xfrm>
-            <a:off x="1042296" y="2020469"/>
-            <a:ext cx="7059407" cy="3071876"/>
-          </a:xfrm>
-        </p:spPr>
-      </p:pic>
-      <p:sp>
-        <p:nvSpPr>
-          <p:cNvPr id="5" name="Fußzeilenplatzhalter 4">
-            <a:extLst>
-              <a:ext uri="{FF2B5EF4-FFF2-40B4-BE49-F238E27FC236}">
-                <a16:creationId xmlns:a16="http://schemas.microsoft.com/office/drawing/2014/main" id="{D6F43738-BC53-8B4E-8CF1-34314A96B5CE}"/>
-              </a:ext>
-            </a:extLst>
-          </p:cNvPr>
-          <p:cNvSpPr>
-            <a:spLocks noGrp="1"/>
-          </p:cNvSpPr>
-          <p:nvPr>
-            <p:ph type="ftr" sz="quarter" idx="10"/>
-          </p:nvPr>
-        </p:nvSpPr>
-        <p:spPr/>
-        <p:txBody>
-          <a:bodyPr/>
-          <a:lstStyle/>
-          <a:p>
-            <a:pPr>
-              <a:defRPr/>
-            </a:pPr>
-            <a:r>
-              <a:rPr lang="en-US"/>
-              <a:t>M3AAWG 43rd General Meeting | Munich | June 2018</a:t>
-            </a:r>
-          </a:p>
-        </p:txBody>
-      </p:sp>
-      <p:sp>
-        <p:nvSpPr>
-          <p:cNvPr id="6" name="Textfeld 5">
-            <a:extLst>
-              <a:ext uri="{FF2B5EF4-FFF2-40B4-BE49-F238E27FC236}">
-                <a16:creationId xmlns:a16="http://schemas.microsoft.com/office/drawing/2014/main" id="{009BBC69-B294-0D48-BF1D-108F494DE824}"/>
-              </a:ext>
-            </a:extLst>
-          </p:cNvPr>
-          <p:cNvSpPr txBox="1"/>
-          <p:nvPr/>
-        </p:nvSpPr>
-        <p:spPr>
-          <a:xfrm>
-            <a:off x="5541264" y="5971401"/>
-            <a:ext cx="3167855" cy="276999"/>
-          </a:xfrm>
-          <a:prstGeom prst="rect">
-            <a:avLst/>
-          </a:prstGeom>
-          <a:noFill/>
-        </p:spPr>
-        <p:txBody>
-          <a:bodyPr wrap="none" rtlCol="0">
-            <a:spAutoFit/>
-          </a:bodyPr>
-          <a:lstStyle/>
-          <a:p>
-            <a:r>
-              <a:rPr lang="en-GB" sz="1200" dirty="0">
-                <a:solidFill>
-                  <a:schemeClr val="bg1">
-                    <a:lumMod val="50000"/>
-                  </a:schemeClr>
-                </a:solidFill>
-              </a:rPr>
-              <a:t>https://</a:t>
-            </a:r>
-            <a:r>
-              <a:rPr lang="en-GB" sz="1200" dirty="0" err="1">
-                <a:solidFill>
-                  <a:schemeClr val="bg1">
-                    <a:lumMod val="50000"/>
-                  </a:schemeClr>
-                </a:solidFill>
-              </a:rPr>
-              <a:t>en.wikipedia.org</a:t>
-            </a:r>
-            <a:r>
-              <a:rPr lang="en-GB" sz="1200" dirty="0">
-                <a:solidFill>
-                  <a:schemeClr val="bg1">
-                    <a:lumMod val="50000"/>
-                  </a:schemeClr>
-                </a:solidFill>
-              </a:rPr>
-              <a:t>/wiki/</a:t>
-            </a:r>
-            <a:r>
-              <a:rPr lang="en-GB" sz="1200" dirty="0" err="1">
-                <a:solidFill>
-                  <a:schemeClr val="bg1">
-                    <a:lumMod val="50000"/>
-                  </a:schemeClr>
-                </a:solidFill>
-              </a:rPr>
-              <a:t>Justice_League</a:t>
-            </a:r>
-            <a:endParaRPr lang="en-GB" sz="1200" dirty="0">
-              <a:solidFill>
-                <a:schemeClr val="bg1">
-                  <a:lumMod val="50000"/>
-                </a:schemeClr>
-              </a:solidFill>
-            </a:endParaRPr>
-          </a:p>
-        </p:txBody>
-      </p:sp>
-      <p:sp>
-        <p:nvSpPr>
-          <p:cNvPr id="14" name="&quot;Nein&quot;-Symbol 13">
-            <a:extLst>
-              <a:ext uri="{FF2B5EF4-FFF2-40B4-BE49-F238E27FC236}">
-                <a16:creationId xmlns:a16="http://schemas.microsoft.com/office/drawing/2014/main" id="{502D7FBE-203E-9C46-A40C-84B7618823F7}"/>
-              </a:ext>
-            </a:extLst>
-          </p:cNvPr>
-          <p:cNvSpPr/>
-          <p:nvPr/>
-        </p:nvSpPr>
-        <p:spPr>
-          <a:xfrm>
-            <a:off x="1769274" y="1079882"/>
-            <a:ext cx="5445341" cy="5030018"/>
-          </a:xfrm>
-          <a:prstGeom prst="noSmoking">
-            <a:avLst/>
-          </a:prstGeom>
-          <a:solidFill>
-            <a:srgbClr val="FF0000"/>
-          </a:solidFill>
-          <a:ln>
-            <a:solidFill>
-              <a:srgbClr val="FF0000"/>
-            </a:solidFill>
-          </a:ln>
-        </p:spPr>
-        <p:style>
-          <a:lnRef idx="1">
-            <a:schemeClr val="accent1"/>
-          </a:lnRef>
-          <a:fillRef idx="3">
-            <a:schemeClr val="accent1"/>
-          </a:fillRef>
-          <a:effectRef idx="2">
-            <a:schemeClr val="accent1"/>
-          </a:effectRef>
-          <a:fontRef idx="minor">
-            <a:schemeClr val="lt1"/>
-          </a:fontRef>
-        </p:style>
-        <p:txBody>
-          <a:bodyPr rtlCol="0" anchor="ctr"/>
-          <a:lstStyle/>
-          <a:p>
-            <a:pPr algn="ctr"/>
-            <a:endParaRPr lang="en-GB">
-              <a:solidFill>
-                <a:schemeClr val="tx1"/>
-              </a:solidFill>
-            </a:endParaRPr>
-          </a:p>
-        </p:txBody>
-      </p:sp>
-    </p:spTree>
-    <p:extLst>
-      <p:ext uri="{BB962C8B-B14F-4D97-AF65-F5344CB8AC3E}">
-        <p14:creationId xmlns:p14="http://schemas.microsoft.com/office/powerpoint/2010/main" val="1095334928"/>
-      </p:ext>
-    </p:extLst>
-  </p:cSld>
-  <p:clrMapOvr>
-    <a:masterClrMapping/>
-  </p:clrMapOvr>
-  <p:timing>
-    <p:tnLst>
-      <p:par>
-        <p:cTn id="1" dur="indefinite" restart="never" nodeType="tmRoot">
-          <p:childTnLst>
-            <p:seq concurrent="1" nextAc="seek">
-              <p:cTn id="2" dur="indefinite" nodeType="mainSeq">
-                <p:childTnLst>
-                  <p:par>
-                    <p:cTn id="3" fill="hold">
-                      <p:stCondLst>
-                        <p:cond delay="indefinite"/>
-                      </p:stCondLst>
-                      <p:childTnLst>
-                        <p:par>
-                          <p:cTn id="4" fill="hold">
-                            <p:stCondLst>
-                              <p:cond delay="0"/>
-                            </p:stCondLst>
-                            <p:childTnLst>
-                              <p:par>
-                                <p:cTn id="5" presetID="1" presetClass="entr" presetSubtype="0" fill="hold" grpId="0" nodeType="clickEffect">
-                                  <p:stCondLst>
-                                    <p:cond delay="0"/>
-                                  </p:stCondLst>
-                                  <p:childTnLst>
-                                    <p:set>
-                                      <p:cBhvr>
-                                        <p:cTn id="6" dur="1" fill="hold">
-                                          <p:stCondLst>
-                                            <p:cond delay="0"/>
-                                          </p:stCondLst>
-                                        </p:cTn>
-                                        <p:tgtEl>
-                                          <p:spTgt spid="14"/>
-                                        </p:tgtEl>
-                                        <p:attrNameLst>
-                                          <p:attrName>style.visibility</p:attrName>
-                                        </p:attrNameLst>
-                                      </p:cBhvr>
-                                      <p:to>
-                                        <p:strVal val="visible"/>
-                                      </p:to>
-                                    </p:set>
-                                  </p:childTnLst>
-                                </p:cTn>
-                              </p:par>
-                              <p:par>
-                                <p:cTn id="7" presetID="1" presetClass="entr" presetSubtype="0" fill="hold" grpId="0" nodeType="withEffect">
-                                  <p:stCondLst>
-                                    <p:cond delay="0"/>
-                                  </p:stCondLst>
-                                  <p:childTnLst>
-                                    <p:set>
-                                      <p:cBhvr>
-                                        <p:cTn id="8" dur="1" fill="hold">
-                                          <p:stCondLst>
-                                            <p:cond delay="0"/>
-                                          </p:stCondLst>
-                                        </p:cTn>
-                                        <p:tgtEl>
-                                          <p:spTgt spid="12"/>
-                                        </p:tgtEl>
-                                        <p:attrNameLst>
-                                          <p:attrName>style.visibility</p:attrName>
-                                        </p:attrNameLst>
-                                      </p:cBhvr>
-                                      <p:to>
-                                        <p:strVal val="visible"/>
-                                      </p:to>
-                                    </p:set>
-                                  </p:childTnLst>
-                                </p:cTn>
-                              </p:par>
-                            </p:childTnLst>
-                          </p:cTn>
-                        </p:par>
-                      </p:childTnLst>
-                    </p:cTn>
-                  </p:par>
-                </p:childTnLst>
-              </p:cTn>
-              <p:prevCondLst>
-                <p:cond evt="onPrev" delay="0">
-                  <p:tgtEl>
-                    <p:sldTgt/>
-                  </p:tgtEl>
-                </p:cond>
-              </p:prevCondLst>
-              <p:nextCondLst>
-                <p:cond evt="onNext" delay="0">
-                  <p:tgtEl>
-                    <p:sldTgt/>
-                  </p:tgtEl>
-                </p:cond>
-              </p:nextCondLst>
-            </p:seq>
-          </p:childTnLst>
-        </p:cTn>
-      </p:par>
-    </p:tnLst>
-    <p:bldLst>
-      <p:bldP spid="12" grpId="0"/>
-      <p:bldP spid="14" grpId="0" animBg="1"/>
-    </p:bldLst>
-  </p:timing>
-</p:sld>
-</file>
-
-<file path=ppt/slides/slide11.xml><?xml version="1.0" encoding="utf-8"?>
-<p:sld xmlns:a="http://schemas.openxmlformats.org/drawingml/2006/main" xmlns:r="http://schemas.openxmlformats.org/officeDocument/2006/relationships" xmlns:p="http://schemas.openxmlformats.org/presentationml/2006/main">
-  <p:cSld>
-    <p:spTree>
-      <p:nvGrpSpPr>
-        <p:cNvPr id="1" name=""/>
-        <p:cNvGrpSpPr/>
-        <p:nvPr/>
-      </p:nvGrpSpPr>
-      <p:grpSpPr>
-        <a:xfrm>
-          <a:off x="0" y="0"/>
-          <a:ext cx="0" cy="0"/>
-          <a:chOff x="0" y="0"/>
-          <a:chExt cx="0" cy="0"/>
-        </a:xfrm>
-      </p:grpSpPr>
-      <p:sp>
-        <p:nvSpPr>
-          <p:cNvPr id="12" name="Titel 11">
-            <a:extLst>
-              <a:ext uri="{FF2B5EF4-FFF2-40B4-BE49-F238E27FC236}">
-                <a16:creationId xmlns:a16="http://schemas.microsoft.com/office/drawing/2014/main" id="{A6C54B4B-AE3E-2E4C-B9C0-DC0AF6A1C1A4}"/>
-              </a:ext>
-            </a:extLst>
-          </p:cNvPr>
-          <p:cNvSpPr>
-            <a:spLocks noGrp="1"/>
-          </p:cNvSpPr>
-          <p:nvPr>
-            <p:ph type="title"/>
-          </p:nvPr>
-        </p:nvSpPr>
-        <p:spPr/>
-        <p:txBody>
-          <a:bodyPr/>
-          <a:lstStyle/>
-          <a:p>
-            <a:r>
-              <a:rPr lang="en-GB" dirty="0"/>
-              <a:t>It’s all about prevention and dirt work</a:t>
-            </a:r>
-          </a:p>
-        </p:txBody>
-      </p:sp>
-      <p:pic>
-        <p:nvPicPr>
-          <p:cNvPr id="8" name="Inhaltsplatzhalter 7">
-            <a:extLst>
-              <a:ext uri="{FF2B5EF4-FFF2-40B4-BE49-F238E27FC236}">
-                <a16:creationId xmlns:a16="http://schemas.microsoft.com/office/drawing/2014/main" id="{1E2EE3AD-4704-EB44-820B-16616D4041CE}"/>
-              </a:ext>
-            </a:extLst>
-          </p:cNvPr>
-          <p:cNvPicPr>
-            <a:picLocks noGrp="1" noChangeAspect="1"/>
-          </p:cNvPicPr>
-          <p:nvPr>
-            <p:ph idx="1"/>
-          </p:nvPr>
-        </p:nvPicPr>
-        <p:blipFill>
-          <a:blip r:embed="rId2"/>
-          <a:stretch>
-            <a:fillRect/>
-          </a:stretch>
-        </p:blipFill>
-        <p:spPr>
-          <a:xfrm>
-            <a:off x="1923975" y="1740384"/>
-            <a:ext cx="5296049" cy="3516908"/>
-          </a:xfrm>
-        </p:spPr>
-      </p:pic>
-      <p:sp>
-        <p:nvSpPr>
-          <p:cNvPr id="5" name="Fußzeilenplatzhalter 4">
-            <a:extLst>
-              <a:ext uri="{FF2B5EF4-FFF2-40B4-BE49-F238E27FC236}">
-                <a16:creationId xmlns:a16="http://schemas.microsoft.com/office/drawing/2014/main" id="{D6F43738-BC53-8B4E-8CF1-34314A96B5CE}"/>
-              </a:ext>
-            </a:extLst>
-          </p:cNvPr>
-          <p:cNvSpPr>
-            <a:spLocks noGrp="1"/>
-          </p:cNvSpPr>
-          <p:nvPr>
-            <p:ph type="ftr" sz="quarter" idx="10"/>
-          </p:nvPr>
-        </p:nvSpPr>
-        <p:spPr/>
-        <p:txBody>
-          <a:bodyPr/>
-          <a:lstStyle/>
-          <a:p>
-            <a:pPr>
-              <a:defRPr/>
-            </a:pPr>
-            <a:r>
-              <a:rPr lang="en-US"/>
-              <a:t>M3AAWG 43rd General Meeting | Munich | June 2018</a:t>
-            </a:r>
-          </a:p>
-        </p:txBody>
-      </p:sp>
-      <p:sp>
-        <p:nvSpPr>
-          <p:cNvPr id="7" name="Textfeld 6">
-            <a:extLst>
-              <a:ext uri="{FF2B5EF4-FFF2-40B4-BE49-F238E27FC236}">
-                <a16:creationId xmlns:a16="http://schemas.microsoft.com/office/drawing/2014/main" id="{8D7B23D7-05FA-2E44-A269-78B1CA754FEC}"/>
-              </a:ext>
-            </a:extLst>
-          </p:cNvPr>
-          <p:cNvSpPr txBox="1"/>
-          <p:nvPr/>
-        </p:nvSpPr>
-        <p:spPr>
-          <a:xfrm>
-            <a:off x="8065008" y="5998833"/>
-            <a:ext cx="712054" cy="276999"/>
-          </a:xfrm>
-          <a:prstGeom prst="rect">
-            <a:avLst/>
-          </a:prstGeom>
-          <a:noFill/>
-        </p:spPr>
-        <p:txBody>
-          <a:bodyPr wrap="none" rtlCol="0">
-            <a:spAutoFit/>
-          </a:bodyPr>
-          <a:lstStyle/>
-          <a:p>
-            <a:r>
-              <a:rPr lang="en-GB" sz="1200" dirty="0" err="1">
-                <a:solidFill>
-                  <a:schemeClr val="bg1">
-                    <a:lumMod val="50000"/>
-                  </a:schemeClr>
-                </a:solidFill>
-              </a:rPr>
-              <a:t>pixabay</a:t>
-            </a:r>
-            <a:endParaRPr lang="en-GB" sz="1200" dirty="0">
-              <a:solidFill>
-                <a:schemeClr val="bg1">
-                  <a:lumMod val="50000"/>
-                </a:schemeClr>
-              </a:solidFill>
-            </a:endParaRPr>
-          </a:p>
-        </p:txBody>
-      </p:sp>
-      <p:sp>
-        <p:nvSpPr>
-          <p:cNvPr id="2" name="Textfeld 1">
-            <a:extLst>
-              <a:ext uri="{FF2B5EF4-FFF2-40B4-BE49-F238E27FC236}">
-                <a16:creationId xmlns:a16="http://schemas.microsoft.com/office/drawing/2014/main" id="{ABF5FD7A-EB3A-2A4E-A06D-5E7B89AF66BB}"/>
-              </a:ext>
-            </a:extLst>
-          </p:cNvPr>
-          <p:cNvSpPr txBox="1"/>
-          <p:nvPr/>
-        </p:nvSpPr>
-        <p:spPr>
-          <a:xfrm rot="20314243">
-            <a:off x="5138781" y="4105619"/>
-            <a:ext cx="2990204" cy="461665"/>
-          </a:xfrm>
-          <a:prstGeom prst="rect">
-            <a:avLst/>
-          </a:prstGeom>
-          <a:solidFill>
-            <a:schemeClr val="bg1"/>
-          </a:solidFill>
-          <a:ln w="57150">
-            <a:solidFill>
-              <a:srgbClr val="FF0000"/>
-            </a:solidFill>
-          </a:ln>
-        </p:spPr>
-        <p:txBody>
-          <a:bodyPr wrap="square" rtlCol="0">
-            <a:spAutoFit/>
-          </a:bodyPr>
-          <a:lstStyle/>
-          <a:p>
-            <a:pPr algn="ctr"/>
-            <a:r>
-              <a:rPr lang="en-GB" dirty="0">
-                <a:solidFill>
-                  <a:srgbClr val="FF3300"/>
-                </a:solidFill>
-              </a:rPr>
-              <a:t>inspect and adapt</a:t>
-            </a:r>
-          </a:p>
-        </p:txBody>
-      </p:sp>
-    </p:spTree>
-    <p:extLst>
-      <p:ext uri="{BB962C8B-B14F-4D97-AF65-F5344CB8AC3E}">
-        <p14:creationId xmlns:p14="http://schemas.microsoft.com/office/powerpoint/2010/main" val="143118688"/>
-      </p:ext>
-    </p:extLst>
-  </p:cSld>
-  <p:clrMapOvr>
-    <a:masterClrMapping/>
-  </p:clrMapOvr>
-  <p:timing>
-    <p:tnLst>
-      <p:par>
-        <p:cTn id="1" dur="indefinite" restart="never" nodeType="tmRoot">
-          <p:childTnLst>
-            <p:seq concurrent="1" nextAc="seek">
-              <p:cTn id="2" dur="indefinite" nodeType="mainSeq">
-                <p:childTnLst>
-                  <p:par>
-                    <p:cTn id="3" fill="hold">
-                      <p:stCondLst>
-                        <p:cond delay="indefinite"/>
-                      </p:stCondLst>
-                      <p:childTnLst>
-                        <p:par>
-                          <p:cTn id="4" fill="hold">
-                            <p:stCondLst>
-                              <p:cond delay="0"/>
-                            </p:stCondLst>
-                            <p:childTnLst>
-                              <p:par>
-                                <p:cTn id="5" presetID="1" presetClass="entr" presetSubtype="0" fill="hold" grpId="0" nodeType="clickEffect">
-                                  <p:stCondLst>
-                                    <p:cond delay="0"/>
-                                  </p:stCondLst>
-                                  <p:childTnLst>
-                                    <p:set>
-                                      <p:cBhvr>
-                                        <p:cTn id="6" dur="1" fill="hold">
-                                          <p:stCondLst>
-                                            <p:cond delay="0"/>
-                                          </p:stCondLst>
-                                        </p:cTn>
-                                        <p:tgtEl>
-                                          <p:spTgt spid="2"/>
-                                        </p:tgtEl>
-                                        <p:attrNameLst>
-                                          <p:attrName>style.visibility</p:attrName>
-                                        </p:attrNameLst>
-                                      </p:cBhvr>
-                                      <p:to>
-                                        <p:strVal val="visible"/>
-                                      </p:to>
-                                    </p:set>
-                                  </p:childTnLst>
-                                </p:cTn>
-                              </p:par>
-                              <p:par>
-                                <p:cTn id="7" presetID="1" presetClass="entr" presetSubtype="0" fill="hold" grpId="0" nodeType="withEffect">
-                                  <p:stCondLst>
-                                    <p:cond delay="0"/>
-                                  </p:stCondLst>
-                                  <p:childTnLst>
-                                    <p:set>
-                                      <p:cBhvr>
-                                        <p:cTn id="8" dur="1" fill="hold">
-                                          <p:stCondLst>
-                                            <p:cond delay="0"/>
-                                          </p:stCondLst>
-                                        </p:cTn>
-                                        <p:tgtEl>
-                                          <p:spTgt spid="12"/>
-                                        </p:tgtEl>
-                                        <p:attrNameLst>
-                                          <p:attrName>style.visibility</p:attrName>
-                                        </p:attrNameLst>
-                                      </p:cBhvr>
-                                      <p:to>
-                                        <p:strVal val="visible"/>
-                                      </p:to>
-                                    </p:set>
-                                  </p:childTnLst>
-                                </p:cTn>
-                              </p:par>
-                            </p:childTnLst>
-                          </p:cTn>
-                        </p:par>
-                      </p:childTnLst>
-                    </p:cTn>
-                  </p:par>
-                </p:childTnLst>
-              </p:cTn>
-              <p:prevCondLst>
-                <p:cond evt="onPrev" delay="0">
-                  <p:tgtEl>
-                    <p:sldTgt/>
-                  </p:tgtEl>
-                </p:cond>
-              </p:prevCondLst>
-              <p:nextCondLst>
-                <p:cond evt="onNext" delay="0">
-                  <p:tgtEl>
-                    <p:sldTgt/>
-                  </p:tgtEl>
-                </p:cond>
-              </p:nextCondLst>
-            </p:seq>
-          </p:childTnLst>
-        </p:cTn>
-      </p:par>
-    </p:tnLst>
-    <p:bldLst>
-      <p:bldP spid="12" grpId="0"/>
-      <p:bldP spid="2" grpId="0" animBg="1"/>
-    </p:bldLst>
-  </p:timing>
-</p:sld>
-</file>
-
-<file path=ppt/slides/slide12.xml><?xml version="1.0" encoding="utf-8"?>
-<p:sld xmlns:a="http://schemas.openxmlformats.org/drawingml/2006/main" xmlns:r="http://schemas.openxmlformats.org/officeDocument/2006/relationships" xmlns:p="http://schemas.openxmlformats.org/presentationml/2006/main">
-  <p:cSld>
-    <p:spTree>
-      <p:nvGrpSpPr>
-        <p:cNvPr id="1" name=""/>
-        <p:cNvGrpSpPr/>
-        <p:nvPr/>
-      </p:nvGrpSpPr>
-      <p:grpSpPr>
-        <a:xfrm>
-          <a:off x="0" y="0"/>
-          <a:ext cx="0" cy="0"/>
-          <a:chOff x="0" y="0"/>
-          <a:chExt cx="0" cy="0"/>
-        </a:xfrm>
-      </p:grpSpPr>
-      <p:sp>
-        <p:nvSpPr>
           <p:cNvPr id="2" name="Titel 1">
             <a:extLst>
               <a:ext uri="{FF2B5EF4-FFF2-40B4-BE49-F238E27FC236}">
@@ -13457,7 +12589,7 @@
 </p:sld>
 </file>
 
-<file path=ppt/slides/slide13.xml><?xml version="1.0" encoding="utf-8"?>
+<file path=ppt/slides/slide11.xml><?xml version="1.0" encoding="utf-8"?>
 <p:sld xmlns:a="http://schemas.openxmlformats.org/drawingml/2006/main" xmlns:r="http://schemas.openxmlformats.org/officeDocument/2006/relationships" xmlns:p="http://schemas.openxmlformats.org/presentationml/2006/main">
   <p:cSld>
     <p:spTree>
@@ -13582,6 +12714,42 @@
           </a:p>
         </p:txBody>
       </p:sp>
+      <p:sp>
+        <p:nvSpPr>
+          <p:cNvPr id="4" name="Fußzeilenplatzhalter 2">
+            <a:extLst>
+              <a:ext uri="{FF2B5EF4-FFF2-40B4-BE49-F238E27FC236}">
+                <a16:creationId xmlns:a16="http://schemas.microsoft.com/office/drawing/2014/main" id="{C3C4B06A-5F41-3F4B-B945-A38B9EDE5D3E}"/>
+              </a:ext>
+            </a:extLst>
+          </p:cNvPr>
+          <p:cNvSpPr>
+            <a:spLocks noGrp="1"/>
+          </p:cNvSpPr>
+          <p:nvPr>
+            <p:ph type="ftr" sz="quarter" idx="10"/>
+          </p:nvPr>
+        </p:nvSpPr>
+        <p:spPr>
+          <a:xfrm>
+            <a:off x="228600" y="6460068"/>
+            <a:ext cx="5410200" cy="323850"/>
+          </a:xfrm>
+        </p:spPr>
+        <p:txBody>
+          <a:bodyPr/>
+          <a:lstStyle/>
+          <a:p>
+            <a:pPr>
+              <a:defRPr/>
+            </a:pPr>
+            <a:r>
+              <a:rPr lang="en-US" dirty="0"/>
+              <a:t>M3AAWG 43rd General Meeting | Munich | June 2018</a:t>
+            </a:r>
+          </a:p>
+        </p:txBody>
+      </p:sp>
     </p:spTree>
     <p:extLst>
       <p:ext uri="{BB962C8B-B14F-4D97-AF65-F5344CB8AC3E}">
@@ -13595,7 +12763,7 @@
 </p:sld>
 </file>
 
-<file path=ppt/slides/slide14.xml><?xml version="1.0" encoding="utf-8"?>
+<file path=ppt/slides/slide12.xml><?xml version="1.0" encoding="utf-8"?>
 <p:sld xmlns:a="http://schemas.openxmlformats.org/drawingml/2006/main" xmlns:r="http://schemas.openxmlformats.org/officeDocument/2006/relationships" xmlns:p="http://schemas.openxmlformats.org/presentationml/2006/main">
   <p:cSld>
     <p:spTree>
@@ -13709,6 +12877,42 @@
           </a:p>
         </p:txBody>
       </p:sp>
+      <p:sp>
+        <p:nvSpPr>
+          <p:cNvPr id="4" name="Fußzeilenplatzhalter 2">
+            <a:extLst>
+              <a:ext uri="{FF2B5EF4-FFF2-40B4-BE49-F238E27FC236}">
+                <a16:creationId xmlns:a16="http://schemas.microsoft.com/office/drawing/2014/main" id="{118A6AA5-AD48-A641-B961-41357CD19001}"/>
+              </a:ext>
+            </a:extLst>
+          </p:cNvPr>
+          <p:cNvSpPr>
+            <a:spLocks noGrp="1"/>
+          </p:cNvSpPr>
+          <p:nvPr>
+            <p:ph type="ftr" sz="quarter" idx="10"/>
+          </p:nvPr>
+        </p:nvSpPr>
+        <p:spPr>
+          <a:xfrm>
+            <a:off x="228600" y="6460068"/>
+            <a:ext cx="5410200" cy="323850"/>
+          </a:xfrm>
+        </p:spPr>
+        <p:txBody>
+          <a:bodyPr/>
+          <a:lstStyle/>
+          <a:p>
+            <a:pPr>
+              <a:defRPr/>
+            </a:pPr>
+            <a:r>
+              <a:rPr lang="en-US" dirty="0"/>
+              <a:t>M3AAWG 43rd General Meeting | Munich | June 2018</a:t>
+            </a:r>
+          </a:p>
+        </p:txBody>
+      </p:sp>
     </p:spTree>
     <p:extLst>
       <p:ext uri="{BB962C8B-B14F-4D97-AF65-F5344CB8AC3E}">
@@ -13722,7 +12926,7 @@
 </p:sld>
 </file>
 
-<file path=ppt/slides/slide15.xml><?xml version="1.0" encoding="utf-8"?>
+<file path=ppt/slides/slide13.xml><?xml version="1.0" encoding="utf-8"?>
 <p:sld xmlns:a="http://schemas.openxmlformats.org/drawingml/2006/main" xmlns:r="http://schemas.openxmlformats.org/officeDocument/2006/relationships" xmlns:p="http://schemas.openxmlformats.org/presentationml/2006/main">
   <p:cSld>
     <p:spTree>
@@ -14074,2159 +13278,7 @@
 </p:sld>
 </file>
 
-<file path=ppt/slides/slide16.xml><?xml version="1.0" encoding="utf-8"?>
-<p:sld xmlns:a="http://schemas.openxmlformats.org/drawingml/2006/main" xmlns:r="http://schemas.openxmlformats.org/officeDocument/2006/relationships" xmlns:p="http://schemas.openxmlformats.org/presentationml/2006/main" show="0">
-  <p:cSld>
-    <p:spTree>
-      <p:nvGrpSpPr>
-        <p:cNvPr id="1" name=""/>
-        <p:cNvGrpSpPr/>
-        <p:nvPr/>
-      </p:nvGrpSpPr>
-      <p:grpSpPr>
-        <a:xfrm>
-          <a:off x="0" y="0"/>
-          <a:ext cx="0" cy="0"/>
-          <a:chOff x="0" y="0"/>
-          <a:chExt cx="0" cy="0"/>
-        </a:xfrm>
-      </p:grpSpPr>
-      <p:sp>
-        <p:nvSpPr>
-          <p:cNvPr id="227334" name="Rectangle 6"/>
-          <p:cNvSpPr>
-            <a:spLocks noGrp="1" noChangeArrowheads="1"/>
-          </p:cNvSpPr>
-          <p:nvPr>
-            <p:ph type="title"/>
-          </p:nvPr>
-        </p:nvSpPr>
-        <p:spPr/>
-        <p:txBody>
-          <a:bodyPr/>
-          <a:lstStyle/>
-          <a:p>
-            <a:pPr eaLnBrk="1" hangingPunct="1">
-              <a:defRPr/>
-            </a:pPr>
-            <a:r>
-              <a:rPr lang="en-US" sz="2800" kern="1200" dirty="0">
-                <a:latin typeface="Arial" charset="0"/>
-                <a:ea typeface="ＭＳ Ｐゴシック" charset="0"/>
-                <a:cs typeface="+mn-cs"/>
-              </a:rPr>
-              <a:t>Presenter’s Action Reminders </a:t>
-            </a:r>
-            <a:br>
-              <a:rPr lang="en-US" sz="2800" dirty="0">
-                <a:solidFill>
-                  <a:schemeClr val="tx1"/>
-                </a:solidFill>
-                <a:cs typeface="+mj-cs"/>
-              </a:rPr>
-            </a:br>
-            <a:endParaRPr lang="en-US" dirty="0">
-              <a:cs typeface="+mj-cs"/>
-            </a:endParaRPr>
-          </a:p>
-        </p:txBody>
-      </p:sp>
-      <p:sp>
-        <p:nvSpPr>
-          <p:cNvPr id="227331" name="Rectangle 3"/>
-          <p:cNvSpPr>
-            <a:spLocks noGrp="1" noChangeArrowheads="1"/>
-          </p:cNvSpPr>
-          <p:nvPr>
-            <p:ph idx="4294967295"/>
-          </p:nvPr>
-        </p:nvSpPr>
-        <p:spPr>
-          <a:xfrm>
-            <a:off x="532151" y="1070548"/>
-            <a:ext cx="8431967" cy="5368352"/>
-          </a:xfrm>
-        </p:spPr>
-        <p:txBody>
-          <a:bodyPr/>
-          <a:lstStyle/>
-          <a:p>
-            <a:pPr marL="0" indent="0" eaLnBrk="1" hangingPunct="1">
-              <a:spcBef>
-                <a:spcPts val="0"/>
-              </a:spcBef>
-              <a:spcAft>
-                <a:spcPts val="0"/>
-              </a:spcAft>
-              <a:buNone/>
-              <a:defRPr/>
-            </a:pPr>
-            <a:r>
-              <a:rPr lang="en-US" sz="1800" b="1" dirty="0">
-                <a:cs typeface="+mn-cs"/>
-              </a:rPr>
-              <a:t>Preparation</a:t>
-            </a:r>
-          </a:p>
-          <a:p>
-            <a:pPr eaLnBrk="1" hangingPunct="1">
-              <a:spcBef>
-                <a:spcPts val="0"/>
-              </a:spcBef>
-              <a:spcAft>
-                <a:spcPts val="600"/>
-              </a:spcAft>
-              <a:defRPr/>
-            </a:pPr>
-            <a:r>
-              <a:rPr lang="en-US" sz="1800" dirty="0">
-                <a:cs typeface="+mn-cs"/>
-              </a:rPr>
-              <a:t>Use the provided M</a:t>
-            </a:r>
-            <a:r>
-              <a:rPr lang="en-US" sz="1800" baseline="30000" dirty="0">
-                <a:cs typeface="+mn-cs"/>
-              </a:rPr>
-              <a:t>3</a:t>
-            </a:r>
-            <a:r>
-              <a:rPr lang="en-US" sz="1800" dirty="0">
-                <a:cs typeface="+mn-cs"/>
-              </a:rPr>
-              <a:t>AAWG PowerPoint template for your slides </a:t>
-            </a:r>
-          </a:p>
-          <a:p>
-            <a:pPr eaLnBrk="1" hangingPunct="1">
-              <a:spcAft>
-                <a:spcPts val="600"/>
-              </a:spcAft>
-              <a:defRPr/>
-            </a:pPr>
-            <a:r>
-              <a:rPr lang="en-US" sz="1800" dirty="0">
-                <a:cs typeface="+mn-cs"/>
-              </a:rPr>
-              <a:t>Order flipcharts or other logistical support at least 1 week before your session from </a:t>
-            </a:r>
-            <a:r>
-              <a:rPr lang="en-US" sz="1800" dirty="0"/>
-              <a:t>Yadira Orellana at </a:t>
-            </a:r>
-            <a:r>
-              <a:rPr lang="en-US" sz="1800" u="sng" dirty="0">
-                <a:hlinkClick r:id="rId3"/>
-              </a:rPr>
-              <a:t>yadira@m3aawg.org</a:t>
-            </a:r>
-            <a:endParaRPr lang="en-US" sz="1800" dirty="0">
-              <a:cs typeface="+mn-cs"/>
-            </a:endParaRPr>
-          </a:p>
-          <a:p>
-            <a:pPr marL="0" indent="0" eaLnBrk="1" hangingPunct="1">
-              <a:spcBef>
-                <a:spcPts val="0"/>
-              </a:spcBef>
-              <a:spcAft>
-                <a:spcPts val="0"/>
-              </a:spcAft>
-              <a:buNone/>
-              <a:defRPr/>
-            </a:pPr>
-            <a:r>
-              <a:rPr lang="en-US" sz="1800" b="1" dirty="0">
-                <a:cs typeface="+mn-cs"/>
-              </a:rPr>
-              <a:t>At the Meeting</a:t>
-            </a:r>
-          </a:p>
-          <a:p>
-            <a:pPr eaLnBrk="1" hangingPunct="1">
-              <a:spcBef>
-                <a:spcPts val="0"/>
-              </a:spcBef>
-              <a:spcAft>
-                <a:spcPts val="600"/>
-              </a:spcAft>
-              <a:defRPr/>
-            </a:pPr>
-            <a:r>
-              <a:rPr lang="en-US" sz="1800" dirty="0">
-                <a:cs typeface="+mn-cs"/>
-              </a:rPr>
-              <a:t>No commercials allowed – No selling your products or services</a:t>
-            </a:r>
-          </a:p>
-          <a:p>
-            <a:pPr eaLnBrk="1" hangingPunct="1">
-              <a:spcBef>
-                <a:spcPts val="600"/>
-              </a:spcBef>
-              <a:spcAft>
-                <a:spcPts val="600"/>
-              </a:spcAft>
-              <a:defRPr/>
-            </a:pPr>
-            <a:r>
-              <a:rPr lang="en-US" sz="1800" dirty="0">
-                <a:cs typeface="+mn-cs"/>
-              </a:rPr>
-              <a:t>Do not read your slides verbatim</a:t>
-            </a:r>
-          </a:p>
-          <a:p>
-            <a:pPr eaLnBrk="1" hangingPunct="1">
-              <a:spcBef>
-                <a:spcPts val="600"/>
-              </a:spcBef>
-              <a:spcAft>
-                <a:spcPts val="600"/>
-              </a:spcAft>
-              <a:defRPr/>
-            </a:pPr>
-            <a:r>
-              <a:rPr lang="en-US" sz="1800" dirty="0">
-                <a:cs typeface="+mn-cs"/>
-              </a:rPr>
-              <a:t>Not all attendees are native speakers; please speak at a reasonable pace</a:t>
-            </a:r>
-          </a:p>
-          <a:p>
-            <a:pPr eaLnBrk="1" hangingPunct="1">
-              <a:spcAft>
-                <a:spcPts val="600"/>
-              </a:spcAft>
-              <a:defRPr/>
-            </a:pPr>
-            <a:r>
-              <a:rPr lang="en-US" sz="1800" dirty="0">
-                <a:cs typeface="+mn-cs"/>
-              </a:rPr>
-              <a:t>Arrive at the assigned room 10 minutes before your presentation</a:t>
-            </a:r>
-          </a:p>
-          <a:p>
-            <a:pPr eaLnBrk="1" hangingPunct="1">
-              <a:spcAft>
-                <a:spcPts val="600"/>
-              </a:spcAft>
-              <a:defRPr/>
-            </a:pPr>
-            <a:r>
-              <a:rPr lang="en-US" sz="1800" dirty="0">
-                <a:cs typeface="+mn-cs"/>
-              </a:rPr>
-              <a:t>Give your final PPT or PDF presentation file to your session chair or send it to </a:t>
-            </a:r>
-            <a:r>
-              <a:rPr lang="en-US" sz="1800" dirty="0">
-                <a:cs typeface="+mn-cs"/>
-                <a:hlinkClick r:id="rId4"/>
-              </a:rPr>
-              <a:t>slides@m3aawg.org</a:t>
-            </a:r>
-            <a:r>
-              <a:rPr lang="en-US" sz="1800" dirty="0">
-                <a:cs typeface="+mn-cs"/>
-              </a:rPr>
-              <a:t> for posting on the members-only meeting archive page</a:t>
-            </a:r>
-          </a:p>
-          <a:p>
-            <a:pPr eaLnBrk="1" hangingPunct="1">
-              <a:spcAft>
-                <a:spcPts val="600"/>
-              </a:spcAft>
-              <a:defRPr/>
-            </a:pPr>
-            <a:r>
-              <a:rPr lang="en-US" sz="1800" b="1" dirty="0">
-                <a:cs typeface="+mn-cs"/>
-              </a:rPr>
-              <a:t>Bring your own laptop and adapter:</a:t>
-            </a:r>
-            <a:r>
-              <a:rPr lang="en-US" sz="1800" dirty="0">
-                <a:cs typeface="+mn-cs"/>
-              </a:rPr>
-              <a:t> We will supply an HDMI cable to the projector but you need to supply the presentation device (</a:t>
-            </a:r>
-            <a:r>
-              <a:rPr lang="en-US" sz="1800" dirty="0"/>
-              <a:t>laptop, smartphone, tablet, etc.) and </a:t>
-            </a:r>
-            <a:r>
-              <a:rPr lang="en-US" sz="1800" dirty="0">
-                <a:cs typeface="+mn-cs"/>
-              </a:rPr>
-              <a:t>any needed adapters to hook up to the HDMI connector.</a:t>
-            </a:r>
-          </a:p>
-          <a:p>
-            <a:pPr marL="0" indent="0" algn="ctr" eaLnBrk="1" hangingPunct="1">
-              <a:buFontTx/>
-              <a:buNone/>
-              <a:defRPr/>
-            </a:pPr>
-            <a:r>
-              <a:rPr lang="en-US" dirty="0">
-                <a:cs typeface="+mn-cs"/>
-              </a:rPr>
-              <a:t>See the M</a:t>
-            </a:r>
-            <a:r>
-              <a:rPr lang="en-US" baseline="30000" dirty="0"/>
-              <a:t>3</a:t>
-            </a:r>
-            <a:r>
-              <a:rPr lang="en-US" dirty="0">
-                <a:cs typeface="+mn-cs"/>
-              </a:rPr>
-              <a:t>AAWG Speakers Guidelines for more details</a:t>
-            </a:r>
-          </a:p>
-        </p:txBody>
-      </p:sp>
-      <p:sp>
-        <p:nvSpPr>
-          <p:cNvPr id="6" name="Text Box 11"/>
-          <p:cNvSpPr txBox="1">
-            <a:spLocks noChangeArrowheads="1"/>
-          </p:cNvSpPr>
-          <p:nvPr/>
-        </p:nvSpPr>
-        <p:spPr bwMode="auto">
-          <a:xfrm>
-            <a:off x="8429365" y="811877"/>
-            <a:ext cx="2628900" cy="646113"/>
-          </a:xfrm>
-          <a:prstGeom prst="rect">
-            <a:avLst/>
-          </a:prstGeom>
-          <a:solidFill>
-            <a:schemeClr val="bg1">
-              <a:lumMod val="85000"/>
-            </a:schemeClr>
-          </a:solidFill>
-          <a:ln w="9525">
-            <a:solidFill>
-              <a:schemeClr val="tx1"/>
-            </a:solidFill>
-            <a:miter lim="800000"/>
-            <a:headEnd/>
-            <a:tailEnd/>
-          </a:ln>
-          <a:effectLst/>
-          <a:extLst/>
-        </p:spPr>
-        <p:txBody>
-          <a:bodyPr>
-            <a:spAutoFit/>
-          </a:bodyPr>
-          <a:lstStyle/>
-          <a:p>
-            <a:pPr>
-              <a:spcBef>
-                <a:spcPct val="50000"/>
-              </a:spcBef>
-              <a:defRPr/>
-            </a:pPr>
-            <a:r>
-              <a:rPr lang="en-US" sz="1800" dirty="0">
-                <a:solidFill>
-                  <a:srgbClr val="FF3300"/>
-                </a:solidFill>
-                <a:cs typeface="+mn-cs"/>
-              </a:rPr>
-              <a:t>Delete this slide before your presentation.</a:t>
-            </a:r>
-          </a:p>
-        </p:txBody>
-      </p:sp>
-      <p:sp>
-        <p:nvSpPr>
-          <p:cNvPr id="5" name="Footer Placeholder 4"/>
-          <p:cNvSpPr>
-            <a:spLocks noGrp="1"/>
-          </p:cNvSpPr>
-          <p:nvPr>
-            <p:ph type="ftr" sz="quarter" idx="10"/>
-          </p:nvPr>
-        </p:nvSpPr>
-        <p:spPr>
-          <a:xfrm>
-            <a:off x="265113" y="6489700"/>
-            <a:ext cx="5410200" cy="323850"/>
-          </a:xfrm>
-        </p:spPr>
-        <p:txBody>
-          <a:bodyPr/>
-          <a:lstStyle/>
-          <a:p>
-            <a:pPr>
-              <a:defRPr/>
-            </a:pPr>
-            <a:r>
-              <a:rPr lang="en-US" dirty="0"/>
-              <a:t>M3AAWG 43rd General Meeting | Munich | June 2018</a:t>
-            </a:r>
-          </a:p>
-        </p:txBody>
-      </p:sp>
-    </p:spTree>
-    <p:extLst>
-      <p:ext uri="{BB962C8B-B14F-4D97-AF65-F5344CB8AC3E}">
-        <p14:creationId xmlns:p14="http://schemas.microsoft.com/office/powerpoint/2010/main" val="2684677064"/>
-      </p:ext>
-    </p:extLst>
-  </p:cSld>
-  <p:clrMapOvr>
-    <a:masterClrMapping/>
-  </p:clrMapOvr>
-</p:sld>
-</file>
-
-<file path=ppt/slides/slide17.xml><?xml version="1.0" encoding="utf-8"?>
-<p:sld xmlns:a="http://schemas.openxmlformats.org/drawingml/2006/main" xmlns:r="http://schemas.openxmlformats.org/officeDocument/2006/relationships" xmlns:p="http://schemas.openxmlformats.org/presentationml/2006/main" show="0">
-  <p:cSld>
-    <p:spTree>
-      <p:nvGrpSpPr>
-        <p:cNvPr id="1" name=""/>
-        <p:cNvGrpSpPr/>
-        <p:nvPr/>
-      </p:nvGrpSpPr>
-      <p:grpSpPr>
-        <a:xfrm>
-          <a:off x="0" y="0"/>
-          <a:ext cx="0" cy="0"/>
-          <a:chOff x="0" y="0"/>
-          <a:chExt cx="0" cy="0"/>
-        </a:xfrm>
-      </p:grpSpPr>
-      <p:sp>
-        <p:nvSpPr>
-          <p:cNvPr id="6" name="Title 5"/>
-          <p:cNvSpPr>
-            <a:spLocks noGrp="1"/>
-          </p:cNvSpPr>
-          <p:nvPr>
-            <p:ph type="title"/>
-          </p:nvPr>
-        </p:nvSpPr>
-        <p:spPr/>
-        <p:txBody>
-          <a:bodyPr/>
-          <a:lstStyle/>
-          <a:p>
-            <a:r>
-              <a:rPr lang="en-US" dirty="0"/>
-              <a:t>For Better Readability, We Recommend:</a:t>
-            </a:r>
-          </a:p>
-        </p:txBody>
-      </p:sp>
-      <p:sp>
-        <p:nvSpPr>
-          <p:cNvPr id="2" name="Footer Placeholder 1"/>
-          <p:cNvSpPr>
-            <a:spLocks noGrp="1"/>
-          </p:cNvSpPr>
-          <p:nvPr>
-            <p:ph type="ftr" sz="quarter" idx="10"/>
-          </p:nvPr>
-        </p:nvSpPr>
-        <p:spPr/>
-        <p:txBody>
-          <a:bodyPr/>
-          <a:lstStyle/>
-          <a:p>
-            <a:pPr>
-              <a:defRPr/>
-            </a:pPr>
-            <a:r>
-              <a:rPr lang="en-US"/>
-              <a:t>M3AAWG 43rd General Meeting | Munich | June 2018</a:t>
-            </a:r>
-            <a:endParaRPr lang="en-US" sz="1400"/>
-          </a:p>
-        </p:txBody>
-      </p:sp>
-      <p:sp>
-        <p:nvSpPr>
-          <p:cNvPr id="7" name="TextBox 6"/>
-          <p:cNvSpPr txBox="1"/>
-          <p:nvPr/>
-        </p:nvSpPr>
-        <p:spPr>
-          <a:xfrm>
-            <a:off x="619125" y="1258895"/>
-            <a:ext cx="8048625" cy="4124206"/>
-          </a:xfrm>
-          <a:prstGeom prst="rect">
-            <a:avLst/>
-          </a:prstGeom>
-          <a:noFill/>
-        </p:spPr>
-        <p:txBody>
-          <a:bodyPr wrap="square" rtlCol="0">
-            <a:spAutoFit/>
-          </a:bodyPr>
-          <a:lstStyle/>
-          <a:p>
-            <a:pPr marL="342900" indent="-342900">
-              <a:spcAft>
-                <a:spcPts val="1800"/>
-              </a:spcAft>
-              <a:buFont typeface="Arial"/>
-              <a:buChar char="•"/>
-            </a:pPr>
-            <a:r>
-              <a:rPr lang="en-US" dirty="0"/>
-              <a:t>Use 24 Pt. or Larger Font for Top Level Bullets</a:t>
-            </a:r>
-          </a:p>
-          <a:p>
-            <a:pPr marL="800100" lvl="1" indent="-342900">
-              <a:spcAft>
-                <a:spcPts val="1800"/>
-              </a:spcAft>
-              <a:buFont typeface="Arial"/>
-              <a:buChar char="•"/>
-            </a:pPr>
-            <a:r>
-              <a:rPr lang="en-US" sz="2000" dirty="0"/>
-              <a:t>Do Not Use Fonts Smaller than 20 Pt. for Sub-Bullets </a:t>
-            </a:r>
-            <a:br>
-              <a:rPr lang="en-US" sz="2000" dirty="0"/>
-            </a:br>
-            <a:r>
-              <a:rPr lang="en-US" sz="2000" dirty="0"/>
-              <a:t>or Other Text on Your Slides</a:t>
-            </a:r>
-          </a:p>
-          <a:p>
-            <a:pPr marL="800100" lvl="1" indent="-342900">
-              <a:spcAft>
-                <a:spcPts val="1800"/>
-              </a:spcAft>
-              <a:buFont typeface="Arial"/>
-              <a:buChar char="•"/>
-            </a:pPr>
-            <a:r>
-              <a:rPr lang="en-US" sz="2000" dirty="0"/>
-              <a:t>Smaller Fonts Are Difficult to Read in Large Meeting Rooms</a:t>
-            </a:r>
-          </a:p>
-          <a:p>
-            <a:pPr marL="342900" indent="-342900">
-              <a:spcAft>
-                <a:spcPts val="1800"/>
-              </a:spcAft>
-              <a:buFont typeface="Arial"/>
-              <a:buChar char="•"/>
-            </a:pPr>
-            <a:r>
-              <a:rPr lang="en-US" dirty="0"/>
-              <a:t>Add 6 Pts. or More of Vertical Spacing between Bullets</a:t>
-            </a:r>
-          </a:p>
-          <a:p>
-            <a:pPr marL="800100" lvl="1" indent="-342900">
-              <a:spcAft>
-                <a:spcPts val="1800"/>
-              </a:spcAft>
-              <a:buFont typeface="Arial"/>
-              <a:buChar char="•"/>
-            </a:pPr>
-            <a:r>
-              <a:rPr lang="en-US" sz="2000" dirty="0"/>
-              <a:t>From Formatting, Select Paragraph &amp; Set “Spacing”</a:t>
-            </a:r>
-          </a:p>
-          <a:p>
-            <a:pPr marL="800100" lvl="1" indent="-342900">
-              <a:spcAft>
-                <a:spcPts val="1800"/>
-              </a:spcAft>
-              <a:buFont typeface="Arial"/>
-              <a:buChar char="•"/>
-            </a:pPr>
-            <a:r>
-              <a:rPr lang="en-US" sz="2000" dirty="0"/>
-              <a:t>This Slide Has 18 Pts. of Vertical Spacing </a:t>
-            </a:r>
-          </a:p>
-          <a:p>
-            <a:pPr marL="342900" indent="-342900">
-              <a:spcAft>
-                <a:spcPts val="1800"/>
-              </a:spcAft>
-              <a:buFont typeface="Arial"/>
-              <a:buChar char="•"/>
-            </a:pPr>
-            <a:r>
-              <a:rPr lang="en-US" dirty="0"/>
-              <a:t>Remember: Do Not Read Your Slides during Your Talk</a:t>
-            </a:r>
-          </a:p>
-        </p:txBody>
-      </p:sp>
-      <p:sp>
-        <p:nvSpPr>
-          <p:cNvPr id="8" name="Text Box 11"/>
-          <p:cNvSpPr txBox="1">
-            <a:spLocks noChangeArrowheads="1"/>
-          </p:cNvSpPr>
-          <p:nvPr/>
-        </p:nvSpPr>
-        <p:spPr bwMode="auto">
-          <a:xfrm>
-            <a:off x="7716056" y="1114522"/>
-            <a:ext cx="2644775" cy="647700"/>
-          </a:xfrm>
-          <a:prstGeom prst="rect">
-            <a:avLst/>
-          </a:prstGeom>
-          <a:solidFill>
-            <a:schemeClr val="bg1">
-              <a:lumMod val="85000"/>
-            </a:schemeClr>
-          </a:solidFill>
-          <a:ln w="9525">
-            <a:solidFill>
-              <a:schemeClr val="tx1"/>
-            </a:solidFill>
-            <a:miter lim="800000"/>
-            <a:headEnd/>
-            <a:tailEnd/>
-          </a:ln>
-          <a:effectLst/>
-          <a:extLst/>
-        </p:spPr>
-        <p:txBody>
-          <a:bodyPr>
-            <a:spAutoFit/>
-          </a:bodyPr>
-          <a:lstStyle/>
-          <a:p>
-            <a:pPr>
-              <a:spcBef>
-                <a:spcPct val="50000"/>
-              </a:spcBef>
-              <a:defRPr/>
-            </a:pPr>
-            <a:r>
-              <a:rPr lang="en-US" sz="1800" dirty="0">
-                <a:solidFill>
-                  <a:srgbClr val="FF3300"/>
-                </a:solidFill>
-                <a:cs typeface="+mn-cs"/>
-              </a:rPr>
-              <a:t>Delete this slide before your presentation.</a:t>
-            </a:r>
-          </a:p>
-        </p:txBody>
-      </p:sp>
-    </p:spTree>
-    <p:extLst>
-      <p:ext uri="{BB962C8B-B14F-4D97-AF65-F5344CB8AC3E}">
-        <p14:creationId xmlns:p14="http://schemas.microsoft.com/office/powerpoint/2010/main" val="604977297"/>
-      </p:ext>
-    </p:extLst>
-  </p:cSld>
-  <p:clrMapOvr>
-    <a:masterClrMapping/>
-  </p:clrMapOvr>
-</p:sld>
-</file>
-
 <file path=ppt/slides/slide2.xml><?xml version="1.0" encoding="utf-8"?>
-<p:sld xmlns:a="http://schemas.openxmlformats.org/drawingml/2006/main" xmlns:r="http://schemas.openxmlformats.org/officeDocument/2006/relationships" xmlns:p="http://schemas.openxmlformats.org/presentationml/2006/main" show="0">
-  <p:cSld>
-    <p:spTree>
-      <p:nvGrpSpPr>
-        <p:cNvPr id="1" name=""/>
-        <p:cNvGrpSpPr/>
-        <p:nvPr/>
-      </p:nvGrpSpPr>
-      <p:grpSpPr>
-        <a:xfrm>
-          <a:off x="0" y="0"/>
-          <a:ext cx="0" cy="0"/>
-          <a:chOff x="0" y="0"/>
-          <a:chExt cx="0" cy="0"/>
-        </a:xfrm>
-      </p:grpSpPr>
-      <p:sp>
-        <p:nvSpPr>
-          <p:cNvPr id="3" name="Footer Placeholder 2"/>
-          <p:cNvSpPr>
-            <a:spLocks noGrp="1"/>
-          </p:cNvSpPr>
-          <p:nvPr>
-            <p:ph type="ftr" sz="quarter" idx="10"/>
-          </p:nvPr>
-        </p:nvSpPr>
-        <p:spPr>
-          <a:xfrm>
-            <a:off x="228600" y="6460068"/>
-            <a:ext cx="5410200" cy="323850"/>
-          </a:xfrm>
-        </p:spPr>
-        <p:txBody>
-          <a:bodyPr/>
-          <a:lstStyle/>
-          <a:p>
-            <a:pPr>
-              <a:defRPr/>
-            </a:pPr>
-            <a:r>
-              <a:rPr lang="en-US"/>
-              <a:t>M3AAWG 43rd General Meeting | Munich | June 2018</a:t>
-            </a:r>
-            <a:endParaRPr lang="en-US" dirty="0"/>
-          </a:p>
-        </p:txBody>
-      </p:sp>
-      <p:sp>
-        <p:nvSpPr>
-          <p:cNvPr id="7" name="Text Box 6"/>
-          <p:cNvSpPr txBox="1">
-            <a:spLocks noChangeArrowheads="1"/>
-          </p:cNvSpPr>
-          <p:nvPr/>
-        </p:nvSpPr>
-        <p:spPr bwMode="auto">
-          <a:xfrm>
-            <a:off x="361950" y="457200"/>
-            <a:ext cx="6877050" cy="523220"/>
-          </a:xfrm>
-          <a:prstGeom prst="rect">
-            <a:avLst/>
-          </a:prstGeom>
-          <a:noFill/>
-          <a:ln>
-            <a:noFill/>
-          </a:ln>
-          <a:effectLst/>
-          <a:extLst>
-            <a:ext uri="{909E8E84-426E-40dd-AFC4-6F175D3DCCD1}">
-              <a14:hiddenFill xmlns:a14="http://schemas.microsoft.com/office/drawing/2010/main" xmlns="">
-                <a:solidFill>
-                  <a:schemeClr val="accent1"/>
-                </a:solidFill>
-              </a14:hiddenFill>
-            </a:ext>
-            <a:ext uri="{91240B29-F687-4f45-9708-019B960494DF}">
-              <a14:hiddenLine xmlns:a14="http://schemas.microsoft.com/office/drawing/2010/main" xmlns="" w="9525">
-                <a:solidFill>
-                  <a:schemeClr val="tx1"/>
-                </a:solidFill>
-                <a:miter lim="800000"/>
-                <a:headEnd/>
-                <a:tailEnd/>
-              </a14:hiddenLine>
-            </a:ext>
-            <a:ext uri="{AF507438-7753-43e0-B8FC-AC1667EBCBE1}">
-              <a14:hiddenEffects xmlns:a14="http://schemas.microsoft.com/office/drawing/2010/main" xmlns="">
-                <a:effectLst>
-                  <a:outerShdw blurRad="63500" dist="38099" dir="2700000" algn="ctr" rotWithShape="0">
-                    <a:schemeClr val="bg2">
-                      <a:alpha val="74998"/>
-                    </a:schemeClr>
-                  </a:outerShdw>
-                </a:effectLst>
-              </a14:hiddenEffects>
-            </a:ext>
-          </a:extLst>
-        </p:spPr>
-        <p:txBody>
-          <a:bodyPr wrap="square">
-            <a:spAutoFit/>
-          </a:bodyPr>
-          <a:lstStyle/>
-          <a:p>
-            <a:pPr>
-              <a:spcBef>
-                <a:spcPct val="50000"/>
-              </a:spcBef>
-              <a:defRPr/>
-            </a:pPr>
-            <a:r>
-              <a:rPr lang="en-US" sz="2800" b="1" dirty="0">
-                <a:solidFill>
-                  <a:srgbClr val="018E9F"/>
-                </a:solidFill>
-                <a:cs typeface="+mn-cs"/>
-              </a:rPr>
-              <a:t>M</a:t>
-            </a:r>
-            <a:r>
-              <a:rPr lang="en-US" sz="2800" b="1" baseline="30000" dirty="0">
-                <a:solidFill>
-                  <a:srgbClr val="018E9F"/>
-                </a:solidFill>
-                <a:cs typeface="+mn-cs"/>
-              </a:rPr>
-              <a:t>3</a:t>
-            </a:r>
-            <a:r>
-              <a:rPr lang="en-US" sz="2800" b="1" dirty="0">
-                <a:solidFill>
-                  <a:srgbClr val="018E9F"/>
-                </a:solidFill>
-                <a:cs typeface="+mn-cs"/>
-              </a:rPr>
-              <a:t>AAWG is a Trusted Environment</a:t>
-            </a:r>
-          </a:p>
-        </p:txBody>
-      </p:sp>
-      <p:sp>
-        <p:nvSpPr>
-          <p:cNvPr id="8" name="Text Box 7"/>
-          <p:cNvSpPr txBox="1">
-            <a:spLocks noChangeArrowheads="1"/>
-          </p:cNvSpPr>
-          <p:nvPr/>
-        </p:nvSpPr>
-        <p:spPr bwMode="auto">
-          <a:xfrm>
-            <a:off x="304800" y="952500"/>
-            <a:ext cx="8674100" cy="5396349"/>
-          </a:xfrm>
-          <a:prstGeom prst="rect">
-            <a:avLst/>
-          </a:prstGeom>
-          <a:noFill/>
-          <a:ln>
-            <a:noFill/>
-          </a:ln>
-          <a:effectLst/>
-          <a:extLst>
-            <a:ext uri="{909E8E84-426E-40dd-AFC4-6F175D3DCCD1}">
-              <a14:hiddenFill xmlns:a14="http://schemas.microsoft.com/office/drawing/2010/main" xmlns="">
-                <a:solidFill>
-                  <a:schemeClr val="accent1"/>
-                </a:solidFill>
-              </a14:hiddenFill>
-            </a:ext>
-            <a:ext uri="{91240B29-F687-4f45-9708-019B960494DF}">
-              <a14:hiddenLine xmlns:a14="http://schemas.microsoft.com/office/drawing/2010/main" xmlns="" w="9525">
-                <a:solidFill>
-                  <a:schemeClr val="tx1"/>
-                </a:solidFill>
-                <a:miter lim="800000"/>
-                <a:headEnd/>
-                <a:tailEnd/>
-              </a14:hiddenLine>
-            </a:ext>
-            <a:ext uri="{AF507438-7753-43e0-B8FC-AC1667EBCBE1}">
-              <a14:hiddenEffects xmlns:a14="http://schemas.microsoft.com/office/drawing/2010/main" xmlns="">
-                <a:effectLst>
-                  <a:outerShdw blurRad="63500" dist="38099" dir="2700000" algn="ctr" rotWithShape="0">
-                    <a:schemeClr val="bg2">
-                      <a:alpha val="74998"/>
-                    </a:schemeClr>
-                  </a:outerShdw>
-                </a:effectLst>
-              </a14:hiddenEffects>
-            </a:ext>
-          </a:extLst>
-        </p:spPr>
-        <p:txBody>
-          <a:bodyPr wrap="square">
-            <a:spAutoFit/>
-          </a:bodyPr>
-          <a:lstStyle>
-            <a:lvl1pPr marL="233363" indent="-233363">
-              <a:defRPr>
-                <a:solidFill>
-                  <a:schemeClr val="tx1"/>
-                </a:solidFill>
-                <a:latin typeface="Arial" charset="0"/>
-                <a:ea typeface="ＭＳ Ｐゴシック" charset="0"/>
-              </a:defRPr>
-            </a:lvl1pPr>
-            <a:lvl2pPr>
-              <a:defRPr>
-                <a:solidFill>
-                  <a:schemeClr val="tx1"/>
-                </a:solidFill>
-                <a:latin typeface="Arial" charset="0"/>
-                <a:ea typeface="ＭＳ Ｐゴシック" charset="0"/>
-              </a:defRPr>
-            </a:lvl2pPr>
-            <a:lvl3pPr>
-              <a:defRPr>
-                <a:solidFill>
-                  <a:schemeClr val="tx1"/>
-                </a:solidFill>
-                <a:latin typeface="Arial" charset="0"/>
-                <a:ea typeface="ＭＳ Ｐゴシック" charset="0"/>
-              </a:defRPr>
-            </a:lvl3pPr>
-            <a:lvl4pPr>
-              <a:defRPr>
-                <a:solidFill>
-                  <a:schemeClr val="tx1"/>
-                </a:solidFill>
-                <a:latin typeface="Arial" charset="0"/>
-                <a:ea typeface="ＭＳ Ｐゴシック" charset="0"/>
-              </a:defRPr>
-            </a:lvl4pPr>
-            <a:lvl5pPr>
-              <a:defRPr>
-                <a:solidFill>
-                  <a:schemeClr val="tx1"/>
-                </a:solidFill>
-                <a:latin typeface="Arial" charset="0"/>
-                <a:ea typeface="ＭＳ Ｐゴシック" charset="0"/>
-              </a:defRPr>
-            </a:lvl5pPr>
-            <a:lvl6pPr fontAlgn="base">
-              <a:spcBef>
-                <a:spcPct val="0"/>
-              </a:spcBef>
-              <a:spcAft>
-                <a:spcPct val="0"/>
-              </a:spcAft>
-              <a:defRPr>
-                <a:solidFill>
-                  <a:schemeClr val="tx1"/>
-                </a:solidFill>
-                <a:latin typeface="Arial" charset="0"/>
-                <a:ea typeface="ＭＳ Ｐゴシック" charset="0"/>
-              </a:defRPr>
-            </a:lvl6pPr>
-            <a:lvl7pPr fontAlgn="base">
-              <a:spcBef>
-                <a:spcPct val="0"/>
-              </a:spcBef>
-              <a:spcAft>
-                <a:spcPct val="0"/>
-              </a:spcAft>
-              <a:defRPr>
-                <a:solidFill>
-                  <a:schemeClr val="tx1"/>
-                </a:solidFill>
-                <a:latin typeface="Arial" charset="0"/>
-                <a:ea typeface="ＭＳ Ｐゴシック" charset="0"/>
-              </a:defRPr>
-            </a:lvl7pPr>
-            <a:lvl8pPr fontAlgn="base">
-              <a:spcBef>
-                <a:spcPct val="0"/>
-              </a:spcBef>
-              <a:spcAft>
-                <a:spcPct val="0"/>
-              </a:spcAft>
-              <a:defRPr>
-                <a:solidFill>
-                  <a:schemeClr val="tx1"/>
-                </a:solidFill>
-                <a:latin typeface="Arial" charset="0"/>
-                <a:ea typeface="ＭＳ Ｐゴシック" charset="0"/>
-              </a:defRPr>
-            </a:lvl8pPr>
-            <a:lvl9pPr fontAlgn="base">
-              <a:spcBef>
-                <a:spcPct val="0"/>
-              </a:spcBef>
-              <a:spcAft>
-                <a:spcPct val="0"/>
-              </a:spcAft>
-              <a:defRPr>
-                <a:solidFill>
-                  <a:schemeClr val="tx1"/>
-                </a:solidFill>
-                <a:latin typeface="Arial" charset="0"/>
-                <a:ea typeface="ＭＳ Ｐゴシック" charset="0"/>
-              </a:defRPr>
-            </a:lvl9pPr>
-          </a:lstStyle>
-          <a:p>
-            <a:pPr marL="0" indent="0">
-              <a:spcAft>
-                <a:spcPts val="400"/>
-              </a:spcAft>
-              <a:defRPr/>
-            </a:pPr>
-            <a:br>
-              <a:rPr lang="en-US" sz="2000" b="1" dirty="0"/>
-            </a:br>
-            <a:r>
-              <a:rPr lang="en-US" sz="2000" b="1" dirty="0"/>
-              <a:t>What happens in M</a:t>
-            </a:r>
-            <a:r>
-              <a:rPr lang="en-US" sz="2000" b="1" baseline="30000" dirty="0"/>
-              <a:t>3</a:t>
-            </a:r>
-            <a:r>
-              <a:rPr lang="en-US" sz="2000" b="1" dirty="0"/>
-              <a:t>AAWG stays in M</a:t>
-            </a:r>
-            <a:r>
-              <a:rPr lang="en-US" sz="2000" b="1" baseline="30000" dirty="0"/>
-              <a:t>3</a:t>
-            </a:r>
-            <a:r>
-              <a:rPr lang="en-US" sz="2000" b="1" dirty="0"/>
-              <a:t>AAWG </a:t>
-            </a:r>
-          </a:p>
-          <a:p>
-            <a:pPr marL="285750" indent="-285750">
-              <a:spcAft>
-                <a:spcPts val="600"/>
-              </a:spcAft>
-              <a:buFont typeface="Arial" charset="0"/>
-              <a:buChar char="•"/>
-              <a:defRPr/>
-            </a:pPr>
-            <a:r>
-              <a:rPr lang="en-US" sz="1800" dirty="0"/>
-              <a:t>What occurs here cannot be shared outside the membership without the written permission of the Executive Director, unless we state the specific session is open to the press and social media</a:t>
-            </a:r>
-          </a:p>
-          <a:p>
-            <a:pPr marL="285750" indent="-285750">
-              <a:spcAft>
-                <a:spcPts val="400"/>
-              </a:spcAft>
-              <a:buFont typeface="Arial" charset="0"/>
-              <a:buChar char="•"/>
-              <a:defRPr/>
-            </a:pPr>
-            <a:r>
-              <a:rPr lang="en-US" sz="1800" dirty="0"/>
-              <a:t>See the M</a:t>
-            </a:r>
-            <a:r>
-              <a:rPr lang="en-US" sz="1800" baseline="30000" dirty="0"/>
-              <a:t>3</a:t>
-            </a:r>
-            <a:r>
-              <a:rPr lang="en-US" sz="1800" dirty="0"/>
-              <a:t>AAWG Meeting Policy at </a:t>
-            </a:r>
-            <a:r>
-              <a:rPr lang="en-US" sz="1800" dirty="0">
-                <a:hlinkClick r:id="rId2"/>
-              </a:rPr>
-              <a:t>www.m3aawg.org/MeetingPolicy</a:t>
-            </a:r>
-            <a:r>
-              <a:rPr lang="en-US" sz="1800" dirty="0"/>
-              <a:t> </a:t>
-            </a:r>
-            <a:br>
-              <a:rPr lang="en-US" sz="1800" dirty="0"/>
-            </a:br>
-            <a:endParaRPr lang="en-US" sz="1800" b="1" dirty="0"/>
-          </a:p>
-          <a:p>
-            <a:pPr marL="15875" indent="-15875">
-              <a:defRPr/>
-            </a:pPr>
-            <a:r>
-              <a:rPr lang="en-US" sz="2000" b="1" dirty="0"/>
-              <a:t>Treat Everyone with Respect</a:t>
-            </a:r>
-          </a:p>
-          <a:p>
-            <a:pPr marL="285750" indent="-285750">
-              <a:spcAft>
-                <a:spcPts val="600"/>
-              </a:spcAft>
-              <a:buFont typeface="Arial" charset="0"/>
-              <a:buChar char="•"/>
-              <a:defRPr/>
-            </a:pPr>
-            <a:r>
-              <a:rPr lang="en-US" sz="1800" dirty="0"/>
-              <a:t>Treat all attendees respectfully in and out of sessions. No less will be tolerated. </a:t>
-            </a:r>
-          </a:p>
-          <a:p>
-            <a:pPr marL="285750" indent="-285750">
-              <a:buFont typeface="Arial" charset="0"/>
-              <a:buChar char="•"/>
-              <a:defRPr/>
-            </a:pPr>
-            <a:r>
-              <a:rPr lang="en-US" sz="1800" dirty="0"/>
-              <a:t>See the M</a:t>
-            </a:r>
-            <a:r>
-              <a:rPr lang="en-US" sz="1800" baseline="30000" dirty="0"/>
-              <a:t>3</a:t>
-            </a:r>
-            <a:r>
-              <a:rPr lang="en-US" sz="1800" dirty="0"/>
-              <a:t>AAWG Conduct Policy at </a:t>
-            </a:r>
-            <a:r>
-              <a:rPr lang="en-US" sz="1800" dirty="0">
-                <a:hlinkClick r:id="rId3"/>
-              </a:rPr>
-              <a:t>https://www.m3aawg.org/conduct-policy</a:t>
-            </a:r>
-            <a:endParaRPr lang="en-US" sz="1800" dirty="0"/>
-          </a:p>
-          <a:p>
-            <a:pPr marL="0" indent="0" algn="ctr">
-              <a:spcAft>
-                <a:spcPts val="600"/>
-              </a:spcAft>
-              <a:defRPr/>
-            </a:pPr>
-            <a:r>
-              <a:rPr lang="en-US" sz="1200" dirty="0"/>
-              <a:t> </a:t>
-            </a:r>
-          </a:p>
-          <a:p>
-            <a:pPr marL="0" indent="0" algn="ctr">
-              <a:spcAft>
-                <a:spcPts val="600"/>
-              </a:spcAft>
-              <a:defRPr/>
-            </a:pPr>
-            <a:r>
-              <a:rPr lang="en-US" sz="1600" dirty="0"/>
-              <a:t>You agreed to these policies when you registered for the meeting</a:t>
-            </a:r>
-          </a:p>
-          <a:p>
-            <a:pPr marL="0" indent="0" algn="ctr">
-              <a:spcAft>
-                <a:spcPts val="0"/>
-              </a:spcAft>
-              <a:defRPr/>
-            </a:pPr>
-            <a:r>
-              <a:rPr lang="en-US" sz="1600" dirty="0"/>
-              <a:t>For questions, please contact Jerry Upton at: </a:t>
-            </a:r>
-            <a:r>
-              <a:rPr lang="en-US" sz="1600" dirty="0">
-                <a:hlinkClick r:id="rId4"/>
-              </a:rPr>
-              <a:t>jerry.upton@m3aawg.org</a:t>
-            </a:r>
-            <a:r>
-              <a:rPr lang="en-US" sz="1600" dirty="0"/>
-              <a:t> </a:t>
-            </a:r>
-          </a:p>
-          <a:p>
-            <a:pPr marL="0" indent="0">
-              <a:spcAft>
-                <a:spcPts val="600"/>
-              </a:spcAft>
-              <a:defRPr/>
-            </a:pPr>
-            <a:endParaRPr lang="en-US" sz="1800" dirty="0"/>
-          </a:p>
-          <a:p>
-            <a:pPr marL="0" indent="0">
-              <a:spcAft>
-                <a:spcPts val="600"/>
-              </a:spcAft>
-              <a:defRPr/>
-            </a:pPr>
-            <a:r>
-              <a:rPr lang="en-US" sz="2000" b="1" dirty="0"/>
-              <a:t>Contribute to a Productive Meeting</a:t>
-            </a:r>
-          </a:p>
-          <a:p>
-            <a:pPr marL="285750" indent="-285750">
-              <a:spcAft>
-                <a:spcPts val="600"/>
-              </a:spcAft>
-              <a:buFont typeface="Arial"/>
-              <a:buChar char="•"/>
-              <a:defRPr/>
-            </a:pPr>
-            <a:r>
-              <a:rPr lang="en-US" sz="1600" dirty="0"/>
-              <a:t>Please silence all electronic devices; be courteous to those listening to the presentations</a:t>
-            </a:r>
-          </a:p>
-          <a:p>
-            <a:pPr marL="285750" indent="-285750">
-              <a:spcAft>
-                <a:spcPts val="600"/>
-              </a:spcAft>
-              <a:buFont typeface="Arial"/>
-              <a:buChar char="•"/>
-              <a:defRPr/>
-            </a:pPr>
-            <a:r>
-              <a:rPr lang="en-US" sz="1600" dirty="0"/>
-              <a:t>DO NOT LEAVE YOUR BELONGINGS UNATTENDED. Be aware and cautious at all times</a:t>
-            </a:r>
-          </a:p>
-        </p:txBody>
-      </p:sp>
-      <p:sp>
-        <p:nvSpPr>
-          <p:cNvPr id="9" name="Text Box 11"/>
-          <p:cNvSpPr txBox="1">
-            <a:spLocks noChangeArrowheads="1"/>
-          </p:cNvSpPr>
-          <p:nvPr/>
-        </p:nvSpPr>
-        <p:spPr bwMode="auto">
-          <a:xfrm>
-            <a:off x="6296908" y="709165"/>
-            <a:ext cx="3594102" cy="1354217"/>
-          </a:xfrm>
-          <a:prstGeom prst="rect">
-            <a:avLst/>
-          </a:prstGeom>
-          <a:solidFill>
-            <a:schemeClr val="bg1">
-              <a:lumMod val="85000"/>
-            </a:schemeClr>
-          </a:solidFill>
-          <a:ln w="9525">
-            <a:solidFill>
-              <a:schemeClr val="tx1"/>
-            </a:solidFill>
-            <a:miter lim="800000"/>
-            <a:headEnd/>
-            <a:tailEnd/>
-          </a:ln>
-          <a:effectLst/>
-          <a:extLst/>
-        </p:spPr>
-        <p:txBody>
-          <a:bodyPr wrap="square">
-            <a:spAutoFit/>
-          </a:bodyPr>
-          <a:lstStyle/>
-          <a:p>
-            <a:pPr>
-              <a:spcBef>
-                <a:spcPct val="50000"/>
-              </a:spcBef>
-              <a:defRPr/>
-            </a:pPr>
-            <a:r>
-              <a:rPr lang="en-US" sz="1400" b="1" dirty="0">
-                <a:solidFill>
-                  <a:srgbClr val="FF3300"/>
-                </a:solidFill>
-                <a:cs typeface="+mn-cs"/>
-              </a:rPr>
-              <a:t>This slide is for Moderators’ and Chairs’ slide deck template only </a:t>
-            </a:r>
-            <a:br>
-              <a:rPr lang="en-US" sz="1400" dirty="0">
-                <a:solidFill>
-                  <a:srgbClr val="FF3300"/>
-                </a:solidFill>
-                <a:cs typeface="+mn-cs"/>
-              </a:rPr>
-            </a:br>
-            <a:r>
-              <a:rPr lang="en-US" sz="1400" dirty="0">
-                <a:solidFill>
-                  <a:srgbClr val="FF3300"/>
-                </a:solidFill>
-                <a:cs typeface="+mn-cs"/>
-              </a:rPr>
-              <a:t>– not presenters.</a:t>
-            </a:r>
-          </a:p>
-          <a:p>
-            <a:pPr>
-              <a:spcBef>
-                <a:spcPct val="50000"/>
-              </a:spcBef>
-              <a:defRPr/>
-            </a:pPr>
-            <a:r>
-              <a:rPr lang="en-US" sz="1600" b="1" i="1" dirty="0">
-                <a:solidFill>
-                  <a:srgbClr val="FF3300"/>
-                </a:solidFill>
-                <a:cs typeface="+mn-cs"/>
-              </a:rPr>
-              <a:t>*Presenters remove this note before using this slide </a:t>
-            </a:r>
-          </a:p>
-        </p:txBody>
-      </p:sp>
-    </p:spTree>
-    <p:extLst>
-      <p:ext uri="{BB962C8B-B14F-4D97-AF65-F5344CB8AC3E}">
-        <p14:creationId xmlns:p14="http://schemas.microsoft.com/office/powerpoint/2010/main" val="1266460983"/>
-      </p:ext>
-    </p:extLst>
-  </p:cSld>
-  <p:clrMapOvr>
-    <a:masterClrMapping/>
-  </p:clrMapOvr>
-</p:sld>
-</file>
-
-<file path=ppt/slides/slide3.xml><?xml version="1.0" encoding="utf-8"?>
-<p:sld xmlns:a="http://schemas.openxmlformats.org/drawingml/2006/main" xmlns:r="http://schemas.openxmlformats.org/officeDocument/2006/relationships" xmlns:p="http://schemas.openxmlformats.org/presentationml/2006/main" show="0">
-  <p:cSld>
-    <p:spTree>
-      <p:nvGrpSpPr>
-        <p:cNvPr id="1" name=""/>
-        <p:cNvGrpSpPr/>
-        <p:nvPr/>
-      </p:nvGrpSpPr>
-      <p:grpSpPr>
-        <a:xfrm>
-          <a:off x="0" y="0"/>
-          <a:ext cx="0" cy="0"/>
-          <a:chOff x="0" y="0"/>
-          <a:chExt cx="0" cy="0"/>
-        </a:xfrm>
-      </p:grpSpPr>
-      <p:sp>
-        <p:nvSpPr>
-          <p:cNvPr id="2" name="Title 1"/>
-          <p:cNvSpPr>
-            <a:spLocks noGrp="1"/>
-          </p:cNvSpPr>
-          <p:nvPr>
-            <p:ph type="title"/>
-          </p:nvPr>
-        </p:nvSpPr>
-        <p:spPr/>
-        <p:txBody>
-          <a:bodyPr/>
-          <a:lstStyle/>
-          <a:p>
-            <a:r>
-              <a:rPr lang="en-US" dirty="0"/>
-              <a:t>Reminders for Our Worldwide Friends</a:t>
-            </a:r>
-          </a:p>
-        </p:txBody>
-      </p:sp>
-      <p:sp>
-        <p:nvSpPr>
-          <p:cNvPr id="3" name="Footer Placeholder 2"/>
-          <p:cNvSpPr>
-            <a:spLocks noGrp="1"/>
-          </p:cNvSpPr>
-          <p:nvPr>
-            <p:ph type="ftr" sz="quarter" idx="10"/>
-          </p:nvPr>
-        </p:nvSpPr>
-        <p:spPr>
-          <a:xfrm>
-            <a:off x="228600" y="6428319"/>
-            <a:ext cx="5410200" cy="323850"/>
-          </a:xfrm>
-        </p:spPr>
-        <p:txBody>
-          <a:bodyPr/>
-          <a:lstStyle/>
-          <a:p>
-            <a:pPr>
-              <a:defRPr/>
-            </a:pPr>
-            <a:r>
-              <a:rPr lang="en-US"/>
-              <a:t>M3AAWG 43rd General Meeting | Munich | June 2018</a:t>
-            </a:r>
-          </a:p>
-        </p:txBody>
-      </p:sp>
-      <p:grpSp>
-        <p:nvGrpSpPr>
-          <p:cNvPr id="6" name="Group 5"/>
-          <p:cNvGrpSpPr/>
-          <p:nvPr/>
-        </p:nvGrpSpPr>
-        <p:grpSpPr>
-          <a:xfrm>
-            <a:off x="491074" y="1701794"/>
-            <a:ext cx="8346017" cy="523220"/>
-            <a:chOff x="491074" y="1701794"/>
-            <a:chExt cx="8346017" cy="523220"/>
-          </a:xfrm>
-        </p:grpSpPr>
-        <p:sp>
-          <p:nvSpPr>
-            <p:cNvPr id="4" name="TextBox 3"/>
-            <p:cNvSpPr txBox="1"/>
-            <p:nvPr/>
-          </p:nvSpPr>
-          <p:spPr>
-            <a:xfrm>
-              <a:off x="994841" y="1701794"/>
-              <a:ext cx="7842250" cy="523220"/>
-            </a:xfrm>
-            <a:prstGeom prst="rect">
-              <a:avLst/>
-            </a:prstGeom>
-            <a:noFill/>
-          </p:spPr>
-          <p:txBody>
-            <a:bodyPr wrap="square" rtlCol="0">
-              <a:spAutoFit/>
-            </a:bodyPr>
-            <a:lstStyle/>
-            <a:p>
-              <a:r>
-                <a:rPr lang="fr-FR" sz="1400" dirty="0"/>
-                <a:t>L’ensemble du contenu de la réunion est confidentiel : les photos, vidéos et enregistrements sont interdits. Pour toute question, demandez conseil au personnel.</a:t>
-              </a:r>
-              <a:r>
-                <a:rPr lang="en-US" sz="1400" dirty="0"/>
-                <a:t> </a:t>
-              </a:r>
-            </a:p>
-          </p:txBody>
-        </p:sp>
-        <p:pic>
-          <p:nvPicPr>
-            <p:cNvPr id="5" name="Picture 4" descr="Flag-French.png"/>
-            <p:cNvPicPr>
-              <a:picLocks noChangeAspect="1"/>
-            </p:cNvPicPr>
-            <p:nvPr/>
-          </p:nvPicPr>
-          <p:blipFill>
-            <a:blip r:embed="rId3">
-              <a:extLst>
-                <a:ext uri="{28A0092B-C50C-407E-A947-70E740481C1C}">
-                  <a14:useLocalDpi xmlns:a14="http://schemas.microsoft.com/office/drawing/2010/main" val="0"/>
-                </a:ext>
-              </a:extLst>
-            </a:blip>
-            <a:stretch>
-              <a:fillRect/>
-            </a:stretch>
-          </p:blipFill>
-          <p:spPr>
-            <a:xfrm rot="10800000" flipH="1">
-              <a:off x="491074" y="1701794"/>
-              <a:ext cx="463550" cy="463550"/>
-            </a:xfrm>
-            <a:prstGeom prst="rect">
-              <a:avLst/>
-            </a:prstGeom>
-          </p:spPr>
-        </p:pic>
-      </p:grpSp>
-      <p:grpSp>
-        <p:nvGrpSpPr>
-          <p:cNvPr id="16" name="Group 15"/>
-          <p:cNvGrpSpPr/>
-          <p:nvPr/>
-        </p:nvGrpSpPr>
-        <p:grpSpPr>
-          <a:xfrm>
-            <a:off x="478374" y="2388048"/>
-            <a:ext cx="8379883" cy="523220"/>
-            <a:chOff x="309034" y="2454749"/>
-            <a:chExt cx="8379883" cy="523220"/>
-          </a:xfrm>
-        </p:grpSpPr>
-        <p:sp>
-          <p:nvSpPr>
-            <p:cNvPr id="9" name="Rectangle 8"/>
-            <p:cNvSpPr/>
-            <p:nvPr/>
-          </p:nvSpPr>
-          <p:spPr>
-            <a:xfrm>
-              <a:off x="804333" y="2454749"/>
-              <a:ext cx="7884584" cy="523220"/>
-            </a:xfrm>
-            <a:prstGeom prst="rect">
-              <a:avLst/>
-            </a:prstGeom>
-          </p:spPr>
-          <p:txBody>
-            <a:bodyPr wrap="square">
-              <a:spAutoFit/>
-            </a:bodyPr>
-            <a:lstStyle/>
-            <a:p>
-              <a:r>
-                <a:rPr lang="es-ES" sz="1400" dirty="0"/>
-                <a:t>Todo el contenido de la reunión es confidencial: No está permitido sacar fotografías ni grabar vídeo o audio. Consulte con el personal si tiene alguna pregunta.</a:t>
-              </a:r>
-              <a:r>
-                <a:rPr lang="en-US" sz="1400" dirty="0"/>
-                <a:t> </a:t>
-              </a:r>
-            </a:p>
-          </p:txBody>
-        </p:sp>
-        <p:pic>
-          <p:nvPicPr>
-            <p:cNvPr id="11" name="Picture 10" descr="Flag-Spanish.png"/>
-            <p:cNvPicPr>
-              <a:picLocks noChangeAspect="1"/>
-            </p:cNvPicPr>
-            <p:nvPr/>
-          </p:nvPicPr>
-          <p:blipFill>
-            <a:blip r:embed="rId4">
-              <a:extLst>
-                <a:ext uri="{28A0092B-C50C-407E-A947-70E740481C1C}">
-                  <a14:useLocalDpi xmlns:a14="http://schemas.microsoft.com/office/drawing/2010/main" val="0"/>
-                </a:ext>
-              </a:extLst>
-            </a:blip>
-            <a:stretch>
-              <a:fillRect/>
-            </a:stretch>
-          </p:blipFill>
-          <p:spPr>
-            <a:xfrm>
-              <a:off x="309034" y="2454749"/>
-              <a:ext cx="495299" cy="495299"/>
-            </a:xfrm>
-            <a:prstGeom prst="rect">
-              <a:avLst/>
-            </a:prstGeom>
-          </p:spPr>
-        </p:pic>
-      </p:grpSp>
-      <p:grpSp>
-        <p:nvGrpSpPr>
-          <p:cNvPr id="32" name="Group 31"/>
-          <p:cNvGrpSpPr/>
-          <p:nvPr/>
-        </p:nvGrpSpPr>
-        <p:grpSpPr>
-          <a:xfrm>
-            <a:off x="467790" y="3042553"/>
-            <a:ext cx="8517467" cy="548868"/>
-            <a:chOff x="298450" y="3076575"/>
-            <a:chExt cx="8517467" cy="548868"/>
-          </a:xfrm>
-        </p:grpSpPr>
-        <p:sp>
-          <p:nvSpPr>
-            <p:cNvPr id="13" name="TextBox 12"/>
-            <p:cNvSpPr txBox="1"/>
-            <p:nvPr/>
-          </p:nvSpPr>
-          <p:spPr>
-            <a:xfrm>
-              <a:off x="804334" y="3076575"/>
-              <a:ext cx="8011583" cy="548868"/>
-            </a:xfrm>
-            <a:prstGeom prst="rect">
-              <a:avLst/>
-            </a:prstGeom>
-            <a:noFill/>
-          </p:spPr>
-          <p:txBody>
-            <a:bodyPr wrap="square" rtlCol="0">
-              <a:spAutoFit/>
-            </a:bodyPr>
-            <a:lstStyle/>
-            <a:p>
-              <a:pPr>
-                <a:lnSpc>
-                  <a:spcPts val="1680"/>
-                </a:lnSpc>
-              </a:pPr>
-              <a:r>
-                <a:rPr lang="de-DE" sz="1400" dirty="0"/>
-                <a:t>Der gesamte Inhalt des Meetings ist vertraulich:  Keine Fotos, kein Video, keine Tonaufzeichnung. Bei Fragen wenden Sie sich an die Mitarbeiter.</a:t>
-              </a:r>
-              <a:r>
-                <a:rPr lang="en-US" dirty="0"/>
-                <a:t> </a:t>
-              </a:r>
-            </a:p>
-          </p:txBody>
-        </p:sp>
-        <p:pic>
-          <p:nvPicPr>
-            <p:cNvPr id="14" name="Picture 13" descr="Flag-German.png"/>
-            <p:cNvPicPr>
-              <a:picLocks noChangeAspect="1"/>
-            </p:cNvPicPr>
-            <p:nvPr/>
-          </p:nvPicPr>
-          <p:blipFill>
-            <a:blip r:embed="rId5">
-              <a:extLst>
-                <a:ext uri="{28A0092B-C50C-407E-A947-70E740481C1C}">
-                  <a14:useLocalDpi xmlns:a14="http://schemas.microsoft.com/office/drawing/2010/main" val="0"/>
-                </a:ext>
-              </a:extLst>
-            </a:blip>
-            <a:stretch>
-              <a:fillRect/>
-            </a:stretch>
-          </p:blipFill>
-          <p:spPr>
-            <a:xfrm>
-              <a:off x="298450" y="3103359"/>
-              <a:ext cx="495300" cy="495300"/>
-            </a:xfrm>
-            <a:prstGeom prst="rect">
-              <a:avLst/>
-            </a:prstGeom>
-          </p:spPr>
-        </p:pic>
-      </p:grpSp>
-      <p:grpSp>
-        <p:nvGrpSpPr>
-          <p:cNvPr id="35" name="Group 34"/>
-          <p:cNvGrpSpPr/>
-          <p:nvPr/>
-        </p:nvGrpSpPr>
-        <p:grpSpPr>
-          <a:xfrm>
-            <a:off x="474133" y="4344815"/>
-            <a:ext cx="8433334" cy="520294"/>
-            <a:chOff x="474133" y="4313066"/>
-            <a:chExt cx="8433334" cy="520294"/>
-          </a:xfrm>
-        </p:grpSpPr>
-        <p:sp>
-          <p:nvSpPr>
-            <p:cNvPr id="19" name="TextBox 18"/>
-            <p:cNvSpPr txBox="1"/>
-            <p:nvPr/>
-          </p:nvSpPr>
-          <p:spPr>
-            <a:xfrm>
-              <a:off x="968381" y="4313066"/>
-              <a:ext cx="7939086" cy="461665"/>
-            </a:xfrm>
-            <a:prstGeom prst="rect">
-              <a:avLst/>
-            </a:prstGeom>
-            <a:noFill/>
-          </p:spPr>
-          <p:txBody>
-            <a:bodyPr wrap="square" rtlCol="0">
-              <a:spAutoFit/>
-            </a:bodyPr>
-            <a:lstStyle/>
-            <a:p>
-              <a:r>
-                <a:rPr lang="ja-JP" altLang="en-US" sz="1400" dirty="0"/>
-                <a:t>所有会议内容均为保密信息：禁止拍照、录像、录音。如有疑问，请咨询职员。</a:t>
-              </a:r>
-              <a:r>
-                <a:rPr lang="en-US" dirty="0"/>
-                <a:t> </a:t>
-              </a:r>
-            </a:p>
-          </p:txBody>
-        </p:sp>
-        <p:pic>
-          <p:nvPicPr>
-            <p:cNvPr id="20" name="Picture 19" descr="Flag-Chinese.png"/>
-            <p:cNvPicPr>
-              <a:picLocks noChangeAspect="1"/>
-            </p:cNvPicPr>
-            <p:nvPr/>
-          </p:nvPicPr>
-          <p:blipFill>
-            <a:blip r:embed="rId6">
-              <a:extLst>
-                <a:ext uri="{28A0092B-C50C-407E-A947-70E740481C1C}">
-                  <a14:useLocalDpi xmlns:a14="http://schemas.microsoft.com/office/drawing/2010/main" val="0"/>
-                </a:ext>
-              </a:extLst>
-            </a:blip>
-            <a:stretch>
-              <a:fillRect/>
-            </a:stretch>
-          </p:blipFill>
-          <p:spPr>
-            <a:xfrm>
-              <a:off x="474133" y="4345462"/>
-              <a:ext cx="487898" cy="487898"/>
-            </a:xfrm>
-            <a:prstGeom prst="rect">
-              <a:avLst/>
-            </a:prstGeom>
-          </p:spPr>
-        </p:pic>
-      </p:grpSp>
-      <p:grpSp>
-        <p:nvGrpSpPr>
-          <p:cNvPr id="30" name="Group 29"/>
-          <p:cNvGrpSpPr/>
-          <p:nvPr/>
-        </p:nvGrpSpPr>
-        <p:grpSpPr>
-          <a:xfrm>
-            <a:off x="514069" y="3722706"/>
-            <a:ext cx="8409804" cy="523220"/>
-            <a:chOff x="344729" y="3577167"/>
-            <a:chExt cx="8409804" cy="523220"/>
-          </a:xfrm>
-        </p:grpSpPr>
-        <p:sp>
-          <p:nvSpPr>
-            <p:cNvPr id="17" name="TextBox 16"/>
-            <p:cNvSpPr txBox="1"/>
-            <p:nvPr/>
-          </p:nvSpPr>
-          <p:spPr>
-            <a:xfrm>
-              <a:off x="804863" y="3577167"/>
-              <a:ext cx="7949670" cy="523220"/>
-            </a:xfrm>
-            <a:prstGeom prst="rect">
-              <a:avLst/>
-            </a:prstGeom>
-            <a:noFill/>
-          </p:spPr>
-          <p:txBody>
-            <a:bodyPr wrap="square" rtlCol="0">
-              <a:spAutoFit/>
-            </a:bodyPr>
-            <a:lstStyle/>
-            <a:p>
-              <a:r>
-                <a:rPr lang="en-US" sz="1400" dirty="0"/>
-                <a:t>            </a:t>
-              </a:r>
-              <a:r>
-                <a:rPr lang="ja-JP" altLang="en-US" sz="1400" dirty="0"/>
-                <a:t>会議の内容はすべて機密扱いです。</a:t>
-              </a:r>
-              <a:r>
-                <a:rPr lang="en-US" sz="1400" dirty="0"/>
-                <a:t> </a:t>
-              </a:r>
-              <a:r>
-                <a:rPr lang="ja-JP" altLang="en-US" sz="1400" dirty="0"/>
-                <a:t>写真やビデオの撮影、録音は禁止されています。質問がある方は、スタッフまでご連絡ください。</a:t>
-              </a:r>
-              <a:r>
-                <a:rPr lang="en-US" sz="1400" dirty="0"/>
-                <a:t> </a:t>
-              </a:r>
-            </a:p>
-          </p:txBody>
-        </p:sp>
-        <p:pic>
-          <p:nvPicPr>
-            <p:cNvPr id="25" name="Picture 24" descr="Flat-Japan Rough.gif"/>
-            <p:cNvPicPr>
-              <a:picLocks noChangeAspect="1"/>
-            </p:cNvPicPr>
-            <p:nvPr/>
-          </p:nvPicPr>
-          <p:blipFill rotWithShape="1">
-            <a:blip r:embed="rId7">
-              <a:extLst>
-                <a:ext uri="{BEBA8EAE-BF5A-486C-A8C5-ECC9F3942E4B}">
-                  <a14:imgProps xmlns:a14="http://schemas.microsoft.com/office/drawing/2010/main">
-                    <a14:imgLayer r:embed="rId8">
-                      <a14:imgEffect>
-                        <a14:artisticPastelsSmooth/>
-                      </a14:imgEffect>
-                    </a14:imgLayer>
-                  </a14:imgProps>
-                </a:ext>
-                <a:ext uri="{28A0092B-C50C-407E-A947-70E740481C1C}">
-                  <a14:useLocalDpi xmlns:a14="http://schemas.microsoft.com/office/drawing/2010/main" val="0"/>
-                </a:ext>
-              </a:extLst>
-            </a:blip>
-            <a:srcRect l="12280" t="6409" r="9702" b="-3847"/>
-            <a:stretch/>
-          </p:blipFill>
-          <p:spPr>
-            <a:xfrm>
-              <a:off x="344729" y="3626178"/>
-              <a:ext cx="426303" cy="391766"/>
-            </a:xfrm>
-            <a:prstGeom prst="rect">
-              <a:avLst/>
-            </a:prstGeom>
-            <a:effectLst>
-              <a:glow rad="25400">
-                <a:schemeClr val="bg1">
-                  <a:lumMod val="85000"/>
-                  <a:alpha val="75000"/>
-                </a:schemeClr>
-              </a:glow>
-            </a:effectLst>
-            <a:scene3d>
-              <a:camera prst="orthographicFront"/>
-              <a:lightRig rig="threePt" dir="t"/>
-            </a:scene3d>
-            <a:sp3d extrusionH="19050" contourW="12700">
-              <a:bevelT/>
-              <a:bevelB/>
-              <a:contourClr>
-                <a:schemeClr val="bg1">
-                  <a:lumMod val="85000"/>
-                </a:schemeClr>
-              </a:contourClr>
-            </a:sp3d>
-          </p:spPr>
-        </p:pic>
-      </p:grpSp>
-      <p:grpSp>
-        <p:nvGrpSpPr>
-          <p:cNvPr id="33" name="Group 32"/>
-          <p:cNvGrpSpPr/>
-          <p:nvPr/>
-        </p:nvGrpSpPr>
-        <p:grpSpPr>
-          <a:xfrm>
-            <a:off x="482600" y="4973102"/>
-            <a:ext cx="7630062" cy="523220"/>
-            <a:chOff x="313260" y="5059891"/>
-            <a:chExt cx="7630062" cy="523220"/>
-          </a:xfrm>
-        </p:grpSpPr>
-        <p:sp>
-          <p:nvSpPr>
-            <p:cNvPr id="22" name="TextBox 21"/>
-            <p:cNvSpPr txBox="1"/>
-            <p:nvPr/>
-          </p:nvSpPr>
-          <p:spPr>
-            <a:xfrm>
-              <a:off x="810156" y="5059891"/>
-              <a:ext cx="7133166" cy="523220"/>
-            </a:xfrm>
-            <a:prstGeom prst="rect">
-              <a:avLst/>
-            </a:prstGeom>
-            <a:noFill/>
-          </p:spPr>
-          <p:txBody>
-            <a:bodyPr wrap="square" rtlCol="0">
-              <a:spAutoFit/>
-            </a:bodyPr>
-            <a:lstStyle/>
-            <a:p>
-              <a:r>
-                <a:rPr lang="ko-KR" altLang="en-US" sz="1400" dirty="0"/>
-                <a:t>회의에서 다루는 모든 내용은 기밀입니다</a:t>
-              </a:r>
-              <a:r>
-                <a:rPr lang="en-US" sz="1400" dirty="0"/>
-                <a:t>. </a:t>
-              </a:r>
-              <a:r>
-                <a:rPr lang="ko-KR" altLang="en-US" sz="1400" dirty="0"/>
-                <a:t>사진 및 동영상 촬영과 녹음은 금지됩니다</a:t>
-              </a:r>
-              <a:r>
-                <a:rPr lang="en-US" sz="1400" dirty="0"/>
-                <a:t>. </a:t>
-              </a:r>
-              <a:r>
-                <a:rPr lang="ko-KR" altLang="en-US" sz="1400" dirty="0"/>
-                <a:t>질문이 있으시면 직원에게 문의해 주십시오</a:t>
-              </a:r>
-              <a:r>
-                <a:rPr lang="en-US" sz="1400" dirty="0"/>
-                <a:t>. </a:t>
-              </a:r>
-            </a:p>
-          </p:txBody>
-        </p:sp>
-        <p:pic>
-          <p:nvPicPr>
-            <p:cNvPr id="28" name="Picture 27" descr="Flag-South_Korea-Rough.png"/>
-            <p:cNvPicPr>
-              <a:picLocks noChangeAspect="1"/>
-            </p:cNvPicPr>
-            <p:nvPr/>
-          </p:nvPicPr>
-          <p:blipFill>
-            <a:blip r:embed="rId9">
-              <a:extLst>
-                <a:ext uri="{28A0092B-C50C-407E-A947-70E740481C1C}">
-                  <a14:useLocalDpi xmlns:a14="http://schemas.microsoft.com/office/drawing/2010/main" val="0"/>
-                </a:ext>
-              </a:extLst>
-            </a:blip>
-            <a:stretch>
-              <a:fillRect/>
-            </a:stretch>
-          </p:blipFill>
-          <p:spPr>
-            <a:xfrm>
-              <a:off x="313260" y="5135234"/>
-              <a:ext cx="443704" cy="396499"/>
-            </a:xfrm>
-            <a:prstGeom prst="rect">
-              <a:avLst/>
-            </a:prstGeom>
-            <a:effectLst>
-              <a:glow rad="25400">
-                <a:schemeClr val="bg1">
-                  <a:lumMod val="75000"/>
-                  <a:alpha val="68000"/>
-                </a:schemeClr>
-              </a:glow>
-            </a:effectLst>
-            <a:scene3d>
-              <a:camera prst="orthographicFront"/>
-              <a:lightRig rig="threePt" dir="t"/>
-            </a:scene3d>
-            <a:sp3d>
-              <a:bevelT/>
-              <a:bevelB/>
-            </a:sp3d>
-          </p:spPr>
-        </p:pic>
-      </p:grpSp>
-      <p:sp>
-        <p:nvSpPr>
-          <p:cNvPr id="34" name="TextBox 33"/>
-          <p:cNvSpPr txBox="1"/>
-          <p:nvPr/>
-        </p:nvSpPr>
-        <p:spPr>
-          <a:xfrm>
-            <a:off x="711200" y="1109131"/>
-            <a:ext cx="7543800" cy="523220"/>
-          </a:xfrm>
-          <a:prstGeom prst="rect">
-            <a:avLst/>
-          </a:prstGeom>
-          <a:noFill/>
-        </p:spPr>
-        <p:txBody>
-          <a:bodyPr wrap="square" rtlCol="0">
-            <a:spAutoFit/>
-          </a:bodyPr>
-          <a:lstStyle/>
-          <a:p>
-            <a:pPr algn="ctr"/>
-            <a:r>
-              <a:rPr lang="en-US" sz="1400" i="1" dirty="0"/>
-              <a:t>All meeting content is confidential:  No photos, no video, no recording. </a:t>
-            </a:r>
-            <a:br>
-              <a:rPr lang="en-US" sz="1400" i="1" dirty="0"/>
-            </a:br>
-            <a:r>
-              <a:rPr lang="en-US" sz="1400" i="1" dirty="0"/>
-              <a:t>See staff with questions.</a:t>
-            </a:r>
-            <a:r>
-              <a:rPr lang="en-US" sz="1400" dirty="0"/>
-              <a:t> </a:t>
-            </a:r>
-          </a:p>
-        </p:txBody>
-      </p:sp>
-      <p:sp>
-        <p:nvSpPr>
-          <p:cNvPr id="36" name="Text Box 11"/>
-          <p:cNvSpPr txBox="1">
-            <a:spLocks noChangeArrowheads="1"/>
-          </p:cNvSpPr>
-          <p:nvPr/>
-        </p:nvSpPr>
-        <p:spPr bwMode="auto">
-          <a:xfrm>
-            <a:off x="4936066" y="1870074"/>
-            <a:ext cx="5791200" cy="800100"/>
-          </a:xfrm>
-          <a:prstGeom prst="rect">
-            <a:avLst/>
-          </a:prstGeom>
-          <a:solidFill>
-            <a:schemeClr val="bg1">
-              <a:lumMod val="85000"/>
-            </a:schemeClr>
-          </a:solidFill>
-          <a:ln w="9525">
-            <a:solidFill>
-              <a:schemeClr val="tx1"/>
-            </a:solidFill>
-            <a:miter lim="800000"/>
-            <a:headEnd/>
-            <a:tailEnd/>
-          </a:ln>
-          <a:effectLst/>
-          <a:extLst/>
-        </p:spPr>
-        <p:txBody>
-          <a:bodyPr>
-            <a:spAutoFit/>
-          </a:bodyPr>
-          <a:lstStyle/>
-          <a:p>
-            <a:pPr>
-              <a:spcBef>
-                <a:spcPct val="50000"/>
-              </a:spcBef>
-              <a:defRPr/>
-            </a:pPr>
-            <a:r>
-              <a:rPr lang="en-US" sz="1400" b="1" dirty="0">
-                <a:solidFill>
-                  <a:srgbClr val="FF3300"/>
-                </a:solidFill>
-                <a:cs typeface="+mn-cs"/>
-              </a:rPr>
-              <a:t>This slide is for Moderators and Chairs slide deck template only </a:t>
-            </a:r>
-            <a:br>
-              <a:rPr lang="en-US" sz="1400" dirty="0">
-                <a:solidFill>
-                  <a:srgbClr val="FF3300"/>
-                </a:solidFill>
-                <a:cs typeface="+mn-cs"/>
-              </a:rPr>
-            </a:br>
-            <a:r>
-              <a:rPr lang="en-US" sz="1400" dirty="0">
-                <a:solidFill>
-                  <a:srgbClr val="FF3300"/>
-                </a:solidFill>
-                <a:cs typeface="+mn-cs"/>
-              </a:rPr>
-              <a:t>– not presenters.</a:t>
-            </a:r>
-          </a:p>
-          <a:p>
-            <a:pPr>
-              <a:lnSpc>
-                <a:spcPct val="55000"/>
-              </a:lnSpc>
-              <a:spcBef>
-                <a:spcPct val="50000"/>
-              </a:spcBef>
-              <a:defRPr/>
-            </a:pPr>
-            <a:r>
-              <a:rPr lang="en-US" sz="1600" b="1" i="1" dirty="0">
-                <a:solidFill>
-                  <a:srgbClr val="FF3300"/>
-                </a:solidFill>
-                <a:cs typeface="+mn-cs"/>
-              </a:rPr>
-              <a:t>*Presenters remove this note before using this slide </a:t>
-            </a:r>
-          </a:p>
-        </p:txBody>
-      </p:sp>
-      <p:sp>
-        <p:nvSpPr>
-          <p:cNvPr id="8" name="AutoShape 2" descr="атериалы совещаний конфиденциальны. Фотогафирование, видео- и звукозапись запрещены. &#13;&#10;В случае возникновения вопросов обращайтесь к сотрудникам. &#13;&#10;"/>
-          <p:cNvSpPr>
-            <a:spLocks noChangeAspect="1" noChangeArrowheads="1"/>
-          </p:cNvSpPr>
-          <p:nvPr/>
-        </p:nvSpPr>
-        <p:spPr bwMode="auto">
-          <a:xfrm>
-            <a:off x="338666" y="0"/>
-            <a:ext cx="304800" cy="304800"/>
-          </a:xfrm>
-          <a:prstGeom prst="rect">
-            <a:avLst/>
-          </a:prstGeom>
-          <a:noFill/>
-          <a:extLst>
-            <a:ext uri="{909E8E84-426E-40DD-AFC4-6F175D3DCCD1}">
-              <a14:hiddenFill xmlns:a14="http://schemas.microsoft.com/office/drawing/2010/main">
-                <a:solidFill>
-                  <a:srgbClr val="FFFFFF"/>
-                </a:solidFill>
-              </a14:hiddenFill>
-            </a:ext>
-          </a:extLst>
-        </p:spPr>
-        <p:txBody>
-          <a:bodyPr vert="horz" wrap="square" lIns="91440" tIns="45720" rIns="91440" bIns="45720" numCol="1" anchor="t" anchorCtr="0" compatLnSpc="1">
-            <a:prstTxWarp prst="textNoShape">
-              <a:avLst/>
-            </a:prstTxWarp>
-          </a:bodyPr>
-          <a:lstStyle/>
-          <a:p>
-            <a:endParaRPr lang="en-US"/>
-          </a:p>
-        </p:txBody>
-      </p:sp>
-      <p:pic>
-        <p:nvPicPr>
-          <p:cNvPr id="27" name="Picture 26"/>
-          <p:cNvPicPr>
-            <a:picLocks noChangeAspect="1"/>
-          </p:cNvPicPr>
-          <p:nvPr/>
-        </p:nvPicPr>
-        <p:blipFill>
-          <a:blip r:embed="rId10"/>
-          <a:stretch>
-            <a:fillRect/>
-          </a:stretch>
-        </p:blipFill>
-        <p:spPr>
-          <a:xfrm>
-            <a:off x="1015999" y="5572771"/>
-            <a:ext cx="8585200" cy="553247"/>
-          </a:xfrm>
-          <a:prstGeom prst="rect">
-            <a:avLst/>
-          </a:prstGeom>
-        </p:spPr>
-      </p:pic>
-      <p:pic>
-        <p:nvPicPr>
-          <p:cNvPr id="12" name="Picture 11"/>
-          <p:cNvPicPr>
-            <a:picLocks noChangeAspect="1"/>
-          </p:cNvPicPr>
-          <p:nvPr/>
-        </p:nvPicPr>
-        <p:blipFill>
-          <a:blip r:embed="rId11"/>
-          <a:stretch>
-            <a:fillRect/>
-          </a:stretch>
-        </p:blipFill>
-        <p:spPr>
-          <a:xfrm>
-            <a:off x="472017" y="5628217"/>
-            <a:ext cx="502437" cy="366183"/>
-          </a:xfrm>
-          <a:prstGeom prst="rect">
-            <a:avLst/>
-          </a:prstGeom>
-        </p:spPr>
-      </p:pic>
-    </p:spTree>
-    <p:extLst>
-      <p:ext uri="{BB962C8B-B14F-4D97-AF65-F5344CB8AC3E}">
-        <p14:creationId xmlns:p14="http://schemas.microsoft.com/office/powerpoint/2010/main" val="3107228254"/>
-      </p:ext>
-    </p:extLst>
-  </p:cSld>
-  <p:clrMapOvr>
-    <a:masterClrMapping/>
-  </p:clrMapOvr>
-</p:sld>
-</file>
-
-<file path=ppt/slides/slide4.xml><?xml version="1.0" encoding="utf-8"?>
 <p:sld xmlns:a="http://schemas.openxmlformats.org/drawingml/2006/main" xmlns:r="http://schemas.openxmlformats.org/officeDocument/2006/relationships" xmlns:p="http://schemas.openxmlformats.org/presentationml/2006/main">
   <p:cSld>
     <p:spTree>
@@ -16348,6 +13400,42 @@
           </a:prstGeom>
         </p:spPr>
       </p:pic>
+      <p:sp>
+        <p:nvSpPr>
+          <p:cNvPr id="6" name="Fußzeilenplatzhalter 2">
+            <a:extLst>
+              <a:ext uri="{FF2B5EF4-FFF2-40B4-BE49-F238E27FC236}">
+                <a16:creationId xmlns:a16="http://schemas.microsoft.com/office/drawing/2014/main" id="{58AF7A8A-7199-8A4A-A68A-717E0B699259}"/>
+              </a:ext>
+            </a:extLst>
+          </p:cNvPr>
+          <p:cNvSpPr>
+            <a:spLocks noGrp="1"/>
+          </p:cNvSpPr>
+          <p:nvPr>
+            <p:ph type="ftr" sz="quarter" idx="10"/>
+          </p:nvPr>
+        </p:nvSpPr>
+        <p:spPr>
+          <a:xfrm>
+            <a:off x="228600" y="6460068"/>
+            <a:ext cx="5410200" cy="323850"/>
+          </a:xfrm>
+        </p:spPr>
+        <p:txBody>
+          <a:bodyPr/>
+          <a:lstStyle/>
+          <a:p>
+            <a:pPr>
+              <a:defRPr/>
+            </a:pPr>
+            <a:r>
+              <a:rPr lang="en-US" dirty="0"/>
+              <a:t>M3AAWG 43rd General Meeting | Munich | June 2018</a:t>
+            </a:r>
+          </a:p>
+        </p:txBody>
+      </p:sp>
     </p:spTree>
     <p:extLst>
       <p:ext uri="{BB962C8B-B14F-4D97-AF65-F5344CB8AC3E}">
@@ -16361,7 +13449,7 @@
 </p:sld>
 </file>
 
-<file path=ppt/slides/slide5.xml><?xml version="1.0" encoding="utf-8"?>
+<file path=ppt/slides/slide3.xml><?xml version="1.0" encoding="utf-8"?>
 <p:sld xmlns:a="http://schemas.openxmlformats.org/drawingml/2006/main" xmlns:r="http://schemas.openxmlformats.org/officeDocument/2006/relationships" xmlns:p="http://schemas.openxmlformats.org/presentationml/2006/main">
   <p:cSld>
     <p:spTree>
@@ -16612,6 +13700,42 @@
           </a:p>
         </p:txBody>
       </p:sp>
+      <p:sp>
+        <p:nvSpPr>
+          <p:cNvPr id="10" name="Fußzeilenplatzhalter 2">
+            <a:extLst>
+              <a:ext uri="{FF2B5EF4-FFF2-40B4-BE49-F238E27FC236}">
+                <a16:creationId xmlns:a16="http://schemas.microsoft.com/office/drawing/2014/main" id="{834A7C2B-7D81-F24D-94D7-0A123FC0B25E}"/>
+              </a:ext>
+            </a:extLst>
+          </p:cNvPr>
+          <p:cNvSpPr>
+            <a:spLocks noGrp="1"/>
+          </p:cNvSpPr>
+          <p:nvPr>
+            <p:ph type="ftr" sz="quarter" idx="10"/>
+          </p:nvPr>
+        </p:nvSpPr>
+        <p:spPr>
+          <a:xfrm>
+            <a:off x="228600" y="6460068"/>
+            <a:ext cx="5410200" cy="323850"/>
+          </a:xfrm>
+        </p:spPr>
+        <p:txBody>
+          <a:bodyPr/>
+          <a:lstStyle/>
+          <a:p>
+            <a:pPr>
+              <a:defRPr/>
+            </a:pPr>
+            <a:r>
+              <a:rPr lang="en-US" dirty="0"/>
+              <a:t>M3AAWG 43rd General Meeting | Munich | June 2018</a:t>
+            </a:r>
+          </a:p>
+        </p:txBody>
+      </p:sp>
     </p:spTree>
     <p:extLst>
       <p:ext uri="{BB962C8B-B14F-4D97-AF65-F5344CB8AC3E}">
@@ -16625,7 +13749,7 @@
 </p:sld>
 </file>
 
-<file path=ppt/slides/slide6.xml><?xml version="1.0" encoding="utf-8"?>
+<file path=ppt/slides/slide4.xml><?xml version="1.0" encoding="utf-8"?>
 <p:sld xmlns:a="http://schemas.openxmlformats.org/drawingml/2006/main" xmlns:r="http://schemas.openxmlformats.org/officeDocument/2006/relationships" xmlns:p="http://schemas.openxmlformats.org/presentationml/2006/main">
   <p:cSld>
     <p:spTree>
@@ -16771,7 +13895,7 @@
               <a:defRPr/>
             </a:pPr>
             <a:r>
-              <a:rPr lang="en-US"/>
+              <a:rPr lang="en-US" dirty="0"/>
               <a:t>M3AAWG 43rd General Meeting | Munich | June 2018</a:t>
             </a:r>
           </a:p>
@@ -16790,7 +13914,7 @@
 </p:sld>
 </file>
 
-<file path=ppt/slides/slide7.xml><?xml version="1.0" encoding="utf-8"?>
+<file path=ppt/slides/slide5.xml><?xml version="1.0" encoding="utf-8"?>
 <p:sld xmlns:a="http://schemas.openxmlformats.org/drawingml/2006/main" xmlns:r="http://schemas.openxmlformats.org/officeDocument/2006/relationships" xmlns:p="http://schemas.openxmlformats.org/presentationml/2006/main">
   <p:cSld>
     <p:spTree>
@@ -16948,6 +14072,42 @@
           </a:p>
         </p:txBody>
       </p:sp>
+      <p:sp>
+        <p:nvSpPr>
+          <p:cNvPr id="4" name="Fußzeilenplatzhalter 2">
+            <a:extLst>
+              <a:ext uri="{FF2B5EF4-FFF2-40B4-BE49-F238E27FC236}">
+                <a16:creationId xmlns:a16="http://schemas.microsoft.com/office/drawing/2014/main" id="{2A265E0D-46F0-5844-BB2A-96B2E9D2A7B1}"/>
+              </a:ext>
+            </a:extLst>
+          </p:cNvPr>
+          <p:cNvSpPr>
+            <a:spLocks noGrp="1"/>
+          </p:cNvSpPr>
+          <p:nvPr>
+            <p:ph type="ftr" sz="quarter" idx="10"/>
+          </p:nvPr>
+        </p:nvSpPr>
+        <p:spPr>
+          <a:xfrm>
+            <a:off x="228600" y="6460068"/>
+            <a:ext cx="5410200" cy="323850"/>
+          </a:xfrm>
+        </p:spPr>
+        <p:txBody>
+          <a:bodyPr/>
+          <a:lstStyle/>
+          <a:p>
+            <a:pPr>
+              <a:defRPr/>
+            </a:pPr>
+            <a:r>
+              <a:rPr lang="en-US" dirty="0"/>
+              <a:t>M3AAWG 43rd General Meeting | Munich | June 2018</a:t>
+            </a:r>
+          </a:p>
+        </p:txBody>
+      </p:sp>
     </p:spTree>
     <p:extLst>
       <p:ext uri="{BB962C8B-B14F-4D97-AF65-F5344CB8AC3E}">
@@ -16961,7 +14121,7 @@
 </p:sld>
 </file>
 
-<file path=ppt/slides/slide8.xml><?xml version="1.0" encoding="utf-8"?>
+<file path=ppt/slides/slide6.xml><?xml version="1.0" encoding="utf-8"?>
 <p:sld xmlns:a="http://schemas.openxmlformats.org/drawingml/2006/main" xmlns:r="http://schemas.openxmlformats.org/officeDocument/2006/relationships" xmlns:p="http://schemas.openxmlformats.org/presentationml/2006/main">
   <p:cSld>
     <p:spTree>
@@ -17070,6 +14230,42 @@
           </a:p>
         </p:txBody>
       </p:sp>
+      <p:sp>
+        <p:nvSpPr>
+          <p:cNvPr id="4" name="Fußzeilenplatzhalter 2">
+            <a:extLst>
+              <a:ext uri="{FF2B5EF4-FFF2-40B4-BE49-F238E27FC236}">
+                <a16:creationId xmlns:a16="http://schemas.microsoft.com/office/drawing/2014/main" id="{856A2F62-A2F2-EA46-8415-44235F7A5CA4}"/>
+              </a:ext>
+            </a:extLst>
+          </p:cNvPr>
+          <p:cNvSpPr>
+            <a:spLocks noGrp="1"/>
+          </p:cNvSpPr>
+          <p:nvPr>
+            <p:ph type="ftr" sz="quarter" idx="10"/>
+          </p:nvPr>
+        </p:nvSpPr>
+        <p:spPr>
+          <a:xfrm>
+            <a:off x="228600" y="6460068"/>
+            <a:ext cx="5410200" cy="323850"/>
+          </a:xfrm>
+        </p:spPr>
+        <p:txBody>
+          <a:bodyPr/>
+          <a:lstStyle/>
+          <a:p>
+            <a:pPr>
+              <a:defRPr/>
+            </a:pPr>
+            <a:r>
+              <a:rPr lang="en-US" dirty="0"/>
+              <a:t>M3AAWG 43rd General Meeting | Munich | June 2018</a:t>
+            </a:r>
+          </a:p>
+        </p:txBody>
+      </p:sp>
     </p:spTree>
     <p:extLst>
       <p:ext uri="{BB962C8B-B14F-4D97-AF65-F5344CB8AC3E}">
@@ -17083,7 +14279,7 @@
 </p:sld>
 </file>
 
-<file path=ppt/slides/slide9.xml><?xml version="1.0" encoding="utf-8"?>
+<file path=ppt/slides/slide7.xml><?xml version="1.0" encoding="utf-8"?>
 <p:sld xmlns:a="http://schemas.openxmlformats.org/drawingml/2006/main" xmlns:r="http://schemas.openxmlformats.org/officeDocument/2006/relationships" xmlns:p="http://schemas.openxmlformats.org/presentationml/2006/main">
   <p:cSld>
     <p:spTree>
@@ -17508,6 +14704,42 @@
           </a:p>
         </p:txBody>
       </p:sp>
+      <p:sp>
+        <p:nvSpPr>
+          <p:cNvPr id="7" name="Fußzeilenplatzhalter 2">
+            <a:extLst>
+              <a:ext uri="{FF2B5EF4-FFF2-40B4-BE49-F238E27FC236}">
+                <a16:creationId xmlns:a16="http://schemas.microsoft.com/office/drawing/2014/main" id="{1D478E53-C65E-A541-884B-B72D103149CC}"/>
+              </a:ext>
+            </a:extLst>
+          </p:cNvPr>
+          <p:cNvSpPr>
+            <a:spLocks noGrp="1"/>
+          </p:cNvSpPr>
+          <p:nvPr>
+            <p:ph type="ftr" sz="quarter" idx="10"/>
+          </p:nvPr>
+        </p:nvSpPr>
+        <p:spPr>
+          <a:xfrm>
+            <a:off x="228600" y="6460068"/>
+            <a:ext cx="5410200" cy="323850"/>
+          </a:xfrm>
+        </p:spPr>
+        <p:txBody>
+          <a:bodyPr/>
+          <a:lstStyle/>
+          <a:p>
+            <a:pPr>
+              <a:defRPr/>
+            </a:pPr>
+            <a:r>
+              <a:rPr lang="en-US" dirty="0"/>
+              <a:t>M3AAWG 43rd General Meeting | Munich | June 2018</a:t>
+            </a:r>
+          </a:p>
+        </p:txBody>
+      </p:sp>
     </p:spTree>
     <p:extLst>
       <p:ext uri="{BB962C8B-B14F-4D97-AF65-F5344CB8AC3E}">
@@ -17518,6 +14750,683 @@
   <p:clrMapOvr>
     <a:masterClrMapping/>
   </p:clrMapOvr>
+</p:sld>
+</file>
+
+<file path=ppt/slides/slide8.xml><?xml version="1.0" encoding="utf-8"?>
+<p:sld xmlns:a="http://schemas.openxmlformats.org/drawingml/2006/main" xmlns:r="http://schemas.openxmlformats.org/officeDocument/2006/relationships" xmlns:p="http://schemas.openxmlformats.org/presentationml/2006/main">
+  <p:cSld>
+    <p:spTree>
+      <p:nvGrpSpPr>
+        <p:cNvPr id="1" name=""/>
+        <p:cNvGrpSpPr/>
+        <p:nvPr/>
+      </p:nvGrpSpPr>
+      <p:grpSpPr>
+        <a:xfrm>
+          <a:off x="0" y="0"/>
+          <a:ext cx="0" cy="0"/>
+          <a:chOff x="0" y="0"/>
+          <a:chExt cx="0" cy="0"/>
+        </a:xfrm>
+      </p:grpSpPr>
+      <p:sp>
+        <p:nvSpPr>
+          <p:cNvPr id="12" name="Titel 11">
+            <a:extLst>
+              <a:ext uri="{FF2B5EF4-FFF2-40B4-BE49-F238E27FC236}">
+                <a16:creationId xmlns:a16="http://schemas.microsoft.com/office/drawing/2014/main" id="{A6C54B4B-AE3E-2E4C-B9C0-DC0AF6A1C1A4}"/>
+              </a:ext>
+            </a:extLst>
+          </p:cNvPr>
+          <p:cNvSpPr>
+            <a:spLocks noGrp="1"/>
+          </p:cNvSpPr>
+          <p:nvPr>
+            <p:ph type="title"/>
+          </p:nvPr>
+        </p:nvSpPr>
+        <p:spPr/>
+        <p:txBody>
+          <a:bodyPr/>
+          <a:lstStyle/>
+          <a:p>
+            <a:r>
+              <a:rPr lang="en-GB" dirty="0"/>
+              <a:t>No chance to be a hero</a:t>
+            </a:r>
+          </a:p>
+        </p:txBody>
+      </p:sp>
+      <p:pic>
+        <p:nvPicPr>
+          <p:cNvPr id="8" name="Inhaltsplatzhalter 7">
+            <a:extLst>
+              <a:ext uri="{FF2B5EF4-FFF2-40B4-BE49-F238E27FC236}">
+                <a16:creationId xmlns:a16="http://schemas.microsoft.com/office/drawing/2014/main" id="{1E2EE3AD-4704-EB44-820B-16616D4041CE}"/>
+              </a:ext>
+            </a:extLst>
+          </p:cNvPr>
+          <p:cNvPicPr>
+            <a:picLocks noGrp="1" noChangeAspect="1"/>
+          </p:cNvPicPr>
+          <p:nvPr>
+            <p:ph idx="1"/>
+          </p:nvPr>
+        </p:nvPicPr>
+        <p:blipFill>
+          <a:blip r:embed="rId2"/>
+          <a:stretch>
+            <a:fillRect/>
+          </a:stretch>
+        </p:blipFill>
+        <p:spPr>
+          <a:xfrm>
+            <a:off x="1042296" y="2020469"/>
+            <a:ext cx="7059407" cy="3071876"/>
+          </a:xfrm>
+        </p:spPr>
+      </p:pic>
+      <p:sp>
+        <p:nvSpPr>
+          <p:cNvPr id="5" name="Fußzeilenplatzhalter 4">
+            <a:extLst>
+              <a:ext uri="{FF2B5EF4-FFF2-40B4-BE49-F238E27FC236}">
+                <a16:creationId xmlns:a16="http://schemas.microsoft.com/office/drawing/2014/main" id="{D6F43738-BC53-8B4E-8CF1-34314A96B5CE}"/>
+              </a:ext>
+            </a:extLst>
+          </p:cNvPr>
+          <p:cNvSpPr>
+            <a:spLocks noGrp="1"/>
+          </p:cNvSpPr>
+          <p:nvPr>
+            <p:ph type="ftr" sz="quarter" idx="10"/>
+          </p:nvPr>
+        </p:nvSpPr>
+        <p:spPr/>
+        <p:txBody>
+          <a:bodyPr/>
+          <a:lstStyle/>
+          <a:p>
+            <a:pPr>
+              <a:defRPr/>
+            </a:pPr>
+            <a:r>
+              <a:rPr lang="en-US"/>
+              <a:t>M3AAWG 43rd General Meeting | Munich | June 2018</a:t>
+            </a:r>
+          </a:p>
+        </p:txBody>
+      </p:sp>
+      <p:sp>
+        <p:nvSpPr>
+          <p:cNvPr id="6" name="Textfeld 5">
+            <a:extLst>
+              <a:ext uri="{FF2B5EF4-FFF2-40B4-BE49-F238E27FC236}">
+                <a16:creationId xmlns:a16="http://schemas.microsoft.com/office/drawing/2014/main" id="{009BBC69-B294-0D48-BF1D-108F494DE824}"/>
+              </a:ext>
+            </a:extLst>
+          </p:cNvPr>
+          <p:cNvSpPr txBox="1"/>
+          <p:nvPr/>
+        </p:nvSpPr>
+        <p:spPr>
+          <a:xfrm>
+            <a:off x="5541264" y="5971401"/>
+            <a:ext cx="3167855" cy="276999"/>
+          </a:xfrm>
+          <a:prstGeom prst="rect">
+            <a:avLst/>
+          </a:prstGeom>
+          <a:noFill/>
+        </p:spPr>
+        <p:txBody>
+          <a:bodyPr wrap="none" rtlCol="0">
+            <a:spAutoFit/>
+          </a:bodyPr>
+          <a:lstStyle/>
+          <a:p>
+            <a:r>
+              <a:rPr lang="en-GB" sz="1200" dirty="0">
+                <a:solidFill>
+                  <a:schemeClr val="bg1">
+                    <a:lumMod val="50000"/>
+                  </a:schemeClr>
+                </a:solidFill>
+              </a:rPr>
+              <a:t>https://</a:t>
+            </a:r>
+            <a:r>
+              <a:rPr lang="en-GB" sz="1200" dirty="0" err="1">
+                <a:solidFill>
+                  <a:schemeClr val="bg1">
+                    <a:lumMod val="50000"/>
+                  </a:schemeClr>
+                </a:solidFill>
+              </a:rPr>
+              <a:t>en.wikipedia.org</a:t>
+            </a:r>
+            <a:r>
+              <a:rPr lang="en-GB" sz="1200" dirty="0">
+                <a:solidFill>
+                  <a:schemeClr val="bg1">
+                    <a:lumMod val="50000"/>
+                  </a:schemeClr>
+                </a:solidFill>
+              </a:rPr>
+              <a:t>/wiki/</a:t>
+            </a:r>
+            <a:r>
+              <a:rPr lang="en-GB" sz="1200" dirty="0" err="1">
+                <a:solidFill>
+                  <a:schemeClr val="bg1">
+                    <a:lumMod val="50000"/>
+                  </a:schemeClr>
+                </a:solidFill>
+              </a:rPr>
+              <a:t>Justice_League</a:t>
+            </a:r>
+            <a:endParaRPr lang="en-GB" sz="1200" dirty="0">
+              <a:solidFill>
+                <a:schemeClr val="bg1">
+                  <a:lumMod val="50000"/>
+                </a:schemeClr>
+              </a:solidFill>
+            </a:endParaRPr>
+          </a:p>
+        </p:txBody>
+      </p:sp>
+      <p:sp>
+        <p:nvSpPr>
+          <p:cNvPr id="14" name="&quot;Nein&quot;-Symbol 13">
+            <a:extLst>
+              <a:ext uri="{FF2B5EF4-FFF2-40B4-BE49-F238E27FC236}">
+                <a16:creationId xmlns:a16="http://schemas.microsoft.com/office/drawing/2014/main" id="{502D7FBE-203E-9C46-A40C-84B7618823F7}"/>
+              </a:ext>
+            </a:extLst>
+          </p:cNvPr>
+          <p:cNvSpPr/>
+          <p:nvPr/>
+        </p:nvSpPr>
+        <p:spPr>
+          <a:xfrm>
+            <a:off x="1769274" y="1079882"/>
+            <a:ext cx="5445341" cy="5030018"/>
+          </a:xfrm>
+          <a:prstGeom prst="noSmoking">
+            <a:avLst/>
+          </a:prstGeom>
+          <a:solidFill>
+            <a:srgbClr val="FF0000"/>
+          </a:solidFill>
+          <a:ln>
+            <a:solidFill>
+              <a:srgbClr val="FF0000"/>
+            </a:solidFill>
+          </a:ln>
+        </p:spPr>
+        <p:style>
+          <a:lnRef idx="1">
+            <a:schemeClr val="accent1"/>
+          </a:lnRef>
+          <a:fillRef idx="3">
+            <a:schemeClr val="accent1"/>
+          </a:fillRef>
+          <a:effectRef idx="2">
+            <a:schemeClr val="accent1"/>
+          </a:effectRef>
+          <a:fontRef idx="minor">
+            <a:schemeClr val="lt1"/>
+          </a:fontRef>
+        </p:style>
+        <p:txBody>
+          <a:bodyPr rtlCol="0" anchor="ctr"/>
+          <a:lstStyle/>
+          <a:p>
+            <a:pPr algn="ctr"/>
+            <a:endParaRPr lang="en-GB">
+              <a:solidFill>
+                <a:schemeClr val="tx1"/>
+              </a:solidFill>
+            </a:endParaRPr>
+          </a:p>
+        </p:txBody>
+      </p:sp>
+    </p:spTree>
+    <p:extLst>
+      <p:ext uri="{BB962C8B-B14F-4D97-AF65-F5344CB8AC3E}">
+        <p14:creationId xmlns:p14="http://schemas.microsoft.com/office/powerpoint/2010/main" val="1095334928"/>
+      </p:ext>
+    </p:extLst>
+  </p:cSld>
+  <p:clrMapOvr>
+    <a:masterClrMapping/>
+  </p:clrMapOvr>
+  <p:timing>
+    <p:tnLst>
+      <p:par>
+        <p:cTn id="1" dur="indefinite" restart="never" nodeType="tmRoot">
+          <p:childTnLst>
+            <p:seq concurrent="1" nextAc="seek">
+              <p:cTn id="2" dur="indefinite" nodeType="mainSeq">
+                <p:childTnLst>
+                  <p:par>
+                    <p:cTn id="3" fill="hold">
+                      <p:stCondLst>
+                        <p:cond delay="indefinite"/>
+                      </p:stCondLst>
+                      <p:childTnLst>
+                        <p:par>
+                          <p:cTn id="4" fill="hold">
+                            <p:stCondLst>
+                              <p:cond delay="0"/>
+                            </p:stCondLst>
+                            <p:childTnLst>
+                              <p:par>
+                                <p:cTn id="5" presetID="1" presetClass="entr" presetSubtype="0" fill="hold" grpId="0" nodeType="clickEffect">
+                                  <p:stCondLst>
+                                    <p:cond delay="0"/>
+                                  </p:stCondLst>
+                                  <p:childTnLst>
+                                    <p:set>
+                                      <p:cBhvr>
+                                        <p:cTn id="6" dur="1" fill="hold">
+                                          <p:stCondLst>
+                                            <p:cond delay="0"/>
+                                          </p:stCondLst>
+                                        </p:cTn>
+                                        <p:tgtEl>
+                                          <p:spTgt spid="14"/>
+                                        </p:tgtEl>
+                                        <p:attrNameLst>
+                                          <p:attrName>style.visibility</p:attrName>
+                                        </p:attrNameLst>
+                                      </p:cBhvr>
+                                      <p:to>
+                                        <p:strVal val="visible"/>
+                                      </p:to>
+                                    </p:set>
+                                  </p:childTnLst>
+                                </p:cTn>
+                              </p:par>
+                              <p:par>
+                                <p:cTn id="7" presetID="1" presetClass="entr" presetSubtype="0" fill="hold" grpId="0" nodeType="withEffect">
+                                  <p:stCondLst>
+                                    <p:cond delay="0"/>
+                                  </p:stCondLst>
+                                  <p:childTnLst>
+                                    <p:set>
+                                      <p:cBhvr>
+                                        <p:cTn id="8" dur="1" fill="hold">
+                                          <p:stCondLst>
+                                            <p:cond delay="0"/>
+                                          </p:stCondLst>
+                                        </p:cTn>
+                                        <p:tgtEl>
+                                          <p:spTgt spid="12"/>
+                                        </p:tgtEl>
+                                        <p:attrNameLst>
+                                          <p:attrName>style.visibility</p:attrName>
+                                        </p:attrNameLst>
+                                      </p:cBhvr>
+                                      <p:to>
+                                        <p:strVal val="visible"/>
+                                      </p:to>
+                                    </p:set>
+                                  </p:childTnLst>
+                                </p:cTn>
+                              </p:par>
+                            </p:childTnLst>
+                          </p:cTn>
+                        </p:par>
+                      </p:childTnLst>
+                    </p:cTn>
+                  </p:par>
+                </p:childTnLst>
+              </p:cTn>
+              <p:prevCondLst>
+                <p:cond evt="onPrev" delay="0">
+                  <p:tgtEl>
+                    <p:sldTgt/>
+                  </p:tgtEl>
+                </p:cond>
+              </p:prevCondLst>
+              <p:nextCondLst>
+                <p:cond evt="onNext" delay="0">
+                  <p:tgtEl>
+                    <p:sldTgt/>
+                  </p:tgtEl>
+                </p:cond>
+              </p:nextCondLst>
+            </p:seq>
+          </p:childTnLst>
+        </p:cTn>
+      </p:par>
+    </p:tnLst>
+    <p:bldLst>
+      <p:bldP spid="12" grpId="0"/>
+      <p:bldP spid="14" grpId="0" animBg="1"/>
+    </p:bldLst>
+  </p:timing>
+</p:sld>
+</file>
+
+<file path=ppt/slides/slide9.xml><?xml version="1.0" encoding="utf-8"?>
+<p:sld xmlns:a="http://schemas.openxmlformats.org/drawingml/2006/main" xmlns:r="http://schemas.openxmlformats.org/officeDocument/2006/relationships" xmlns:p="http://schemas.openxmlformats.org/presentationml/2006/main">
+  <p:cSld>
+    <p:spTree>
+      <p:nvGrpSpPr>
+        <p:cNvPr id="1" name=""/>
+        <p:cNvGrpSpPr/>
+        <p:nvPr/>
+      </p:nvGrpSpPr>
+      <p:grpSpPr>
+        <a:xfrm>
+          <a:off x="0" y="0"/>
+          <a:ext cx="0" cy="0"/>
+          <a:chOff x="0" y="0"/>
+          <a:chExt cx="0" cy="0"/>
+        </a:xfrm>
+      </p:grpSpPr>
+      <p:sp>
+        <p:nvSpPr>
+          <p:cNvPr id="12" name="Titel 11">
+            <a:extLst>
+              <a:ext uri="{FF2B5EF4-FFF2-40B4-BE49-F238E27FC236}">
+                <a16:creationId xmlns:a16="http://schemas.microsoft.com/office/drawing/2014/main" id="{A6C54B4B-AE3E-2E4C-B9C0-DC0AF6A1C1A4}"/>
+              </a:ext>
+            </a:extLst>
+          </p:cNvPr>
+          <p:cNvSpPr>
+            <a:spLocks noGrp="1"/>
+          </p:cNvSpPr>
+          <p:nvPr>
+            <p:ph type="title"/>
+          </p:nvPr>
+        </p:nvSpPr>
+        <p:spPr/>
+        <p:txBody>
+          <a:bodyPr/>
+          <a:lstStyle/>
+          <a:p>
+            <a:r>
+              <a:rPr lang="en-GB" dirty="0"/>
+              <a:t>It’s all about prevention and dirt work</a:t>
+            </a:r>
+          </a:p>
+        </p:txBody>
+      </p:sp>
+      <p:pic>
+        <p:nvPicPr>
+          <p:cNvPr id="8" name="Inhaltsplatzhalter 7">
+            <a:extLst>
+              <a:ext uri="{FF2B5EF4-FFF2-40B4-BE49-F238E27FC236}">
+                <a16:creationId xmlns:a16="http://schemas.microsoft.com/office/drawing/2014/main" id="{1E2EE3AD-4704-EB44-820B-16616D4041CE}"/>
+              </a:ext>
+            </a:extLst>
+          </p:cNvPr>
+          <p:cNvPicPr>
+            <a:picLocks noGrp="1" noChangeAspect="1"/>
+          </p:cNvPicPr>
+          <p:nvPr>
+            <p:ph idx="1"/>
+          </p:nvPr>
+        </p:nvPicPr>
+        <p:blipFill>
+          <a:blip r:embed="rId2"/>
+          <a:stretch>
+            <a:fillRect/>
+          </a:stretch>
+        </p:blipFill>
+        <p:spPr>
+          <a:xfrm>
+            <a:off x="1923975" y="1740384"/>
+            <a:ext cx="5296049" cy="3516908"/>
+          </a:xfrm>
+        </p:spPr>
+      </p:pic>
+      <p:sp>
+        <p:nvSpPr>
+          <p:cNvPr id="5" name="Fußzeilenplatzhalter 4">
+            <a:extLst>
+              <a:ext uri="{FF2B5EF4-FFF2-40B4-BE49-F238E27FC236}">
+                <a16:creationId xmlns:a16="http://schemas.microsoft.com/office/drawing/2014/main" id="{D6F43738-BC53-8B4E-8CF1-34314A96B5CE}"/>
+              </a:ext>
+            </a:extLst>
+          </p:cNvPr>
+          <p:cNvSpPr>
+            <a:spLocks noGrp="1"/>
+          </p:cNvSpPr>
+          <p:nvPr>
+            <p:ph type="ftr" sz="quarter" idx="10"/>
+          </p:nvPr>
+        </p:nvSpPr>
+        <p:spPr/>
+        <p:txBody>
+          <a:bodyPr/>
+          <a:lstStyle/>
+          <a:p>
+            <a:pPr>
+              <a:defRPr/>
+            </a:pPr>
+            <a:r>
+              <a:rPr lang="en-US"/>
+              <a:t>M3AAWG 43rd General Meeting | Munich | June 2018</a:t>
+            </a:r>
+          </a:p>
+        </p:txBody>
+      </p:sp>
+      <p:sp>
+        <p:nvSpPr>
+          <p:cNvPr id="7" name="Textfeld 6">
+            <a:extLst>
+              <a:ext uri="{FF2B5EF4-FFF2-40B4-BE49-F238E27FC236}">
+                <a16:creationId xmlns:a16="http://schemas.microsoft.com/office/drawing/2014/main" id="{8D7B23D7-05FA-2E44-A269-78B1CA754FEC}"/>
+              </a:ext>
+            </a:extLst>
+          </p:cNvPr>
+          <p:cNvSpPr txBox="1"/>
+          <p:nvPr/>
+        </p:nvSpPr>
+        <p:spPr>
+          <a:xfrm>
+            <a:off x="8065008" y="5998833"/>
+            <a:ext cx="712054" cy="276999"/>
+          </a:xfrm>
+          <a:prstGeom prst="rect">
+            <a:avLst/>
+          </a:prstGeom>
+          <a:noFill/>
+        </p:spPr>
+        <p:txBody>
+          <a:bodyPr wrap="none" rtlCol="0">
+            <a:spAutoFit/>
+          </a:bodyPr>
+          <a:lstStyle/>
+          <a:p>
+            <a:r>
+              <a:rPr lang="en-GB" sz="1200" dirty="0" err="1">
+                <a:solidFill>
+                  <a:schemeClr val="bg1">
+                    <a:lumMod val="50000"/>
+                  </a:schemeClr>
+                </a:solidFill>
+              </a:rPr>
+              <a:t>pixabay</a:t>
+            </a:r>
+            <a:endParaRPr lang="en-GB" sz="1200" dirty="0">
+              <a:solidFill>
+                <a:schemeClr val="bg1">
+                  <a:lumMod val="50000"/>
+                </a:schemeClr>
+              </a:solidFill>
+            </a:endParaRPr>
+          </a:p>
+        </p:txBody>
+      </p:sp>
+      <p:sp>
+        <p:nvSpPr>
+          <p:cNvPr id="2" name="Textfeld 1">
+            <a:extLst>
+              <a:ext uri="{FF2B5EF4-FFF2-40B4-BE49-F238E27FC236}">
+                <a16:creationId xmlns:a16="http://schemas.microsoft.com/office/drawing/2014/main" id="{ABF5FD7A-EB3A-2A4E-A06D-5E7B89AF66BB}"/>
+              </a:ext>
+            </a:extLst>
+          </p:cNvPr>
+          <p:cNvSpPr txBox="1"/>
+          <p:nvPr/>
+        </p:nvSpPr>
+        <p:spPr>
+          <a:xfrm rot="20314243">
+            <a:off x="5138781" y="4105619"/>
+            <a:ext cx="2990204" cy="461665"/>
+          </a:xfrm>
+          <a:prstGeom prst="rect">
+            <a:avLst/>
+          </a:prstGeom>
+          <a:solidFill>
+            <a:schemeClr val="bg1"/>
+          </a:solidFill>
+          <a:ln w="57150">
+            <a:solidFill>
+              <a:srgbClr val="FF0000"/>
+            </a:solidFill>
+          </a:ln>
+        </p:spPr>
+        <p:txBody>
+          <a:bodyPr wrap="square" rtlCol="0">
+            <a:spAutoFit/>
+          </a:bodyPr>
+          <a:lstStyle/>
+          <a:p>
+            <a:pPr algn="ctr"/>
+            <a:r>
+              <a:rPr lang="en-GB" dirty="0">
+                <a:solidFill>
+                  <a:srgbClr val="FF3300"/>
+                </a:solidFill>
+              </a:rPr>
+              <a:t>inspect and adapt</a:t>
+            </a:r>
+          </a:p>
+        </p:txBody>
+      </p:sp>
+    </p:spTree>
+    <p:extLst>
+      <p:ext uri="{BB962C8B-B14F-4D97-AF65-F5344CB8AC3E}">
+        <p14:creationId xmlns:p14="http://schemas.microsoft.com/office/powerpoint/2010/main" val="143118688"/>
+      </p:ext>
+    </p:extLst>
+  </p:cSld>
+  <p:clrMapOvr>
+    <a:masterClrMapping/>
+  </p:clrMapOvr>
+  <p:timing>
+    <p:tnLst>
+      <p:par>
+        <p:cTn id="1" dur="indefinite" restart="never" nodeType="tmRoot">
+          <p:childTnLst>
+            <p:seq concurrent="1" nextAc="seek">
+              <p:cTn id="2" dur="indefinite" nodeType="mainSeq">
+                <p:childTnLst>
+                  <p:par>
+                    <p:cTn id="3" fill="hold">
+                      <p:stCondLst>
+                        <p:cond delay="indefinite"/>
+                      </p:stCondLst>
+                      <p:childTnLst>
+                        <p:par>
+                          <p:cTn id="4" fill="hold">
+                            <p:stCondLst>
+                              <p:cond delay="0"/>
+                            </p:stCondLst>
+                            <p:childTnLst>
+                              <p:par>
+                                <p:cTn id="5" presetID="1" presetClass="entr" presetSubtype="0" fill="hold" grpId="0" nodeType="clickEffect">
+                                  <p:stCondLst>
+                                    <p:cond delay="0"/>
+                                  </p:stCondLst>
+                                  <p:childTnLst>
+                                    <p:set>
+                                      <p:cBhvr>
+                                        <p:cTn id="6" dur="1" fill="hold">
+                                          <p:stCondLst>
+                                            <p:cond delay="0"/>
+                                          </p:stCondLst>
+                                        </p:cTn>
+                                        <p:tgtEl>
+                                          <p:spTgt spid="2"/>
+                                        </p:tgtEl>
+                                        <p:attrNameLst>
+                                          <p:attrName>style.visibility</p:attrName>
+                                        </p:attrNameLst>
+                                      </p:cBhvr>
+                                      <p:to>
+                                        <p:strVal val="visible"/>
+                                      </p:to>
+                                    </p:set>
+                                  </p:childTnLst>
+                                </p:cTn>
+                              </p:par>
+                              <p:par>
+                                <p:cTn id="7" presetID="1" presetClass="entr" presetSubtype="0" fill="hold" grpId="0" nodeType="withEffect">
+                                  <p:stCondLst>
+                                    <p:cond delay="0"/>
+                                  </p:stCondLst>
+                                  <p:childTnLst>
+                                    <p:set>
+                                      <p:cBhvr>
+                                        <p:cTn id="8" dur="1" fill="hold">
+                                          <p:stCondLst>
+                                            <p:cond delay="0"/>
+                                          </p:stCondLst>
+                                        </p:cTn>
+                                        <p:tgtEl>
+                                          <p:spTgt spid="12"/>
+                                        </p:tgtEl>
+                                        <p:attrNameLst>
+                                          <p:attrName>style.visibility</p:attrName>
+                                        </p:attrNameLst>
+                                      </p:cBhvr>
+                                      <p:to>
+                                        <p:strVal val="visible"/>
+                                      </p:to>
+                                    </p:set>
+                                  </p:childTnLst>
+                                </p:cTn>
+                              </p:par>
+                            </p:childTnLst>
+                          </p:cTn>
+                        </p:par>
+                      </p:childTnLst>
+                    </p:cTn>
+                  </p:par>
+                </p:childTnLst>
+              </p:cTn>
+              <p:prevCondLst>
+                <p:cond evt="onPrev" delay="0">
+                  <p:tgtEl>
+                    <p:sldTgt/>
+                  </p:tgtEl>
+                </p:cond>
+              </p:prevCondLst>
+              <p:nextCondLst>
+                <p:cond evt="onNext" delay="0">
+                  <p:tgtEl>
+                    <p:sldTgt/>
+                  </p:tgtEl>
+                </p:cond>
+              </p:nextCondLst>
+            </p:seq>
+          </p:childTnLst>
+        </p:cTn>
+      </p:par>
+    </p:tnLst>
+    <p:bldLst>
+      <p:bldP spid="12" grpId="0"/>
+      <p:bldP spid="2" grpId="0" animBg="1"/>
+    </p:bldLst>
+  </p:timing>
 </p:sld>
 </file>
 

</xml_diff>

<commit_message>
corrected spelling error on slide Input
</commit_message>
<xml_diff>
--- a/Process_M3AAWG/2018-06-M3AAWG43-CalendarSpam.pptx
+++ b/Process_M3AAWG/2018-06-M3AAWG43-CalendarSpam.pptx
@@ -12666,7 +12666,15 @@
           <a:p>
             <a:r>
               <a:rPr lang="en-GB" dirty="0"/>
-              <a:t>What is the common practice invite in your system for the email containing an invite after inserting the event into the users calendar?</a:t>
+              <a:t>What is the </a:t>
+            </a:r>
+            <a:r>
+              <a:rPr lang="en-GB"/>
+              <a:t>common practice in </a:t>
+            </a:r>
+            <a:r>
+              <a:rPr lang="en-GB" dirty="0"/>
+              <a:t>your system for the email containing an invite after inserting the event into the users calendar?</a:t>
             </a:r>
           </a:p>
           <a:p>

</xml_diff>

<commit_message>
small correction on statistics slide
</commit_message>
<xml_diff>
--- a/Process_M3AAWG/2018-06-M3AAWG43-CalendarSpam.pptx
+++ b/Process_M3AAWG/2018-06-M3AAWG43-CalendarSpam.pptx
@@ -3105,7 +3105,7 @@
               <a:pPr>
                 <a:defRPr/>
               </a:pPr>
-              <a:t>5/30/18</a:t>
+              <a:t>6/5/18</a:t>
             </a:fld>
             <a:endParaRPr lang="en-US"/>
           </a:p>
@@ -3248,17 +3248,17 @@
           <a:effectLst/>
           <a:extLst>
             <a:ext uri="{FAA26D3D-D897-4be2-8F04-BA451C77F1D7}">
-              <ma14:placeholderFlag xmlns="" xmlns:ma14="http://schemas.microsoft.com/office/mac/drawingml/2011/main" val="1"/>
+              <ma14:placeholderFlag xmlns:ma14="http://schemas.microsoft.com/office/mac/drawingml/2011/main" xmlns="" val="1"/>
             </a:ext>
             <a:ext uri="{909E8E84-426E-40dd-AFC4-6F175D3DCCD1}">
-              <a14:hiddenFill xmlns="" xmlns:a14="http://schemas.microsoft.com/office/drawing/2010/main">
+              <a14:hiddenFill xmlns:a14="http://schemas.microsoft.com/office/drawing/2010/main" xmlns="">
                 <a:solidFill>
                   <a:schemeClr val="accent1"/>
                 </a:solidFill>
               </a14:hiddenFill>
             </a:ext>
             <a:ext uri="{91240B29-F687-4f45-9708-019B960494DF}">
-              <a14:hiddenLine xmlns="" xmlns:a14="http://schemas.microsoft.com/office/drawing/2010/main" w="9525">
+              <a14:hiddenLine xmlns:a14="http://schemas.microsoft.com/office/drawing/2010/main" xmlns="" w="9525">
                 <a:solidFill>
                   <a:schemeClr val="tx1"/>
                 </a:solidFill>
@@ -3268,7 +3268,7 @@
               </a14:hiddenLine>
             </a:ext>
             <a:ext uri="{AF507438-7753-43e0-B8FC-AC1667EBCBE1}">
-              <a14:hiddenEffects xmlns="" xmlns:a14="http://schemas.microsoft.com/office/drawing/2010/main">
+              <a14:hiddenEffects xmlns:a14="http://schemas.microsoft.com/office/drawing/2010/main" xmlns="">
                 <a:effectLst>
                   <a:outerShdw blurRad="63500" dist="38099" dir="2700000" algn="ctr" rotWithShape="0">
                     <a:schemeClr val="bg2">
@@ -3326,17 +3326,17 @@
           <a:effectLst/>
           <a:extLst>
             <a:ext uri="{FAA26D3D-D897-4be2-8F04-BA451C77F1D7}">
-              <ma14:placeholderFlag xmlns="" xmlns:ma14="http://schemas.microsoft.com/office/mac/drawingml/2011/main" val="1"/>
+              <ma14:placeholderFlag xmlns:ma14="http://schemas.microsoft.com/office/mac/drawingml/2011/main" xmlns="" val="1"/>
             </a:ext>
             <a:ext uri="{909E8E84-426E-40dd-AFC4-6F175D3DCCD1}">
-              <a14:hiddenFill xmlns="" xmlns:a14="http://schemas.microsoft.com/office/drawing/2010/main">
+              <a14:hiddenFill xmlns:a14="http://schemas.microsoft.com/office/drawing/2010/main" xmlns="">
                 <a:solidFill>
                   <a:schemeClr val="accent1"/>
                 </a:solidFill>
               </a14:hiddenFill>
             </a:ext>
             <a:ext uri="{91240B29-F687-4f45-9708-019B960494DF}">
-              <a14:hiddenLine xmlns="" xmlns:a14="http://schemas.microsoft.com/office/drawing/2010/main" w="9525">
+              <a14:hiddenLine xmlns:a14="http://schemas.microsoft.com/office/drawing/2010/main" xmlns="" w="9525">
                 <a:solidFill>
                   <a:schemeClr val="tx1"/>
                 </a:solidFill>
@@ -3346,7 +3346,7 @@
               </a14:hiddenLine>
             </a:ext>
             <a:ext uri="{AF507438-7753-43e0-B8FC-AC1667EBCBE1}">
-              <a14:hiddenEffects xmlns="" xmlns:a14="http://schemas.microsoft.com/office/drawing/2010/main">
+              <a14:hiddenEffects xmlns:a14="http://schemas.microsoft.com/office/drawing/2010/main" xmlns="">
                 <a:effectLst>
                   <a:outerShdw blurRad="63500" dist="38099" dir="2700000" algn="ctr" rotWithShape="0">
                     <a:schemeClr val="bg2">
@@ -3409,7 +3409,7 @@
           <a:effectLst/>
           <a:extLst>
             <a:ext uri="{AF507438-7753-43e0-B8FC-AC1667EBCBE1}">
-              <a14:hiddenEffects xmlns="" xmlns:a14="http://schemas.microsoft.com/office/drawing/2010/main">
+              <a14:hiddenEffects xmlns:a14="http://schemas.microsoft.com/office/drawing/2010/main" xmlns="">
                 <a:effectLst>
                   <a:outerShdw blurRad="63500" dist="38099" dir="2700000" algn="ctr" rotWithShape="0">
                     <a:srgbClr val="000000">
@@ -3420,7 +3420,7 @@
               </a14:hiddenEffects>
             </a:ext>
             <a:ext uri="{53640926-AAD7-44d8-BBD7-CCE9431645EC}">
-              <a14:shadowObscured xmlns="" xmlns:a14="http://schemas.microsoft.com/office/drawing/2010/main" val="1"/>
+              <a14:shadowObscured xmlns:a14="http://schemas.microsoft.com/office/drawing/2010/main" xmlns="" val="1"/>
             </a:ext>
           </a:extLst>
         </p:spPr>
@@ -3450,17 +3450,17 @@
           <a:effectLst/>
           <a:extLst>
             <a:ext uri="{FAA26D3D-D897-4be2-8F04-BA451C77F1D7}">
-              <ma14:placeholderFlag xmlns="" xmlns:ma14="http://schemas.microsoft.com/office/mac/drawingml/2011/main" val="1"/>
+              <ma14:placeholderFlag xmlns:ma14="http://schemas.microsoft.com/office/mac/drawingml/2011/main" xmlns="" val="1"/>
             </a:ext>
             <a:ext uri="{909E8E84-426E-40dd-AFC4-6F175D3DCCD1}">
-              <a14:hiddenFill xmlns="" xmlns:a14="http://schemas.microsoft.com/office/drawing/2010/main">
+              <a14:hiddenFill xmlns:a14="http://schemas.microsoft.com/office/drawing/2010/main" xmlns="">
                 <a:solidFill>
                   <a:schemeClr val="accent1"/>
                 </a:solidFill>
               </a14:hiddenFill>
             </a:ext>
             <a:ext uri="{91240B29-F687-4f45-9708-019B960494DF}">
-              <a14:hiddenLine xmlns="" xmlns:a14="http://schemas.microsoft.com/office/drawing/2010/main" w="9525">
+              <a14:hiddenLine xmlns:a14="http://schemas.microsoft.com/office/drawing/2010/main" xmlns="" w="9525">
                 <a:solidFill>
                   <a:schemeClr val="tx1"/>
                 </a:solidFill>
@@ -3470,7 +3470,7 @@
               </a14:hiddenLine>
             </a:ext>
             <a:ext uri="{AF507438-7753-43e0-B8FC-AC1667EBCBE1}">
-              <a14:hiddenEffects xmlns="" xmlns:a14="http://schemas.microsoft.com/office/drawing/2010/main">
+              <a14:hiddenEffects xmlns:a14="http://schemas.microsoft.com/office/drawing/2010/main" xmlns="">
                 <a:effectLst>
                   <a:outerShdw blurRad="63500" dist="38099" dir="2700000" algn="ctr" rotWithShape="0">
                     <a:schemeClr val="bg2">
@@ -3551,17 +3551,17 @@
           <a:effectLst/>
           <a:extLst>
             <a:ext uri="{FAA26D3D-D897-4be2-8F04-BA451C77F1D7}">
-              <ma14:placeholderFlag xmlns="" xmlns:ma14="http://schemas.microsoft.com/office/mac/drawingml/2011/main" val="1"/>
+              <ma14:placeholderFlag xmlns:ma14="http://schemas.microsoft.com/office/mac/drawingml/2011/main" xmlns="" val="1"/>
             </a:ext>
             <a:ext uri="{909E8E84-426E-40dd-AFC4-6F175D3DCCD1}">
-              <a14:hiddenFill xmlns="" xmlns:a14="http://schemas.microsoft.com/office/drawing/2010/main">
+              <a14:hiddenFill xmlns:a14="http://schemas.microsoft.com/office/drawing/2010/main" xmlns="">
                 <a:solidFill>
                   <a:schemeClr val="accent1"/>
                 </a:solidFill>
               </a14:hiddenFill>
             </a:ext>
             <a:ext uri="{91240B29-F687-4f45-9708-019B960494DF}">
-              <a14:hiddenLine xmlns="" xmlns:a14="http://schemas.microsoft.com/office/drawing/2010/main" w="9525">
+              <a14:hiddenLine xmlns:a14="http://schemas.microsoft.com/office/drawing/2010/main" xmlns="" w="9525">
                 <a:solidFill>
                   <a:schemeClr val="tx1"/>
                 </a:solidFill>
@@ -3571,7 +3571,7 @@
               </a14:hiddenLine>
             </a:ext>
             <a:ext uri="{AF507438-7753-43e0-B8FC-AC1667EBCBE1}">
-              <a14:hiddenEffects xmlns="" xmlns:a14="http://schemas.microsoft.com/office/drawing/2010/main">
+              <a14:hiddenEffects xmlns:a14="http://schemas.microsoft.com/office/drawing/2010/main" xmlns="">
                 <a:effectLst>
                   <a:outerShdw blurRad="63500" dist="38099" dir="2700000" algn="ctr" rotWithShape="0">
                     <a:schemeClr val="bg2">
@@ -3629,17 +3629,17 @@
           <a:effectLst/>
           <a:extLst>
             <a:ext uri="{FAA26D3D-D897-4be2-8F04-BA451C77F1D7}">
-              <ma14:placeholderFlag xmlns="" xmlns:ma14="http://schemas.microsoft.com/office/mac/drawingml/2011/main" val="1"/>
+              <ma14:placeholderFlag xmlns:ma14="http://schemas.microsoft.com/office/mac/drawingml/2011/main" xmlns="" val="1"/>
             </a:ext>
             <a:ext uri="{909E8E84-426E-40dd-AFC4-6F175D3DCCD1}">
-              <a14:hiddenFill xmlns="" xmlns:a14="http://schemas.microsoft.com/office/drawing/2010/main">
+              <a14:hiddenFill xmlns:a14="http://schemas.microsoft.com/office/drawing/2010/main" xmlns="">
                 <a:solidFill>
                   <a:schemeClr val="accent1"/>
                 </a:solidFill>
               </a14:hiddenFill>
             </a:ext>
             <a:ext uri="{91240B29-F687-4f45-9708-019B960494DF}">
-              <a14:hiddenLine xmlns="" xmlns:a14="http://schemas.microsoft.com/office/drawing/2010/main" w="9525">
+              <a14:hiddenLine xmlns:a14="http://schemas.microsoft.com/office/drawing/2010/main" xmlns="" w="9525">
                 <a:solidFill>
                   <a:schemeClr val="tx1"/>
                 </a:solidFill>
@@ -3649,7 +3649,7 @@
               </a14:hiddenLine>
             </a:ext>
             <a:ext uri="{AF507438-7753-43e0-B8FC-AC1667EBCBE1}">
-              <a14:hiddenEffects xmlns="" xmlns:a14="http://schemas.microsoft.com/office/drawing/2010/main">
+              <a14:hiddenEffects xmlns:a14="http://schemas.microsoft.com/office/drawing/2010/main" xmlns="">
                 <a:effectLst>
                   <a:outerShdw blurRad="63500" dist="38099" dir="2700000" algn="ctr" rotWithShape="0">
                     <a:schemeClr val="bg2">
@@ -9448,14 +9448,14 @@
           </a:ln>
           <a:extLst>
             <a:ext uri="{909E8E84-426E-40dd-AFC4-6F175D3DCCD1}">
-              <a14:hiddenFill xmlns="" xmlns:a14="http://schemas.microsoft.com/office/drawing/2010/main">
+              <a14:hiddenFill xmlns:a14="http://schemas.microsoft.com/office/drawing/2010/main" xmlns="">
                 <a:solidFill>
                   <a:srgbClr val="FFFFFF"/>
                 </a:solidFill>
               </a14:hiddenFill>
             </a:ext>
             <a:ext uri="{91240B29-F687-4f45-9708-019B960494DF}">
-              <a14:hiddenLine xmlns="" xmlns:a14="http://schemas.microsoft.com/office/drawing/2010/main" w="9525">
+              <a14:hiddenLine xmlns:a14="http://schemas.microsoft.com/office/drawing/2010/main" xmlns="" w="9525">
                 <a:solidFill>
                   <a:srgbClr val="000000"/>
                 </a:solidFill>
@@ -9490,14 +9490,14 @@
           <a:effectLst/>
           <a:extLst>
             <a:ext uri="{909E8E84-426E-40dd-AFC4-6F175D3DCCD1}">
-              <a14:hiddenFill xmlns="" xmlns:a14="http://schemas.microsoft.com/office/drawing/2010/main">
+              <a14:hiddenFill xmlns:a14="http://schemas.microsoft.com/office/drawing/2010/main" xmlns="">
                 <a:solidFill>
                   <a:schemeClr val="accent1"/>
                 </a:solidFill>
               </a14:hiddenFill>
             </a:ext>
             <a:ext uri="{91240B29-F687-4f45-9708-019B960494DF}">
-              <a14:hiddenLine xmlns="" xmlns:a14="http://schemas.microsoft.com/office/drawing/2010/main" w="9525">
+              <a14:hiddenLine xmlns:a14="http://schemas.microsoft.com/office/drawing/2010/main" xmlns="" w="9525">
                 <a:solidFill>
                   <a:schemeClr val="tx1"/>
                 </a:solidFill>
@@ -9507,7 +9507,7 @@
               </a14:hiddenLine>
             </a:ext>
             <a:ext uri="{AF507438-7753-43e0-B8FC-AC1667EBCBE1}">
-              <a14:hiddenEffects xmlns="" xmlns:a14="http://schemas.microsoft.com/office/drawing/2010/main">
+              <a14:hiddenEffects xmlns:a14="http://schemas.microsoft.com/office/drawing/2010/main" xmlns="">
                 <a:effectLst>
                   <a:outerShdw blurRad="63500" dist="38099" dir="2700000" algn="ctr" rotWithShape="0">
                     <a:schemeClr val="bg2">
@@ -9557,17 +9557,17 @@
           <a:effectLst/>
           <a:extLst>
             <a:ext uri="{FAA26D3D-D897-4be2-8F04-BA451C77F1D7}">
-              <ma14:placeholderFlag xmlns="" xmlns:ma14="http://schemas.microsoft.com/office/mac/drawingml/2011/main" val="1"/>
+              <ma14:placeholderFlag xmlns:ma14="http://schemas.microsoft.com/office/mac/drawingml/2011/main" xmlns="" val="1"/>
             </a:ext>
             <a:ext uri="{909E8E84-426E-40dd-AFC4-6F175D3DCCD1}">
-              <a14:hiddenFill xmlns="" xmlns:a14="http://schemas.microsoft.com/office/drawing/2010/main">
+              <a14:hiddenFill xmlns:a14="http://schemas.microsoft.com/office/drawing/2010/main" xmlns="">
                 <a:solidFill>
                   <a:schemeClr val="accent1"/>
                 </a:solidFill>
               </a14:hiddenFill>
             </a:ext>
             <a:ext uri="{91240B29-F687-4f45-9708-019B960494DF}">
-              <a14:hiddenLine xmlns="" xmlns:a14="http://schemas.microsoft.com/office/drawing/2010/main" w="9525">
+              <a14:hiddenLine xmlns:a14="http://schemas.microsoft.com/office/drawing/2010/main" xmlns="" w="9525">
                 <a:solidFill>
                   <a:schemeClr val="tx1"/>
                 </a:solidFill>
@@ -9577,7 +9577,7 @@
               </a14:hiddenLine>
             </a:ext>
             <a:ext uri="{AF507438-7753-43e0-B8FC-AC1667EBCBE1}">
-              <a14:hiddenEffects xmlns="" xmlns:a14="http://schemas.microsoft.com/office/drawing/2010/main">
+              <a14:hiddenEffects xmlns:a14="http://schemas.microsoft.com/office/drawing/2010/main" xmlns="">
                 <a:effectLst>
                   <a:outerShdw blurRad="63500" dist="38099" dir="2700000" algn="ctr" rotWithShape="0">
                     <a:schemeClr val="bg2">
@@ -9630,17 +9630,17 @@
           <a:effectLst/>
           <a:extLst>
             <a:ext uri="{FAA26D3D-D897-4be2-8F04-BA451C77F1D7}">
-              <ma14:placeholderFlag xmlns="" xmlns:ma14="http://schemas.microsoft.com/office/mac/drawingml/2011/main" val="1"/>
+              <ma14:placeholderFlag xmlns:ma14="http://schemas.microsoft.com/office/mac/drawingml/2011/main" xmlns="" val="1"/>
             </a:ext>
             <a:ext uri="{909E8E84-426E-40dd-AFC4-6F175D3DCCD1}">
-              <a14:hiddenFill xmlns="" xmlns:a14="http://schemas.microsoft.com/office/drawing/2010/main">
+              <a14:hiddenFill xmlns:a14="http://schemas.microsoft.com/office/drawing/2010/main" xmlns="">
                 <a:solidFill>
                   <a:schemeClr val="accent1"/>
                 </a:solidFill>
               </a14:hiddenFill>
             </a:ext>
             <a:ext uri="{91240B29-F687-4f45-9708-019B960494DF}">
-              <a14:hiddenLine xmlns="" xmlns:a14="http://schemas.microsoft.com/office/drawing/2010/main" w="9525">
+              <a14:hiddenLine xmlns:a14="http://schemas.microsoft.com/office/drawing/2010/main" xmlns="" w="9525">
                 <a:solidFill>
                   <a:schemeClr val="tx1"/>
                 </a:solidFill>
@@ -9650,7 +9650,7 @@
               </a14:hiddenLine>
             </a:ext>
             <a:ext uri="{AF507438-7753-43e0-B8FC-AC1667EBCBE1}">
-              <a14:hiddenEffects xmlns="" xmlns:a14="http://schemas.microsoft.com/office/drawing/2010/main">
+              <a14:hiddenEffects xmlns:a14="http://schemas.microsoft.com/office/drawing/2010/main" xmlns="">
                 <a:effectLst>
                   <a:outerShdw blurRad="63500" dist="38099" dir="2700000" algn="ctr" rotWithShape="0">
                     <a:schemeClr val="bg2">
@@ -10199,14 +10199,14 @@
           </a:ln>
           <a:extLst>
             <a:ext uri="{909E8E84-426E-40dd-AFC4-6F175D3DCCD1}">
-              <a14:hiddenFill xmlns="" xmlns:a14="http://schemas.microsoft.com/office/drawing/2010/main">
+              <a14:hiddenFill xmlns:a14="http://schemas.microsoft.com/office/drawing/2010/main" xmlns="">
                 <a:solidFill>
                   <a:srgbClr val="FFFFFF"/>
                 </a:solidFill>
               </a14:hiddenFill>
             </a:ext>
             <a:ext uri="{91240B29-F687-4f45-9708-019B960494DF}">
-              <a14:hiddenLine xmlns="" xmlns:a14="http://schemas.microsoft.com/office/drawing/2010/main" w="9525">
+              <a14:hiddenLine xmlns:a14="http://schemas.microsoft.com/office/drawing/2010/main" xmlns="" w="9525">
                 <a:solidFill>
                   <a:srgbClr val="000000"/>
                 </a:solidFill>
@@ -10243,17 +10243,17 @@
           <a:effectLst/>
           <a:extLst>
             <a:ext uri="{FAA26D3D-D897-4be2-8F04-BA451C77F1D7}">
-              <ma14:placeholderFlag xmlns="" xmlns:ma14="http://schemas.microsoft.com/office/mac/drawingml/2011/main" val="1"/>
+              <ma14:placeholderFlag xmlns:ma14="http://schemas.microsoft.com/office/mac/drawingml/2011/main" xmlns="" val="1"/>
             </a:ext>
             <a:ext uri="{909E8E84-426E-40dd-AFC4-6F175D3DCCD1}">
-              <a14:hiddenFill xmlns="" xmlns:a14="http://schemas.microsoft.com/office/drawing/2010/main">
+              <a14:hiddenFill xmlns:a14="http://schemas.microsoft.com/office/drawing/2010/main" xmlns="">
                 <a:solidFill>
                   <a:schemeClr val="accent1"/>
                 </a:solidFill>
               </a14:hiddenFill>
             </a:ext>
             <a:ext uri="{91240B29-F687-4f45-9708-019B960494DF}">
-              <a14:hiddenLine xmlns="" xmlns:a14="http://schemas.microsoft.com/office/drawing/2010/main" w="9525">
+              <a14:hiddenLine xmlns:a14="http://schemas.microsoft.com/office/drawing/2010/main" xmlns="" w="9525">
                 <a:solidFill>
                   <a:schemeClr val="tx1"/>
                 </a:solidFill>
@@ -10263,7 +10263,7 @@
               </a14:hiddenLine>
             </a:ext>
             <a:ext uri="{AF507438-7753-43e0-B8FC-AC1667EBCBE1}">
-              <a14:hiddenEffects xmlns="" xmlns:a14="http://schemas.microsoft.com/office/drawing/2010/main">
+              <a14:hiddenEffects xmlns:a14="http://schemas.microsoft.com/office/drawing/2010/main" xmlns="">
                 <a:effectLst>
                   <a:outerShdw blurRad="63500" dist="38099" dir="2700000" algn="ctr" rotWithShape="0">
                     <a:schemeClr val="bg2">
@@ -10316,17 +10316,17 @@
           <a:effectLst/>
           <a:extLst>
             <a:ext uri="{FAA26D3D-D897-4be2-8F04-BA451C77F1D7}">
-              <ma14:placeholderFlag xmlns="" xmlns:ma14="http://schemas.microsoft.com/office/mac/drawingml/2011/main" val="1"/>
+              <ma14:placeholderFlag xmlns:ma14="http://schemas.microsoft.com/office/mac/drawingml/2011/main" xmlns="" val="1"/>
             </a:ext>
             <a:ext uri="{909E8E84-426E-40dd-AFC4-6F175D3DCCD1}">
-              <a14:hiddenFill xmlns="" xmlns:a14="http://schemas.microsoft.com/office/drawing/2010/main">
+              <a14:hiddenFill xmlns:a14="http://schemas.microsoft.com/office/drawing/2010/main" xmlns="">
                 <a:solidFill>
                   <a:schemeClr val="accent1"/>
                 </a:solidFill>
               </a14:hiddenFill>
             </a:ext>
             <a:ext uri="{91240B29-F687-4f45-9708-019B960494DF}">
-              <a14:hiddenLine xmlns="" xmlns:a14="http://schemas.microsoft.com/office/drawing/2010/main" w="9525">
+              <a14:hiddenLine xmlns:a14="http://schemas.microsoft.com/office/drawing/2010/main" xmlns="" w="9525">
                 <a:solidFill>
                   <a:schemeClr val="tx1"/>
                 </a:solidFill>
@@ -10336,7 +10336,7 @@
               </a14:hiddenLine>
             </a:ext>
             <a:ext uri="{AF507438-7753-43e0-B8FC-AC1667EBCBE1}">
-              <a14:hiddenEffects xmlns="" xmlns:a14="http://schemas.microsoft.com/office/drawing/2010/main">
+              <a14:hiddenEffects xmlns:a14="http://schemas.microsoft.com/office/drawing/2010/main" xmlns="">
                 <a:effectLst>
                   <a:outerShdw blurRad="63500" dist="38099" dir="2700000" algn="ctr" rotWithShape="0">
                     <a:schemeClr val="bg2">
@@ -10411,17 +10411,17 @@
           <a:effectLst/>
           <a:extLst>
             <a:ext uri="{FAA26D3D-D897-4be2-8F04-BA451C77F1D7}">
-              <ma14:placeholderFlag xmlns="" xmlns:ma14="http://schemas.microsoft.com/office/mac/drawingml/2011/main" val="1"/>
+              <ma14:placeholderFlag xmlns:ma14="http://schemas.microsoft.com/office/mac/drawingml/2011/main" xmlns="" val="1"/>
             </a:ext>
             <a:ext uri="{909E8E84-426E-40dd-AFC4-6F175D3DCCD1}">
-              <a14:hiddenFill xmlns="" xmlns:a14="http://schemas.microsoft.com/office/drawing/2010/main">
+              <a14:hiddenFill xmlns:a14="http://schemas.microsoft.com/office/drawing/2010/main" xmlns="">
                 <a:solidFill>
                   <a:schemeClr val="accent1"/>
                 </a:solidFill>
               </a14:hiddenFill>
             </a:ext>
             <a:ext uri="{91240B29-F687-4f45-9708-019B960494DF}">
-              <a14:hiddenLine xmlns="" xmlns:a14="http://schemas.microsoft.com/office/drawing/2010/main" w="9525">
+              <a14:hiddenLine xmlns:a14="http://schemas.microsoft.com/office/drawing/2010/main" xmlns="" w="9525">
                 <a:solidFill>
                   <a:schemeClr val="tx1"/>
                 </a:solidFill>
@@ -10431,7 +10431,7 @@
               </a14:hiddenLine>
             </a:ext>
             <a:ext uri="{AF507438-7753-43e0-B8FC-AC1667EBCBE1}">
-              <a14:hiddenEffects xmlns="" xmlns:a14="http://schemas.microsoft.com/office/drawing/2010/main">
+              <a14:hiddenEffects xmlns:a14="http://schemas.microsoft.com/office/drawing/2010/main" xmlns="">
                 <a:effectLst>
                   <a:outerShdw blurRad="63500" dist="38099" dir="2700000" algn="ctr" rotWithShape="0">
                     <a:schemeClr val="bg2">
@@ -10493,17 +10493,17 @@
           <a:effectLst/>
           <a:extLst>
             <a:ext uri="{FAA26D3D-D897-4be2-8F04-BA451C77F1D7}">
-              <ma14:placeholderFlag xmlns="" xmlns:ma14="http://schemas.microsoft.com/office/mac/drawingml/2011/main" val="1"/>
+              <ma14:placeholderFlag xmlns:ma14="http://schemas.microsoft.com/office/mac/drawingml/2011/main" xmlns="" val="1"/>
             </a:ext>
             <a:ext uri="{909E8E84-426E-40dd-AFC4-6F175D3DCCD1}">
-              <a14:hiddenFill xmlns="" xmlns:a14="http://schemas.microsoft.com/office/drawing/2010/main">
+              <a14:hiddenFill xmlns:a14="http://schemas.microsoft.com/office/drawing/2010/main" xmlns="">
                 <a:solidFill>
                   <a:schemeClr val="accent1"/>
                 </a:solidFill>
               </a14:hiddenFill>
             </a:ext>
             <a:ext uri="{91240B29-F687-4f45-9708-019B960494DF}">
-              <a14:hiddenLine xmlns="" xmlns:a14="http://schemas.microsoft.com/office/drawing/2010/main" w="9525">
+              <a14:hiddenLine xmlns:a14="http://schemas.microsoft.com/office/drawing/2010/main" xmlns="" w="9525">
                 <a:solidFill>
                   <a:schemeClr val="tx1"/>
                 </a:solidFill>
@@ -10513,7 +10513,7 @@
               </a14:hiddenLine>
             </a:ext>
             <a:ext uri="{AF507438-7753-43e0-B8FC-AC1667EBCBE1}">
-              <a14:hiddenEffects xmlns="" xmlns:a14="http://schemas.microsoft.com/office/drawing/2010/main">
+              <a14:hiddenEffects xmlns:a14="http://schemas.microsoft.com/office/drawing/2010/main" xmlns="">
                 <a:effectLst>
                   <a:outerShdw blurRad="63500" dist="38099" dir="2700000" algn="ctr" rotWithShape="0">
                     <a:schemeClr val="bg2">
@@ -11059,14 +11059,14 @@
           </a:ln>
           <a:extLst>
             <a:ext uri="{909E8E84-426E-40dd-AFC4-6F175D3DCCD1}">
-              <a14:hiddenFill xmlns="" xmlns:a14="http://schemas.microsoft.com/office/drawing/2010/main">
+              <a14:hiddenFill xmlns:a14="http://schemas.microsoft.com/office/drawing/2010/main" xmlns="">
                 <a:solidFill>
                   <a:srgbClr val="FFFFFF"/>
                 </a:solidFill>
               </a14:hiddenFill>
             </a:ext>
             <a:ext uri="{91240B29-F687-4f45-9708-019B960494DF}">
-              <a14:hiddenLine xmlns="" xmlns:a14="http://schemas.microsoft.com/office/drawing/2010/main" w="9525">
+              <a14:hiddenLine xmlns:a14="http://schemas.microsoft.com/office/drawing/2010/main" xmlns="" w="9525">
                 <a:solidFill>
                   <a:srgbClr val="000000"/>
                 </a:solidFill>
@@ -11103,17 +11103,17 @@
           <a:effectLst/>
           <a:extLst>
             <a:ext uri="{FAA26D3D-D897-4be2-8F04-BA451C77F1D7}">
-              <ma14:placeholderFlag xmlns="" xmlns:ma14="http://schemas.microsoft.com/office/mac/drawingml/2011/main" val="1"/>
+              <ma14:placeholderFlag xmlns:ma14="http://schemas.microsoft.com/office/mac/drawingml/2011/main" xmlns="" val="1"/>
             </a:ext>
             <a:ext uri="{909E8E84-426E-40dd-AFC4-6F175D3DCCD1}">
-              <a14:hiddenFill xmlns="" xmlns:a14="http://schemas.microsoft.com/office/drawing/2010/main">
+              <a14:hiddenFill xmlns:a14="http://schemas.microsoft.com/office/drawing/2010/main" xmlns="">
                 <a:solidFill>
                   <a:schemeClr val="accent1"/>
                 </a:solidFill>
               </a14:hiddenFill>
             </a:ext>
             <a:ext uri="{91240B29-F687-4f45-9708-019B960494DF}">
-              <a14:hiddenLine xmlns="" xmlns:a14="http://schemas.microsoft.com/office/drawing/2010/main" w="9525">
+              <a14:hiddenLine xmlns:a14="http://schemas.microsoft.com/office/drawing/2010/main" xmlns="" w="9525">
                 <a:solidFill>
                   <a:schemeClr val="tx1"/>
                 </a:solidFill>
@@ -11123,7 +11123,7 @@
               </a14:hiddenLine>
             </a:ext>
             <a:ext uri="{AF507438-7753-43e0-B8FC-AC1667EBCBE1}">
-              <a14:hiddenEffects xmlns="" xmlns:a14="http://schemas.microsoft.com/office/drawing/2010/main">
+              <a14:hiddenEffects xmlns:a14="http://schemas.microsoft.com/office/drawing/2010/main" xmlns="">
                 <a:effectLst>
                   <a:outerShdw blurRad="63500" dist="38099" dir="2700000" algn="ctr" rotWithShape="0">
                     <a:schemeClr val="bg2">
@@ -11176,17 +11176,17 @@
           <a:effectLst/>
           <a:extLst>
             <a:ext uri="{FAA26D3D-D897-4be2-8F04-BA451C77F1D7}">
-              <ma14:placeholderFlag xmlns="" xmlns:ma14="http://schemas.microsoft.com/office/mac/drawingml/2011/main" val="1"/>
+              <ma14:placeholderFlag xmlns:ma14="http://schemas.microsoft.com/office/mac/drawingml/2011/main" xmlns="" val="1"/>
             </a:ext>
             <a:ext uri="{909E8E84-426E-40dd-AFC4-6F175D3DCCD1}">
-              <a14:hiddenFill xmlns="" xmlns:a14="http://schemas.microsoft.com/office/drawing/2010/main">
+              <a14:hiddenFill xmlns:a14="http://schemas.microsoft.com/office/drawing/2010/main" xmlns="">
                 <a:solidFill>
                   <a:schemeClr val="accent1"/>
                 </a:solidFill>
               </a14:hiddenFill>
             </a:ext>
             <a:ext uri="{91240B29-F687-4f45-9708-019B960494DF}">
-              <a14:hiddenLine xmlns="" xmlns:a14="http://schemas.microsoft.com/office/drawing/2010/main" w="9525">
+              <a14:hiddenLine xmlns:a14="http://schemas.microsoft.com/office/drawing/2010/main" xmlns="" w="9525">
                 <a:solidFill>
                   <a:schemeClr val="tx1"/>
                 </a:solidFill>
@@ -11196,7 +11196,7 @@
               </a14:hiddenLine>
             </a:ext>
             <a:ext uri="{AF507438-7753-43e0-B8FC-AC1667EBCBE1}">
-              <a14:hiddenEffects xmlns="" xmlns:a14="http://schemas.microsoft.com/office/drawing/2010/main">
+              <a14:hiddenEffects xmlns:a14="http://schemas.microsoft.com/office/drawing/2010/main" xmlns="">
                 <a:effectLst>
                   <a:outerShdw blurRad="63500" dist="38099" dir="2700000" algn="ctr" rotWithShape="0">
                     <a:schemeClr val="bg2">
@@ -11271,17 +11271,17 @@
           <a:effectLst/>
           <a:extLst>
             <a:ext uri="{FAA26D3D-D897-4be2-8F04-BA451C77F1D7}">
-              <ma14:placeholderFlag xmlns="" xmlns:ma14="http://schemas.microsoft.com/office/mac/drawingml/2011/main" val="1"/>
+              <ma14:placeholderFlag xmlns:ma14="http://schemas.microsoft.com/office/mac/drawingml/2011/main" xmlns="" val="1"/>
             </a:ext>
             <a:ext uri="{909E8E84-426E-40dd-AFC4-6F175D3DCCD1}">
-              <a14:hiddenFill xmlns="" xmlns:a14="http://schemas.microsoft.com/office/drawing/2010/main">
+              <a14:hiddenFill xmlns:a14="http://schemas.microsoft.com/office/drawing/2010/main" xmlns="">
                 <a:solidFill>
                   <a:schemeClr val="accent1"/>
                 </a:solidFill>
               </a14:hiddenFill>
             </a:ext>
             <a:ext uri="{91240B29-F687-4f45-9708-019B960494DF}">
-              <a14:hiddenLine xmlns="" xmlns:a14="http://schemas.microsoft.com/office/drawing/2010/main" w="9525">
+              <a14:hiddenLine xmlns:a14="http://schemas.microsoft.com/office/drawing/2010/main" xmlns="" w="9525">
                 <a:solidFill>
                   <a:schemeClr val="tx1"/>
                 </a:solidFill>
@@ -11291,7 +11291,7 @@
               </a14:hiddenLine>
             </a:ext>
             <a:ext uri="{AF507438-7753-43e0-B8FC-AC1667EBCBE1}">
-              <a14:hiddenEffects xmlns="" xmlns:a14="http://schemas.microsoft.com/office/drawing/2010/main">
+              <a14:hiddenEffects xmlns:a14="http://schemas.microsoft.com/office/drawing/2010/main" xmlns="">
                 <a:effectLst>
                   <a:outerShdw blurRad="63500" dist="38099" dir="2700000" algn="ctr" rotWithShape="0">
                     <a:schemeClr val="bg2">
@@ -11361,17 +11361,17 @@
           <a:effectLst/>
           <a:extLst>
             <a:ext uri="{FAA26D3D-D897-4be2-8F04-BA451C77F1D7}">
-              <ma14:placeholderFlag xmlns="" xmlns:ma14="http://schemas.microsoft.com/office/mac/drawingml/2011/main" val="1"/>
+              <ma14:placeholderFlag xmlns:ma14="http://schemas.microsoft.com/office/mac/drawingml/2011/main" xmlns="" val="1"/>
             </a:ext>
             <a:ext uri="{909E8E84-426E-40dd-AFC4-6F175D3DCCD1}">
-              <a14:hiddenFill xmlns="" xmlns:a14="http://schemas.microsoft.com/office/drawing/2010/main">
+              <a14:hiddenFill xmlns:a14="http://schemas.microsoft.com/office/drawing/2010/main" xmlns="">
                 <a:solidFill>
                   <a:schemeClr val="accent1"/>
                 </a:solidFill>
               </a14:hiddenFill>
             </a:ext>
             <a:ext uri="{91240B29-F687-4f45-9708-019B960494DF}">
-              <a14:hiddenLine xmlns="" xmlns:a14="http://schemas.microsoft.com/office/drawing/2010/main" w="9525">
+              <a14:hiddenLine xmlns:a14="http://schemas.microsoft.com/office/drawing/2010/main" xmlns="" w="9525">
                 <a:solidFill>
                   <a:schemeClr val="tx1"/>
                 </a:solidFill>
@@ -11381,7 +11381,7 @@
               </a14:hiddenLine>
             </a:ext>
             <a:ext uri="{AF507438-7753-43e0-B8FC-AC1667EBCBE1}">
-              <a14:hiddenEffects xmlns="" xmlns:a14="http://schemas.microsoft.com/office/drawing/2010/main">
+              <a14:hiddenEffects xmlns:a14="http://schemas.microsoft.com/office/drawing/2010/main" xmlns="">
                 <a:effectLst>
                   <a:outerShdw blurRad="63500" dist="38099" dir="2700000" algn="ctr" rotWithShape="0">
                     <a:schemeClr val="bg2">
@@ -12089,17 +12089,17 @@
           <a:effectLst/>
           <a:extLst>
             <a:ext uri="{FAA26D3D-D897-4be2-8F04-BA451C77F1D7}">
-              <ma14:placeholderFlag xmlns="" xmlns:ma14="http://schemas.microsoft.com/office/mac/drawingml/2011/main" val="1"/>
+              <ma14:placeholderFlag xmlns:ma14="http://schemas.microsoft.com/office/mac/drawingml/2011/main" xmlns="" val="1"/>
             </a:ext>
             <a:ext uri="{909E8E84-426E-40dd-AFC4-6F175D3DCCD1}">
-              <a14:hiddenFill xmlns="" xmlns:a14="http://schemas.microsoft.com/office/drawing/2010/main">
+              <a14:hiddenFill xmlns:a14="http://schemas.microsoft.com/office/drawing/2010/main" xmlns="">
                 <a:solidFill>
                   <a:schemeClr val="accent1"/>
                 </a:solidFill>
               </a14:hiddenFill>
             </a:ext>
             <a:ext uri="{91240B29-F687-4f45-9708-019B960494DF}">
-              <a14:hiddenLine xmlns="" xmlns:a14="http://schemas.microsoft.com/office/drawing/2010/main" w="9525">
+              <a14:hiddenLine xmlns:a14="http://schemas.microsoft.com/office/drawing/2010/main" xmlns="" w="9525">
                 <a:solidFill>
                   <a:schemeClr val="tx1"/>
                 </a:solidFill>
@@ -12109,7 +12109,7 @@
               </a14:hiddenLine>
             </a:ext>
             <a:ext uri="{AF507438-7753-43e0-B8FC-AC1667EBCBE1}">
-              <a14:hiddenEffects xmlns="" xmlns:a14="http://schemas.microsoft.com/office/drawing/2010/main">
+              <a14:hiddenEffects xmlns:a14="http://schemas.microsoft.com/office/drawing/2010/main" xmlns="">
                 <a:effectLst>
                   <a:outerShdw blurRad="63500" dist="38099" dir="2700000" algn="ctr" rotWithShape="0">
                     <a:schemeClr val="bg2">
@@ -14348,7 +14348,7 @@
             <p:ph idx="1"/>
             <p:extLst>
               <p:ext uri="{D42A27DB-BD31-4B8C-83A1-F6EECF244321}">
-                <p14:modId xmlns:p14="http://schemas.microsoft.com/office/powerpoint/2010/main" val="1743480306"/>
+                <p14:modId xmlns:p14="http://schemas.microsoft.com/office/powerpoint/2010/main" val="571711169"/>
               </p:ext>
             </p:extLst>
           </p:nvPr>
@@ -14546,7 +14546,7 @@
                     <a:p>
                       <a:r>
                         <a:rPr lang="en-GB" sz="2400" dirty="0"/>
-                        <a:t>Ratio calendar spam/spam</a:t>
+                        <a:t>Ratio calendar spam/clean</a:t>
                       </a:r>
                     </a:p>
                   </a:txBody>

</xml_diff>